<commit_message>
#7 continue to work on sql server stuffs
</commit_message>
<xml_diff>
--- a/assets/state-of-the-art.pptx
+++ b/assets/state-of-the-art.pptx
@@ -304,7 +304,7 @@
           <a:p>
             <a:fld id="{6DB206C8-F88B-4959-9CD2-3016D27660E1}" type="datetimeFigureOut">
               <a:rPr lang="en-US" smtClean="0"/>
-              <a:t>7/14/2018</a:t>
+              <a:t>7/18/2018</a:t>
             </a:fld>
             <a:endParaRPr lang="en-US"/>
           </a:p>
@@ -472,7 +472,7 @@
           <a:p>
             <a:fld id="{6DB206C8-F88B-4959-9CD2-3016D27660E1}" type="datetimeFigureOut">
               <a:rPr lang="en-US" smtClean="0"/>
-              <a:t>7/14/2018</a:t>
+              <a:t>7/18/2018</a:t>
             </a:fld>
             <a:endParaRPr lang="en-US"/>
           </a:p>
@@ -650,7 +650,7 @@
           <a:p>
             <a:fld id="{6DB206C8-F88B-4959-9CD2-3016D27660E1}" type="datetimeFigureOut">
               <a:rPr lang="en-US" smtClean="0"/>
-              <a:t>7/14/2018</a:t>
+              <a:t>7/18/2018</a:t>
             </a:fld>
             <a:endParaRPr lang="en-US"/>
           </a:p>
@@ -818,7 +818,7 @@
           <a:p>
             <a:fld id="{6DB206C8-F88B-4959-9CD2-3016D27660E1}" type="datetimeFigureOut">
               <a:rPr lang="en-US" smtClean="0"/>
-              <a:t>7/14/2018</a:t>
+              <a:t>7/18/2018</a:t>
             </a:fld>
             <a:endParaRPr lang="en-US"/>
           </a:p>
@@ -1063,7 +1063,7 @@
           <a:p>
             <a:fld id="{6DB206C8-F88B-4959-9CD2-3016D27660E1}" type="datetimeFigureOut">
               <a:rPr lang="en-US" smtClean="0"/>
-              <a:t>7/14/2018</a:t>
+              <a:t>7/18/2018</a:t>
             </a:fld>
             <a:endParaRPr lang="en-US"/>
           </a:p>
@@ -1348,7 +1348,7 @@
           <a:p>
             <a:fld id="{6DB206C8-F88B-4959-9CD2-3016D27660E1}" type="datetimeFigureOut">
               <a:rPr lang="en-US" smtClean="0"/>
-              <a:t>7/14/2018</a:t>
+              <a:t>7/18/2018</a:t>
             </a:fld>
             <a:endParaRPr lang="en-US"/>
           </a:p>
@@ -1767,7 +1767,7 @@
           <a:p>
             <a:fld id="{6DB206C8-F88B-4959-9CD2-3016D27660E1}" type="datetimeFigureOut">
               <a:rPr lang="en-US" smtClean="0"/>
-              <a:t>7/14/2018</a:t>
+              <a:t>7/18/2018</a:t>
             </a:fld>
             <a:endParaRPr lang="en-US"/>
           </a:p>
@@ -1884,7 +1884,7 @@
           <a:p>
             <a:fld id="{6DB206C8-F88B-4959-9CD2-3016D27660E1}" type="datetimeFigureOut">
               <a:rPr lang="en-US" smtClean="0"/>
-              <a:t>7/14/2018</a:t>
+              <a:t>7/18/2018</a:t>
             </a:fld>
             <a:endParaRPr lang="en-US"/>
           </a:p>
@@ -1979,7 +1979,7 @@
           <a:p>
             <a:fld id="{6DB206C8-F88B-4959-9CD2-3016D27660E1}" type="datetimeFigureOut">
               <a:rPr lang="en-US" smtClean="0"/>
-              <a:t>7/14/2018</a:t>
+              <a:t>7/18/2018</a:t>
             </a:fld>
             <a:endParaRPr lang="en-US"/>
           </a:p>
@@ -2254,7 +2254,7 @@
           <a:p>
             <a:fld id="{6DB206C8-F88B-4959-9CD2-3016D27660E1}" type="datetimeFigureOut">
               <a:rPr lang="en-US" smtClean="0"/>
-              <a:t>7/14/2018</a:t>
+              <a:t>7/18/2018</a:t>
             </a:fld>
             <a:endParaRPr lang="en-US"/>
           </a:p>
@@ -2506,7 +2506,7 @@
           <a:p>
             <a:fld id="{6DB206C8-F88B-4959-9CD2-3016D27660E1}" type="datetimeFigureOut">
               <a:rPr lang="en-US" smtClean="0"/>
-              <a:t>7/14/2018</a:t>
+              <a:t>7/18/2018</a:t>
             </a:fld>
             <a:endParaRPr lang="en-US"/>
           </a:p>
@@ -2717,7 +2717,7 @@
           <a:p>
             <a:fld id="{6DB206C8-F88B-4959-9CD2-3016D27660E1}" type="datetimeFigureOut">
               <a:rPr lang="en-US" smtClean="0"/>
-              <a:t>7/14/2018</a:t>
+              <a:t>7/18/2018</a:t>
             </a:fld>
             <a:endParaRPr lang="en-US"/>
           </a:p>
@@ -7088,16 +7088,13 @@
                   <a:spcPct val="0"/>
                 </a:spcAft>
               </a:pPr>
-              <a:r>
-                <a:rPr lang="en-US" sz="1131" b="1" dirty="0">
-                  <a:solidFill>
-                    <a:schemeClr val="tx1"/>
-                  </a:solidFill>
-                  <a:latin typeface="Segoe UI" charset="0"/>
-                  <a:cs typeface="Segoe UI" charset="0"/>
-                </a:rPr>
-                <a:t>Gateway</a:t>
-              </a:r>
+              <a:endParaRPr lang="en-US" sz="1131" b="1" dirty="0">
+                <a:solidFill>
+                  <a:schemeClr val="tx1"/>
+                </a:solidFill>
+                <a:latin typeface="Segoe UI" charset="0"/>
+                <a:cs typeface="Segoe UI" charset="0"/>
+              </a:endParaRPr>
             </a:p>
           </p:txBody>
         </p:sp>
@@ -7129,7 +7126,7 @@
           </p:blipFill>
           <p:spPr>
             <a:xfrm>
-              <a:off x="1485887" y="2338805"/>
+              <a:off x="1485887" y="2452343"/>
               <a:ext cx="678907" cy="154889"/>
             </a:xfrm>
             <a:prstGeom prst="rect">

</xml_diff>

<commit_message>
change name of classes and services #9
</commit_message>
<xml_diff>
--- a/assets/state-of-the-art.pptx
+++ b/assets/state-of-the-art.pptx
@@ -2,13 +2,14 @@
 <file path=ppt/presentation.xml><?xml version="1.0" encoding="utf-8"?>
 <p:presentation xmlns:a="http://schemas.openxmlformats.org/drawingml/2006/main" xmlns:r="http://schemas.openxmlformats.org/officeDocument/2006/relationships" xmlns:p="http://schemas.openxmlformats.org/presentationml/2006/main" saveSubsetFonts="1">
   <p:sldMasterIdLst>
-    <p:sldMasterId id="2147483648" r:id="rId1"/>
+    <p:sldMasterId id="2147483672" r:id="rId1"/>
   </p:sldMasterIdLst>
   <p:sldIdLst>
     <p:sldId id="256" r:id="rId2"/>
-    <p:sldId id="259" r:id="rId3"/>
-    <p:sldId id="258" r:id="rId4"/>
-    <p:sldId id="257" r:id="rId5"/>
+    <p:sldId id="260" r:id="rId3"/>
+    <p:sldId id="259" r:id="rId4"/>
+    <p:sldId id="258" r:id="rId5"/>
+    <p:sldId id="257" r:id="rId6"/>
   </p:sldIdLst>
   <p:sldSz cx="9144000" cy="6858000" type="screen4x3"/>
   <p:notesSz cx="6858000" cy="9144000"/>
@@ -145,7 +146,13 @@
       </p:grpSpPr>
       <p:sp>
         <p:nvSpPr>
-          <p:cNvPr id="2" name="Title 1"/>
+          <p:cNvPr id="2" name="Title 1">
+            <a:extLst>
+              <a:ext uri="{FF2B5EF4-FFF2-40B4-BE49-F238E27FC236}">
+                <a16:creationId xmlns:a16="http://schemas.microsoft.com/office/drawing/2014/main" id="{4E1A3618-7687-49D8-9409-2DFE52281B47}"/>
+              </a:ext>
+            </a:extLst>
+          </p:cNvPr>
           <p:cNvSpPr>
             <a:spLocks noGrp="1"/>
           </p:cNvSpPr>
@@ -155,13 +162,17 @@
         </p:nvSpPr>
         <p:spPr>
           <a:xfrm>
-            <a:off x="685800" y="2130425"/>
-            <a:ext cx="7772400" cy="1470025"/>
+            <a:off x="1143000" y="1122363"/>
+            <a:ext cx="6858000" cy="2387600"/>
           </a:xfrm>
         </p:spPr>
         <p:txBody>
-          <a:bodyPr/>
-          <a:lstStyle/>
+          <a:bodyPr anchor="b"/>
+          <a:lstStyle>
+            <a:lvl1pPr algn="ctr">
+              <a:defRPr sz="4500"/>
+            </a:lvl1pPr>
+          </a:lstStyle>
           <a:p>
             <a:r>
               <a:rPr lang="en-US"/>
@@ -172,7 +183,13 @@
       </p:sp>
       <p:sp>
         <p:nvSpPr>
-          <p:cNvPr id="3" name="Subtitle 2"/>
+          <p:cNvPr id="3" name="Subtitle 2">
+            <a:extLst>
+              <a:ext uri="{FF2B5EF4-FFF2-40B4-BE49-F238E27FC236}">
+                <a16:creationId xmlns:a16="http://schemas.microsoft.com/office/drawing/2014/main" id="{54AAEA42-9D08-4C7C-ACC8-E8D7C63E9C04}"/>
+              </a:ext>
+            </a:extLst>
+          </p:cNvPr>
           <p:cNvSpPr>
             <a:spLocks noGrp="1"/>
           </p:cNvSpPr>
@@ -182,8 +199,8 @@
         </p:nvSpPr>
         <p:spPr>
           <a:xfrm>
-            <a:off x="1371600" y="3886200"/>
-            <a:ext cx="6400800" cy="1752600"/>
+            <a:off x="1143000" y="3602038"/>
+            <a:ext cx="6858000" cy="1655762"/>
           </a:xfrm>
         </p:spPr>
         <p:txBody>
@@ -191,93 +208,39 @@
           <a:lstStyle>
             <a:lvl1pPr marL="0" indent="0" algn="ctr">
               <a:buNone/>
-              <a:defRPr>
-                <a:solidFill>
-                  <a:schemeClr val="tx1">
-                    <a:tint val="75000"/>
-                  </a:schemeClr>
-                </a:solidFill>
-              </a:defRPr>
+              <a:defRPr sz="1800"/>
             </a:lvl1pPr>
-            <a:lvl2pPr marL="457200" indent="0" algn="ctr">
+            <a:lvl2pPr marL="342900" indent="0" algn="ctr">
               <a:buNone/>
-              <a:defRPr>
-                <a:solidFill>
-                  <a:schemeClr val="tx1">
-                    <a:tint val="75000"/>
-                  </a:schemeClr>
-                </a:solidFill>
-              </a:defRPr>
+              <a:defRPr sz="1500"/>
             </a:lvl2pPr>
-            <a:lvl3pPr marL="914400" indent="0" algn="ctr">
+            <a:lvl3pPr marL="685800" indent="0" algn="ctr">
               <a:buNone/>
-              <a:defRPr>
-                <a:solidFill>
-                  <a:schemeClr val="tx1">
-                    <a:tint val="75000"/>
-                  </a:schemeClr>
-                </a:solidFill>
-              </a:defRPr>
+              <a:defRPr sz="1350"/>
             </a:lvl3pPr>
-            <a:lvl4pPr marL="1371600" indent="0" algn="ctr">
+            <a:lvl4pPr marL="1028700" indent="0" algn="ctr">
               <a:buNone/>
-              <a:defRPr>
-                <a:solidFill>
-                  <a:schemeClr val="tx1">
-                    <a:tint val="75000"/>
-                  </a:schemeClr>
-                </a:solidFill>
-              </a:defRPr>
+              <a:defRPr sz="1200"/>
             </a:lvl4pPr>
-            <a:lvl5pPr marL="1828800" indent="0" algn="ctr">
+            <a:lvl5pPr marL="1371600" indent="0" algn="ctr">
               <a:buNone/>
-              <a:defRPr>
-                <a:solidFill>
-                  <a:schemeClr val="tx1">
-                    <a:tint val="75000"/>
-                  </a:schemeClr>
-                </a:solidFill>
-              </a:defRPr>
+              <a:defRPr sz="1200"/>
             </a:lvl5pPr>
-            <a:lvl6pPr marL="2286000" indent="0" algn="ctr">
+            <a:lvl6pPr marL="1714500" indent="0" algn="ctr">
               <a:buNone/>
-              <a:defRPr>
-                <a:solidFill>
-                  <a:schemeClr val="tx1">
-                    <a:tint val="75000"/>
-                  </a:schemeClr>
-                </a:solidFill>
-              </a:defRPr>
+              <a:defRPr sz="1200"/>
             </a:lvl6pPr>
-            <a:lvl7pPr marL="2743200" indent="0" algn="ctr">
+            <a:lvl7pPr marL="2057400" indent="0" algn="ctr">
               <a:buNone/>
-              <a:defRPr>
-                <a:solidFill>
-                  <a:schemeClr val="tx1">
-                    <a:tint val="75000"/>
-                  </a:schemeClr>
-                </a:solidFill>
-              </a:defRPr>
+              <a:defRPr sz="1200"/>
             </a:lvl7pPr>
-            <a:lvl8pPr marL="3200400" indent="0" algn="ctr">
+            <a:lvl8pPr marL="2400300" indent="0" algn="ctr">
               <a:buNone/>
-              <a:defRPr>
-                <a:solidFill>
-                  <a:schemeClr val="tx1">
-                    <a:tint val="75000"/>
-                  </a:schemeClr>
-                </a:solidFill>
-              </a:defRPr>
+              <a:defRPr sz="1200"/>
             </a:lvl8pPr>
-            <a:lvl9pPr marL="3657600" indent="0" algn="ctr">
+            <a:lvl9pPr marL="2743200" indent="0" algn="ctr">
               <a:buNone/>
-              <a:defRPr>
-                <a:solidFill>
-                  <a:schemeClr val="tx1">
-                    <a:tint val="75000"/>
-                  </a:schemeClr>
-                </a:solidFill>
-              </a:defRPr>
+              <a:defRPr sz="1200"/>
             </a:lvl9pPr>
           </a:lstStyle>
           <a:p>
@@ -290,7 +253,13 @@
       </p:sp>
       <p:sp>
         <p:nvSpPr>
-          <p:cNvPr id="4" name="Date Placeholder 3"/>
+          <p:cNvPr id="4" name="Date Placeholder 3">
+            <a:extLst>
+              <a:ext uri="{FF2B5EF4-FFF2-40B4-BE49-F238E27FC236}">
+                <a16:creationId xmlns:a16="http://schemas.microsoft.com/office/drawing/2014/main" id="{2A1C4C32-E34D-408C-A070-1A4EE5AAA059}"/>
+              </a:ext>
+            </a:extLst>
+          </p:cNvPr>
           <p:cNvSpPr>
             <a:spLocks noGrp="1"/>
           </p:cNvSpPr>
@@ -305,7 +274,7 @@
           <a:p>
             <a:fld id="{6DB206C8-F88B-4959-9CD2-3016D27660E1}" type="datetimeFigureOut">
               <a:rPr lang="en-US" smtClean="0"/>
-              <a:t>8/2/2018</a:t>
+              <a:t>8/8/2018</a:t>
             </a:fld>
             <a:endParaRPr lang="en-US"/>
           </a:p>
@@ -313,7 +282,13 @@
       </p:sp>
       <p:sp>
         <p:nvSpPr>
-          <p:cNvPr id="5" name="Footer Placeholder 4"/>
+          <p:cNvPr id="5" name="Footer Placeholder 4">
+            <a:extLst>
+              <a:ext uri="{FF2B5EF4-FFF2-40B4-BE49-F238E27FC236}">
+                <a16:creationId xmlns:a16="http://schemas.microsoft.com/office/drawing/2014/main" id="{81842FFB-185E-4EEA-8A48-ABA6779DC88B}"/>
+              </a:ext>
+            </a:extLst>
+          </p:cNvPr>
           <p:cNvSpPr>
             <a:spLocks noGrp="1"/>
           </p:cNvSpPr>
@@ -332,7 +307,13 @@
       </p:sp>
       <p:sp>
         <p:nvSpPr>
-          <p:cNvPr id="6" name="Slide Number Placeholder 5"/>
+          <p:cNvPr id="6" name="Slide Number Placeholder 5">
+            <a:extLst>
+              <a:ext uri="{FF2B5EF4-FFF2-40B4-BE49-F238E27FC236}">
+                <a16:creationId xmlns:a16="http://schemas.microsoft.com/office/drawing/2014/main" id="{B3302B14-BC97-49CC-BD39-360ED47377D7}"/>
+              </a:ext>
+            </a:extLst>
+          </p:cNvPr>
           <p:cNvSpPr>
             <a:spLocks noGrp="1"/>
           </p:cNvSpPr>
@@ -356,7 +337,7 @@
     </p:spTree>
     <p:extLst>
       <p:ext uri="{BB962C8B-B14F-4D97-AF65-F5344CB8AC3E}">
-        <p14:creationId xmlns:p14="http://schemas.microsoft.com/office/powerpoint/2010/main" val="951375579"/>
+        <p14:creationId xmlns:p14="http://schemas.microsoft.com/office/powerpoint/2010/main" val="827391551"/>
       </p:ext>
     </p:extLst>
   </p:cSld>
@@ -385,7 +366,13 @@
       </p:grpSpPr>
       <p:sp>
         <p:nvSpPr>
-          <p:cNvPr id="2" name="Title 1"/>
+          <p:cNvPr id="2" name="Title 1">
+            <a:extLst>
+              <a:ext uri="{FF2B5EF4-FFF2-40B4-BE49-F238E27FC236}">
+                <a16:creationId xmlns:a16="http://schemas.microsoft.com/office/drawing/2014/main" id="{B6330EEC-6093-43D8-A53B-817CFB9B7FB9}"/>
+              </a:ext>
+            </a:extLst>
+          </p:cNvPr>
           <p:cNvSpPr>
             <a:spLocks noGrp="1"/>
           </p:cNvSpPr>
@@ -407,7 +394,13 @@
       </p:sp>
       <p:sp>
         <p:nvSpPr>
-          <p:cNvPr id="3" name="Vertical Text Placeholder 2"/>
+          <p:cNvPr id="3" name="Vertical Text Placeholder 2">
+            <a:extLst>
+              <a:ext uri="{FF2B5EF4-FFF2-40B4-BE49-F238E27FC236}">
+                <a16:creationId xmlns:a16="http://schemas.microsoft.com/office/drawing/2014/main" id="{F2133E25-CAE3-40C4-A5F7-E823B43AE890}"/>
+              </a:ext>
+            </a:extLst>
+          </p:cNvPr>
           <p:cNvSpPr>
             <a:spLocks noGrp="1"/>
           </p:cNvSpPr>
@@ -423,7 +416,7 @@
             <a:pPr lvl="0"/>
             <a:r>
               <a:rPr lang="en-US"/>
-              <a:t>Click to edit Master text styles</a:t>
+              <a:t>Edit Master text styles</a:t>
             </a:r>
           </a:p>
           <a:p>
@@ -458,7 +451,13 @@
       </p:sp>
       <p:sp>
         <p:nvSpPr>
-          <p:cNvPr id="4" name="Date Placeholder 3"/>
+          <p:cNvPr id="4" name="Date Placeholder 3">
+            <a:extLst>
+              <a:ext uri="{FF2B5EF4-FFF2-40B4-BE49-F238E27FC236}">
+                <a16:creationId xmlns:a16="http://schemas.microsoft.com/office/drawing/2014/main" id="{DE772FBC-31F4-463D-B403-5F278A000EB8}"/>
+              </a:ext>
+            </a:extLst>
+          </p:cNvPr>
           <p:cNvSpPr>
             <a:spLocks noGrp="1"/>
           </p:cNvSpPr>
@@ -473,7 +472,7 @@
           <a:p>
             <a:fld id="{6DB206C8-F88B-4959-9CD2-3016D27660E1}" type="datetimeFigureOut">
               <a:rPr lang="en-US" smtClean="0"/>
-              <a:t>8/2/2018</a:t>
+              <a:t>8/8/2018</a:t>
             </a:fld>
             <a:endParaRPr lang="en-US"/>
           </a:p>
@@ -481,7 +480,13 @@
       </p:sp>
       <p:sp>
         <p:nvSpPr>
-          <p:cNvPr id="5" name="Footer Placeholder 4"/>
+          <p:cNvPr id="5" name="Footer Placeholder 4">
+            <a:extLst>
+              <a:ext uri="{FF2B5EF4-FFF2-40B4-BE49-F238E27FC236}">
+                <a16:creationId xmlns:a16="http://schemas.microsoft.com/office/drawing/2014/main" id="{F6705945-7FD0-43BA-B518-59F516030F77}"/>
+              </a:ext>
+            </a:extLst>
+          </p:cNvPr>
           <p:cNvSpPr>
             <a:spLocks noGrp="1"/>
           </p:cNvSpPr>
@@ -500,7 +505,13 @@
       </p:sp>
       <p:sp>
         <p:nvSpPr>
-          <p:cNvPr id="6" name="Slide Number Placeholder 5"/>
+          <p:cNvPr id="6" name="Slide Number Placeholder 5">
+            <a:extLst>
+              <a:ext uri="{FF2B5EF4-FFF2-40B4-BE49-F238E27FC236}">
+                <a16:creationId xmlns:a16="http://schemas.microsoft.com/office/drawing/2014/main" id="{378CD78A-B1B5-44F4-BF52-FD498FA2565E}"/>
+              </a:ext>
+            </a:extLst>
+          </p:cNvPr>
           <p:cNvSpPr>
             <a:spLocks noGrp="1"/>
           </p:cNvSpPr>
@@ -524,7 +535,7 @@
     </p:spTree>
     <p:extLst>
       <p:ext uri="{BB962C8B-B14F-4D97-AF65-F5344CB8AC3E}">
-        <p14:creationId xmlns:p14="http://schemas.microsoft.com/office/powerpoint/2010/main" val="316934567"/>
+        <p14:creationId xmlns:p14="http://schemas.microsoft.com/office/powerpoint/2010/main" val="3492054200"/>
       </p:ext>
     </p:extLst>
   </p:cSld>
@@ -553,7 +564,13 @@
       </p:grpSpPr>
       <p:sp>
         <p:nvSpPr>
-          <p:cNvPr id="2" name="Vertical Title 1"/>
+          <p:cNvPr id="2" name="Vertical Title 1">
+            <a:extLst>
+              <a:ext uri="{FF2B5EF4-FFF2-40B4-BE49-F238E27FC236}">
+                <a16:creationId xmlns:a16="http://schemas.microsoft.com/office/drawing/2014/main" id="{28909099-283A-48CA-AB7B-FD19FBB10BD8}"/>
+              </a:ext>
+            </a:extLst>
+          </p:cNvPr>
           <p:cNvSpPr>
             <a:spLocks noGrp="1"/>
           </p:cNvSpPr>
@@ -563,8 +580,8 @@
         </p:nvSpPr>
         <p:spPr>
           <a:xfrm>
-            <a:off x="6629400" y="274638"/>
-            <a:ext cx="2057400" cy="5851525"/>
+            <a:off x="6543675" y="365125"/>
+            <a:ext cx="1971675" cy="5811838"/>
           </a:xfrm>
         </p:spPr>
         <p:txBody>
@@ -580,7 +597,13 @@
       </p:sp>
       <p:sp>
         <p:nvSpPr>
-          <p:cNvPr id="3" name="Vertical Text Placeholder 2"/>
+          <p:cNvPr id="3" name="Vertical Text Placeholder 2">
+            <a:extLst>
+              <a:ext uri="{FF2B5EF4-FFF2-40B4-BE49-F238E27FC236}">
+                <a16:creationId xmlns:a16="http://schemas.microsoft.com/office/drawing/2014/main" id="{5BA288DF-0D28-4C43-AE91-4641610FFD35}"/>
+              </a:ext>
+            </a:extLst>
+          </p:cNvPr>
           <p:cNvSpPr>
             <a:spLocks noGrp="1"/>
           </p:cNvSpPr>
@@ -590,8 +613,8 @@
         </p:nvSpPr>
         <p:spPr>
           <a:xfrm>
-            <a:off x="457200" y="274638"/>
-            <a:ext cx="6019800" cy="5851525"/>
+            <a:off x="628650" y="365125"/>
+            <a:ext cx="5800725" cy="5811838"/>
           </a:xfrm>
         </p:spPr>
         <p:txBody>
@@ -601,7 +624,7 @@
             <a:pPr lvl="0"/>
             <a:r>
               <a:rPr lang="en-US"/>
-              <a:t>Click to edit Master text styles</a:t>
+              <a:t>Edit Master text styles</a:t>
             </a:r>
           </a:p>
           <a:p>
@@ -636,7 +659,13 @@
       </p:sp>
       <p:sp>
         <p:nvSpPr>
-          <p:cNvPr id="4" name="Date Placeholder 3"/>
+          <p:cNvPr id="4" name="Date Placeholder 3">
+            <a:extLst>
+              <a:ext uri="{FF2B5EF4-FFF2-40B4-BE49-F238E27FC236}">
+                <a16:creationId xmlns:a16="http://schemas.microsoft.com/office/drawing/2014/main" id="{3A7EFDCB-0A59-45F0-9AB2-4A2036343750}"/>
+              </a:ext>
+            </a:extLst>
+          </p:cNvPr>
           <p:cNvSpPr>
             <a:spLocks noGrp="1"/>
           </p:cNvSpPr>
@@ -651,7 +680,7 @@
           <a:p>
             <a:fld id="{6DB206C8-F88B-4959-9CD2-3016D27660E1}" type="datetimeFigureOut">
               <a:rPr lang="en-US" smtClean="0"/>
-              <a:t>8/2/2018</a:t>
+              <a:t>8/8/2018</a:t>
             </a:fld>
             <a:endParaRPr lang="en-US"/>
           </a:p>
@@ -659,7 +688,13 @@
       </p:sp>
       <p:sp>
         <p:nvSpPr>
-          <p:cNvPr id="5" name="Footer Placeholder 4"/>
+          <p:cNvPr id="5" name="Footer Placeholder 4">
+            <a:extLst>
+              <a:ext uri="{FF2B5EF4-FFF2-40B4-BE49-F238E27FC236}">
+                <a16:creationId xmlns:a16="http://schemas.microsoft.com/office/drawing/2014/main" id="{77CF45FE-3ACE-458C-8BAE-B7D2D4EBAE51}"/>
+              </a:ext>
+            </a:extLst>
+          </p:cNvPr>
           <p:cNvSpPr>
             <a:spLocks noGrp="1"/>
           </p:cNvSpPr>
@@ -678,7 +713,13 @@
       </p:sp>
       <p:sp>
         <p:nvSpPr>
-          <p:cNvPr id="6" name="Slide Number Placeholder 5"/>
+          <p:cNvPr id="6" name="Slide Number Placeholder 5">
+            <a:extLst>
+              <a:ext uri="{FF2B5EF4-FFF2-40B4-BE49-F238E27FC236}">
+                <a16:creationId xmlns:a16="http://schemas.microsoft.com/office/drawing/2014/main" id="{7B7F64F2-F300-4F55-B3E3-C50053A89592}"/>
+              </a:ext>
+            </a:extLst>
+          </p:cNvPr>
           <p:cNvSpPr>
             <a:spLocks noGrp="1"/>
           </p:cNvSpPr>
@@ -702,7 +743,7 @@
     </p:spTree>
     <p:extLst>
       <p:ext uri="{BB962C8B-B14F-4D97-AF65-F5344CB8AC3E}">
-        <p14:creationId xmlns:p14="http://schemas.microsoft.com/office/powerpoint/2010/main" val="3799529218"/>
+        <p14:creationId xmlns:p14="http://schemas.microsoft.com/office/powerpoint/2010/main" val="2307939138"/>
       </p:ext>
     </p:extLst>
   </p:cSld>
@@ -731,7 +772,13 @@
       </p:grpSpPr>
       <p:sp>
         <p:nvSpPr>
-          <p:cNvPr id="2" name="Title 1"/>
+          <p:cNvPr id="2" name="Title 1">
+            <a:extLst>
+              <a:ext uri="{FF2B5EF4-FFF2-40B4-BE49-F238E27FC236}">
+                <a16:creationId xmlns:a16="http://schemas.microsoft.com/office/drawing/2014/main" id="{307174B1-A015-46B4-B560-AFBCAB582590}"/>
+              </a:ext>
+            </a:extLst>
+          </p:cNvPr>
           <p:cNvSpPr>
             <a:spLocks noGrp="1"/>
           </p:cNvSpPr>
@@ -753,7 +800,13 @@
       </p:sp>
       <p:sp>
         <p:nvSpPr>
-          <p:cNvPr id="3" name="Content Placeholder 2"/>
+          <p:cNvPr id="3" name="Content Placeholder 2">
+            <a:extLst>
+              <a:ext uri="{FF2B5EF4-FFF2-40B4-BE49-F238E27FC236}">
+                <a16:creationId xmlns:a16="http://schemas.microsoft.com/office/drawing/2014/main" id="{B60A1B87-1AA3-4C45-A165-7A1D9C1C2C7E}"/>
+              </a:ext>
+            </a:extLst>
+          </p:cNvPr>
           <p:cNvSpPr>
             <a:spLocks noGrp="1"/>
           </p:cNvSpPr>
@@ -769,7 +822,7 @@
             <a:pPr lvl="0"/>
             <a:r>
               <a:rPr lang="en-US"/>
-              <a:t>Click to edit Master text styles</a:t>
+              <a:t>Edit Master text styles</a:t>
             </a:r>
           </a:p>
           <a:p>
@@ -804,7 +857,13 @@
       </p:sp>
       <p:sp>
         <p:nvSpPr>
-          <p:cNvPr id="4" name="Date Placeholder 3"/>
+          <p:cNvPr id="4" name="Date Placeholder 3">
+            <a:extLst>
+              <a:ext uri="{FF2B5EF4-FFF2-40B4-BE49-F238E27FC236}">
+                <a16:creationId xmlns:a16="http://schemas.microsoft.com/office/drawing/2014/main" id="{4C034CE6-D598-4161-84B8-BBADC9BAD500}"/>
+              </a:ext>
+            </a:extLst>
+          </p:cNvPr>
           <p:cNvSpPr>
             <a:spLocks noGrp="1"/>
           </p:cNvSpPr>
@@ -819,7 +878,7 @@
           <a:p>
             <a:fld id="{6DB206C8-F88B-4959-9CD2-3016D27660E1}" type="datetimeFigureOut">
               <a:rPr lang="en-US" smtClean="0"/>
-              <a:t>8/2/2018</a:t>
+              <a:t>8/8/2018</a:t>
             </a:fld>
             <a:endParaRPr lang="en-US"/>
           </a:p>
@@ -827,7 +886,13 @@
       </p:sp>
       <p:sp>
         <p:nvSpPr>
-          <p:cNvPr id="5" name="Footer Placeholder 4"/>
+          <p:cNvPr id="5" name="Footer Placeholder 4">
+            <a:extLst>
+              <a:ext uri="{FF2B5EF4-FFF2-40B4-BE49-F238E27FC236}">
+                <a16:creationId xmlns:a16="http://schemas.microsoft.com/office/drawing/2014/main" id="{542AF648-570B-47FD-ACAA-BC10899B5D58}"/>
+              </a:ext>
+            </a:extLst>
+          </p:cNvPr>
           <p:cNvSpPr>
             <a:spLocks noGrp="1"/>
           </p:cNvSpPr>
@@ -846,7 +911,13 @@
       </p:sp>
       <p:sp>
         <p:nvSpPr>
-          <p:cNvPr id="6" name="Slide Number Placeholder 5"/>
+          <p:cNvPr id="6" name="Slide Number Placeholder 5">
+            <a:extLst>
+              <a:ext uri="{FF2B5EF4-FFF2-40B4-BE49-F238E27FC236}">
+                <a16:creationId xmlns:a16="http://schemas.microsoft.com/office/drawing/2014/main" id="{717A339D-80BE-4244-856A-AD23ADC6B045}"/>
+              </a:ext>
+            </a:extLst>
+          </p:cNvPr>
           <p:cNvSpPr>
             <a:spLocks noGrp="1"/>
           </p:cNvSpPr>
@@ -870,7 +941,7 @@
     </p:spTree>
     <p:extLst>
       <p:ext uri="{BB962C8B-B14F-4D97-AF65-F5344CB8AC3E}">
-        <p14:creationId xmlns:p14="http://schemas.microsoft.com/office/powerpoint/2010/main" val="3066554721"/>
+        <p14:creationId xmlns:p14="http://schemas.microsoft.com/office/powerpoint/2010/main" val="49351366"/>
       </p:ext>
     </p:extLst>
   </p:cSld>
@@ -899,7 +970,13 @@
       </p:grpSpPr>
       <p:sp>
         <p:nvSpPr>
-          <p:cNvPr id="2" name="Title 1"/>
+          <p:cNvPr id="2" name="Title 1">
+            <a:extLst>
+              <a:ext uri="{FF2B5EF4-FFF2-40B4-BE49-F238E27FC236}">
+                <a16:creationId xmlns:a16="http://schemas.microsoft.com/office/drawing/2014/main" id="{A4605DBC-0231-4AE6-9DC1-715BA662A075}"/>
+              </a:ext>
+            </a:extLst>
+          </p:cNvPr>
           <p:cNvSpPr>
             <a:spLocks noGrp="1"/>
           </p:cNvSpPr>
@@ -909,15 +986,15 @@
         </p:nvSpPr>
         <p:spPr>
           <a:xfrm>
-            <a:off x="722313" y="4406900"/>
-            <a:ext cx="7772400" cy="1362075"/>
+            <a:off x="623888" y="1709739"/>
+            <a:ext cx="7886700" cy="2852737"/>
           </a:xfrm>
         </p:spPr>
         <p:txBody>
-          <a:bodyPr anchor="t"/>
+          <a:bodyPr anchor="b"/>
           <a:lstStyle>
-            <a:lvl1pPr algn="l">
-              <a:defRPr sz="4000" b="1" cap="all"/>
+            <a:lvl1pPr>
+              <a:defRPr sz="4500"/>
             </a:lvl1pPr>
           </a:lstStyle>
           <a:p>
@@ -930,7 +1007,13 @@
       </p:sp>
       <p:sp>
         <p:nvSpPr>
-          <p:cNvPr id="3" name="Text Placeholder 2"/>
+          <p:cNvPr id="3" name="Text Placeholder 2">
+            <a:extLst>
+              <a:ext uri="{FF2B5EF4-FFF2-40B4-BE49-F238E27FC236}">
+                <a16:creationId xmlns:a16="http://schemas.microsoft.com/office/drawing/2014/main" id="{4139AAE0-125B-4E4C-AF9B-F1C8E644A23E}"/>
+              </a:ext>
+            </a:extLst>
+          </p:cNvPr>
           <p:cNvSpPr>
             <a:spLocks noGrp="1"/>
           </p:cNvSpPr>
@@ -940,24 +1023,14 @@
         </p:nvSpPr>
         <p:spPr>
           <a:xfrm>
-            <a:off x="722313" y="2906713"/>
-            <a:ext cx="7772400" cy="1500187"/>
+            <a:off x="623888" y="4589464"/>
+            <a:ext cx="7886700" cy="1500187"/>
           </a:xfrm>
         </p:spPr>
         <p:txBody>
-          <a:bodyPr anchor="b"/>
+          <a:bodyPr/>
           <a:lstStyle>
             <a:lvl1pPr marL="0" indent="0">
-              <a:buNone/>
-              <a:defRPr sz="2000">
-                <a:solidFill>
-                  <a:schemeClr val="tx1">
-                    <a:tint val="75000"/>
-                  </a:schemeClr>
-                </a:solidFill>
-              </a:defRPr>
-            </a:lvl1pPr>
-            <a:lvl2pPr marL="457200" indent="0">
               <a:buNone/>
               <a:defRPr sz="1800">
                 <a:solidFill>
@@ -966,10 +1039,20 @@
                   </a:schemeClr>
                 </a:solidFill>
               </a:defRPr>
+            </a:lvl1pPr>
+            <a:lvl2pPr marL="342900" indent="0">
+              <a:buNone/>
+              <a:defRPr sz="1500">
+                <a:solidFill>
+                  <a:schemeClr val="tx1">
+                    <a:tint val="75000"/>
+                  </a:schemeClr>
+                </a:solidFill>
+              </a:defRPr>
             </a:lvl2pPr>
-            <a:lvl3pPr marL="914400" indent="0">
+            <a:lvl3pPr marL="685800" indent="0">
               <a:buNone/>
-              <a:defRPr sz="1600">
+              <a:defRPr sz="1350">
                 <a:solidFill>
                   <a:schemeClr val="tx1">
                     <a:tint val="75000"/>
@@ -977,9 +1060,9 @@
                 </a:solidFill>
               </a:defRPr>
             </a:lvl3pPr>
-            <a:lvl4pPr marL="1371600" indent="0">
+            <a:lvl4pPr marL="1028700" indent="0">
               <a:buNone/>
-              <a:defRPr sz="1400">
+              <a:defRPr sz="1200">
                 <a:solidFill>
                   <a:schemeClr val="tx1">
                     <a:tint val="75000"/>
@@ -987,9 +1070,9 @@
                 </a:solidFill>
               </a:defRPr>
             </a:lvl4pPr>
-            <a:lvl5pPr marL="1828800" indent="0">
+            <a:lvl5pPr marL="1371600" indent="0">
               <a:buNone/>
-              <a:defRPr sz="1400">
+              <a:defRPr sz="1200">
                 <a:solidFill>
                   <a:schemeClr val="tx1">
                     <a:tint val="75000"/>
@@ -997,9 +1080,9 @@
                 </a:solidFill>
               </a:defRPr>
             </a:lvl5pPr>
-            <a:lvl6pPr marL="2286000" indent="0">
+            <a:lvl6pPr marL="1714500" indent="0">
               <a:buNone/>
-              <a:defRPr sz="1400">
+              <a:defRPr sz="1200">
                 <a:solidFill>
                   <a:schemeClr val="tx1">
                     <a:tint val="75000"/>
@@ -1007,9 +1090,9 @@
                 </a:solidFill>
               </a:defRPr>
             </a:lvl6pPr>
-            <a:lvl7pPr marL="2743200" indent="0">
+            <a:lvl7pPr marL="2057400" indent="0">
               <a:buNone/>
-              <a:defRPr sz="1400">
+              <a:defRPr sz="1200">
                 <a:solidFill>
                   <a:schemeClr val="tx1">
                     <a:tint val="75000"/>
@@ -1017,9 +1100,9 @@
                 </a:solidFill>
               </a:defRPr>
             </a:lvl7pPr>
-            <a:lvl8pPr marL="3200400" indent="0">
+            <a:lvl8pPr marL="2400300" indent="0">
               <a:buNone/>
-              <a:defRPr sz="1400">
+              <a:defRPr sz="1200">
                 <a:solidFill>
                   <a:schemeClr val="tx1">
                     <a:tint val="75000"/>
@@ -1027,9 +1110,9 @@
                 </a:solidFill>
               </a:defRPr>
             </a:lvl8pPr>
-            <a:lvl9pPr marL="3657600" indent="0">
+            <a:lvl9pPr marL="2743200" indent="0">
               <a:buNone/>
-              <a:defRPr sz="1400">
+              <a:defRPr sz="1200">
                 <a:solidFill>
                   <a:schemeClr val="tx1">
                     <a:tint val="75000"/>
@@ -1042,14 +1125,20 @@
             <a:pPr lvl="0"/>
             <a:r>
               <a:rPr lang="en-US"/>
-              <a:t>Click to edit Master text styles</a:t>
+              <a:t>Edit Master text styles</a:t>
             </a:r>
           </a:p>
         </p:txBody>
       </p:sp>
       <p:sp>
         <p:nvSpPr>
-          <p:cNvPr id="4" name="Date Placeholder 3"/>
+          <p:cNvPr id="4" name="Date Placeholder 3">
+            <a:extLst>
+              <a:ext uri="{FF2B5EF4-FFF2-40B4-BE49-F238E27FC236}">
+                <a16:creationId xmlns:a16="http://schemas.microsoft.com/office/drawing/2014/main" id="{642F290B-893D-4136-9200-DF8135DF7235}"/>
+              </a:ext>
+            </a:extLst>
+          </p:cNvPr>
           <p:cNvSpPr>
             <a:spLocks noGrp="1"/>
           </p:cNvSpPr>
@@ -1064,7 +1153,7 @@
           <a:p>
             <a:fld id="{6DB206C8-F88B-4959-9CD2-3016D27660E1}" type="datetimeFigureOut">
               <a:rPr lang="en-US" smtClean="0"/>
-              <a:t>8/2/2018</a:t>
+              <a:t>8/8/2018</a:t>
             </a:fld>
             <a:endParaRPr lang="en-US"/>
           </a:p>
@@ -1072,7 +1161,13 @@
       </p:sp>
       <p:sp>
         <p:nvSpPr>
-          <p:cNvPr id="5" name="Footer Placeholder 4"/>
+          <p:cNvPr id="5" name="Footer Placeholder 4">
+            <a:extLst>
+              <a:ext uri="{FF2B5EF4-FFF2-40B4-BE49-F238E27FC236}">
+                <a16:creationId xmlns:a16="http://schemas.microsoft.com/office/drawing/2014/main" id="{80F4DF47-45F0-42E5-B874-F748CCFEC2AC}"/>
+              </a:ext>
+            </a:extLst>
+          </p:cNvPr>
           <p:cNvSpPr>
             <a:spLocks noGrp="1"/>
           </p:cNvSpPr>
@@ -1091,7 +1186,13 @@
       </p:sp>
       <p:sp>
         <p:nvSpPr>
-          <p:cNvPr id="6" name="Slide Number Placeholder 5"/>
+          <p:cNvPr id="6" name="Slide Number Placeholder 5">
+            <a:extLst>
+              <a:ext uri="{FF2B5EF4-FFF2-40B4-BE49-F238E27FC236}">
+                <a16:creationId xmlns:a16="http://schemas.microsoft.com/office/drawing/2014/main" id="{7DBA8523-B25B-4727-A7FD-64E6AD02F9BE}"/>
+              </a:ext>
+            </a:extLst>
+          </p:cNvPr>
           <p:cNvSpPr>
             <a:spLocks noGrp="1"/>
           </p:cNvSpPr>
@@ -1115,7 +1216,7 @@
     </p:spTree>
     <p:extLst>
       <p:ext uri="{BB962C8B-B14F-4D97-AF65-F5344CB8AC3E}">
-        <p14:creationId xmlns:p14="http://schemas.microsoft.com/office/powerpoint/2010/main" val="4089243173"/>
+        <p14:creationId xmlns:p14="http://schemas.microsoft.com/office/powerpoint/2010/main" val="2122246277"/>
       </p:ext>
     </p:extLst>
   </p:cSld>
@@ -1144,7 +1245,13 @@
       </p:grpSpPr>
       <p:sp>
         <p:nvSpPr>
-          <p:cNvPr id="2" name="Title 1"/>
+          <p:cNvPr id="2" name="Title 1">
+            <a:extLst>
+              <a:ext uri="{FF2B5EF4-FFF2-40B4-BE49-F238E27FC236}">
+                <a16:creationId xmlns:a16="http://schemas.microsoft.com/office/drawing/2014/main" id="{30C64605-6406-4656-AC0F-77CB3B71929B}"/>
+              </a:ext>
+            </a:extLst>
+          </p:cNvPr>
           <p:cNvSpPr>
             <a:spLocks noGrp="1"/>
           </p:cNvSpPr>
@@ -1166,7 +1273,13 @@
       </p:sp>
       <p:sp>
         <p:nvSpPr>
-          <p:cNvPr id="3" name="Content Placeholder 2"/>
+          <p:cNvPr id="3" name="Content Placeholder 2">
+            <a:extLst>
+              <a:ext uri="{FF2B5EF4-FFF2-40B4-BE49-F238E27FC236}">
+                <a16:creationId xmlns:a16="http://schemas.microsoft.com/office/drawing/2014/main" id="{66D0A543-09BE-4B48-989C-42E28651E428}"/>
+              </a:ext>
+            </a:extLst>
+          </p:cNvPr>
           <p:cNvSpPr>
             <a:spLocks noGrp="1"/>
           </p:cNvSpPr>
@@ -1176,46 +1289,18 @@
         </p:nvSpPr>
         <p:spPr>
           <a:xfrm>
-            <a:off x="457200" y="1600200"/>
-            <a:ext cx="4038600" cy="4525963"/>
+            <a:off x="628650" y="1825625"/>
+            <a:ext cx="3886200" cy="4351338"/>
           </a:xfrm>
         </p:spPr>
         <p:txBody>
           <a:bodyPr/>
-          <a:lstStyle>
-            <a:lvl1pPr>
-              <a:defRPr sz="2800"/>
-            </a:lvl1pPr>
-            <a:lvl2pPr>
-              <a:defRPr sz="2400"/>
-            </a:lvl2pPr>
-            <a:lvl3pPr>
-              <a:defRPr sz="2000"/>
-            </a:lvl3pPr>
-            <a:lvl4pPr>
-              <a:defRPr sz="1800"/>
-            </a:lvl4pPr>
-            <a:lvl5pPr>
-              <a:defRPr sz="1800"/>
-            </a:lvl5pPr>
-            <a:lvl6pPr>
-              <a:defRPr sz="1800"/>
-            </a:lvl6pPr>
-            <a:lvl7pPr>
-              <a:defRPr sz="1800"/>
-            </a:lvl7pPr>
-            <a:lvl8pPr>
-              <a:defRPr sz="1800"/>
-            </a:lvl8pPr>
-            <a:lvl9pPr>
-              <a:defRPr sz="1800"/>
-            </a:lvl9pPr>
-          </a:lstStyle>
+          <a:lstStyle/>
           <a:p>
             <a:pPr lvl="0"/>
             <a:r>
               <a:rPr lang="en-US"/>
-              <a:t>Click to edit Master text styles</a:t>
+              <a:t>Edit Master text styles</a:t>
             </a:r>
           </a:p>
           <a:p>
@@ -1250,7 +1335,13 @@
       </p:sp>
       <p:sp>
         <p:nvSpPr>
-          <p:cNvPr id="4" name="Content Placeholder 3"/>
+          <p:cNvPr id="4" name="Content Placeholder 3">
+            <a:extLst>
+              <a:ext uri="{FF2B5EF4-FFF2-40B4-BE49-F238E27FC236}">
+                <a16:creationId xmlns:a16="http://schemas.microsoft.com/office/drawing/2014/main" id="{CCE54084-99A3-4211-A2B6-D9F424A5BA7B}"/>
+              </a:ext>
+            </a:extLst>
+          </p:cNvPr>
           <p:cNvSpPr>
             <a:spLocks noGrp="1"/>
           </p:cNvSpPr>
@@ -1260,46 +1351,18 @@
         </p:nvSpPr>
         <p:spPr>
           <a:xfrm>
-            <a:off x="4648200" y="1600200"/>
-            <a:ext cx="4038600" cy="4525963"/>
+            <a:off x="4629150" y="1825625"/>
+            <a:ext cx="3886200" cy="4351338"/>
           </a:xfrm>
         </p:spPr>
         <p:txBody>
           <a:bodyPr/>
-          <a:lstStyle>
-            <a:lvl1pPr>
-              <a:defRPr sz="2800"/>
-            </a:lvl1pPr>
-            <a:lvl2pPr>
-              <a:defRPr sz="2400"/>
-            </a:lvl2pPr>
-            <a:lvl3pPr>
-              <a:defRPr sz="2000"/>
-            </a:lvl3pPr>
-            <a:lvl4pPr>
-              <a:defRPr sz="1800"/>
-            </a:lvl4pPr>
-            <a:lvl5pPr>
-              <a:defRPr sz="1800"/>
-            </a:lvl5pPr>
-            <a:lvl6pPr>
-              <a:defRPr sz="1800"/>
-            </a:lvl6pPr>
-            <a:lvl7pPr>
-              <a:defRPr sz="1800"/>
-            </a:lvl7pPr>
-            <a:lvl8pPr>
-              <a:defRPr sz="1800"/>
-            </a:lvl8pPr>
-            <a:lvl9pPr>
-              <a:defRPr sz="1800"/>
-            </a:lvl9pPr>
-          </a:lstStyle>
+          <a:lstStyle/>
           <a:p>
             <a:pPr lvl="0"/>
             <a:r>
               <a:rPr lang="en-US"/>
-              <a:t>Click to edit Master text styles</a:t>
+              <a:t>Edit Master text styles</a:t>
             </a:r>
           </a:p>
           <a:p>
@@ -1334,7 +1397,13 @@
       </p:sp>
       <p:sp>
         <p:nvSpPr>
-          <p:cNvPr id="5" name="Date Placeholder 4"/>
+          <p:cNvPr id="5" name="Date Placeholder 4">
+            <a:extLst>
+              <a:ext uri="{FF2B5EF4-FFF2-40B4-BE49-F238E27FC236}">
+                <a16:creationId xmlns:a16="http://schemas.microsoft.com/office/drawing/2014/main" id="{00F82382-5F23-4479-87CA-4705907FC916}"/>
+              </a:ext>
+            </a:extLst>
+          </p:cNvPr>
           <p:cNvSpPr>
             <a:spLocks noGrp="1"/>
           </p:cNvSpPr>
@@ -1349,7 +1418,7 @@
           <a:p>
             <a:fld id="{6DB206C8-F88B-4959-9CD2-3016D27660E1}" type="datetimeFigureOut">
               <a:rPr lang="en-US" smtClean="0"/>
-              <a:t>8/2/2018</a:t>
+              <a:t>8/8/2018</a:t>
             </a:fld>
             <a:endParaRPr lang="en-US"/>
           </a:p>
@@ -1357,7 +1426,13 @@
       </p:sp>
       <p:sp>
         <p:nvSpPr>
-          <p:cNvPr id="6" name="Footer Placeholder 5"/>
+          <p:cNvPr id="6" name="Footer Placeholder 5">
+            <a:extLst>
+              <a:ext uri="{FF2B5EF4-FFF2-40B4-BE49-F238E27FC236}">
+                <a16:creationId xmlns:a16="http://schemas.microsoft.com/office/drawing/2014/main" id="{89573AC7-0725-4ADF-B5C8-B2F726E4B512}"/>
+              </a:ext>
+            </a:extLst>
+          </p:cNvPr>
           <p:cNvSpPr>
             <a:spLocks noGrp="1"/>
           </p:cNvSpPr>
@@ -1376,7 +1451,13 @@
       </p:sp>
       <p:sp>
         <p:nvSpPr>
-          <p:cNvPr id="7" name="Slide Number Placeholder 6"/>
+          <p:cNvPr id="7" name="Slide Number Placeholder 6">
+            <a:extLst>
+              <a:ext uri="{FF2B5EF4-FFF2-40B4-BE49-F238E27FC236}">
+                <a16:creationId xmlns:a16="http://schemas.microsoft.com/office/drawing/2014/main" id="{43796F14-A486-4CCE-A22A-8EA9103EDC22}"/>
+              </a:ext>
+            </a:extLst>
+          </p:cNvPr>
           <p:cNvSpPr>
             <a:spLocks noGrp="1"/>
           </p:cNvSpPr>
@@ -1400,7 +1481,7 @@
     </p:spTree>
     <p:extLst>
       <p:ext uri="{BB962C8B-B14F-4D97-AF65-F5344CB8AC3E}">
-        <p14:creationId xmlns:p14="http://schemas.microsoft.com/office/powerpoint/2010/main" val="3085400429"/>
+        <p14:creationId xmlns:p14="http://schemas.microsoft.com/office/powerpoint/2010/main" val="2140806681"/>
       </p:ext>
     </p:extLst>
   </p:cSld>
@@ -1429,7 +1510,13 @@
       </p:grpSpPr>
       <p:sp>
         <p:nvSpPr>
-          <p:cNvPr id="2" name="Title 1"/>
+          <p:cNvPr id="2" name="Title 1">
+            <a:extLst>
+              <a:ext uri="{FF2B5EF4-FFF2-40B4-BE49-F238E27FC236}">
+                <a16:creationId xmlns:a16="http://schemas.microsoft.com/office/drawing/2014/main" id="{69B064FD-0194-40FB-B603-269DBB17F95E}"/>
+              </a:ext>
+            </a:extLst>
+          </p:cNvPr>
           <p:cNvSpPr>
             <a:spLocks noGrp="1"/>
           </p:cNvSpPr>
@@ -1437,14 +1524,15 @@
             <p:ph type="title"/>
           </p:nvPr>
         </p:nvSpPr>
-        <p:spPr/>
+        <p:spPr>
+          <a:xfrm>
+            <a:off x="629841" y="365126"/>
+            <a:ext cx="7886700" cy="1325563"/>
+          </a:xfrm>
+        </p:spPr>
         <p:txBody>
           <a:bodyPr/>
-          <a:lstStyle>
-            <a:lvl1pPr>
-              <a:defRPr/>
-            </a:lvl1pPr>
-          </a:lstStyle>
+          <a:lstStyle/>
           <a:p>
             <a:r>
               <a:rPr lang="en-US"/>
@@ -1455,7 +1543,13 @@
       </p:sp>
       <p:sp>
         <p:nvSpPr>
-          <p:cNvPr id="3" name="Text Placeholder 2"/>
+          <p:cNvPr id="3" name="Text Placeholder 2">
+            <a:extLst>
+              <a:ext uri="{FF2B5EF4-FFF2-40B4-BE49-F238E27FC236}">
+                <a16:creationId xmlns:a16="http://schemas.microsoft.com/office/drawing/2014/main" id="{BB9AC1B2-7126-4F19-A4C2-E2429A512685}"/>
+              </a:ext>
+            </a:extLst>
+          </p:cNvPr>
           <p:cNvSpPr>
             <a:spLocks noGrp="1"/>
           </p:cNvSpPr>
@@ -1465,8 +1559,8 @@
         </p:nvSpPr>
         <p:spPr>
           <a:xfrm>
-            <a:off x="457200" y="1535113"/>
-            <a:ext cx="4040188" cy="639762"/>
+            <a:off x="629842" y="1681163"/>
+            <a:ext cx="3868340" cy="823912"/>
           </a:xfrm>
         </p:spPr>
         <p:txBody>
@@ -1474,53 +1568,59 @@
           <a:lstStyle>
             <a:lvl1pPr marL="0" indent="0">
               <a:buNone/>
-              <a:defRPr sz="2400" b="1"/>
+              <a:defRPr sz="1800" b="1"/>
             </a:lvl1pPr>
-            <a:lvl2pPr marL="457200" indent="0">
+            <a:lvl2pPr marL="342900" indent="0">
               <a:buNone/>
-              <a:defRPr sz="2000" b="1"/>
+              <a:defRPr sz="1500" b="1"/>
             </a:lvl2pPr>
-            <a:lvl3pPr marL="914400" indent="0">
+            <a:lvl3pPr marL="685800" indent="0">
               <a:buNone/>
-              <a:defRPr sz="1800" b="1"/>
+              <a:defRPr sz="1350" b="1"/>
             </a:lvl3pPr>
-            <a:lvl4pPr marL="1371600" indent="0">
+            <a:lvl4pPr marL="1028700" indent="0">
               <a:buNone/>
-              <a:defRPr sz="1600" b="1"/>
+              <a:defRPr sz="1200" b="1"/>
             </a:lvl4pPr>
-            <a:lvl5pPr marL="1828800" indent="0">
+            <a:lvl5pPr marL="1371600" indent="0">
               <a:buNone/>
-              <a:defRPr sz="1600" b="1"/>
+              <a:defRPr sz="1200" b="1"/>
             </a:lvl5pPr>
-            <a:lvl6pPr marL="2286000" indent="0">
+            <a:lvl6pPr marL="1714500" indent="0">
               <a:buNone/>
-              <a:defRPr sz="1600" b="1"/>
+              <a:defRPr sz="1200" b="1"/>
             </a:lvl6pPr>
-            <a:lvl7pPr marL="2743200" indent="0">
+            <a:lvl7pPr marL="2057400" indent="0">
               <a:buNone/>
-              <a:defRPr sz="1600" b="1"/>
+              <a:defRPr sz="1200" b="1"/>
             </a:lvl7pPr>
-            <a:lvl8pPr marL="3200400" indent="0">
+            <a:lvl8pPr marL="2400300" indent="0">
               <a:buNone/>
-              <a:defRPr sz="1600" b="1"/>
+              <a:defRPr sz="1200" b="1"/>
             </a:lvl8pPr>
-            <a:lvl9pPr marL="3657600" indent="0">
+            <a:lvl9pPr marL="2743200" indent="0">
               <a:buNone/>
-              <a:defRPr sz="1600" b="1"/>
+              <a:defRPr sz="1200" b="1"/>
             </a:lvl9pPr>
           </a:lstStyle>
           <a:p>
             <a:pPr lvl="0"/>
             <a:r>
               <a:rPr lang="en-US"/>
-              <a:t>Click to edit Master text styles</a:t>
+              <a:t>Edit Master text styles</a:t>
             </a:r>
           </a:p>
         </p:txBody>
       </p:sp>
       <p:sp>
         <p:nvSpPr>
-          <p:cNvPr id="4" name="Content Placeholder 3"/>
+          <p:cNvPr id="4" name="Content Placeholder 3">
+            <a:extLst>
+              <a:ext uri="{FF2B5EF4-FFF2-40B4-BE49-F238E27FC236}">
+                <a16:creationId xmlns:a16="http://schemas.microsoft.com/office/drawing/2014/main" id="{A7606E40-AC67-4BEF-99EF-B3A0B200F008}"/>
+              </a:ext>
+            </a:extLst>
+          </p:cNvPr>
           <p:cNvSpPr>
             <a:spLocks noGrp="1"/>
           </p:cNvSpPr>
@@ -1530,46 +1630,18 @@
         </p:nvSpPr>
         <p:spPr>
           <a:xfrm>
-            <a:off x="457200" y="2174875"/>
-            <a:ext cx="4040188" cy="3951288"/>
+            <a:off x="629842" y="2505075"/>
+            <a:ext cx="3868340" cy="3684588"/>
           </a:xfrm>
         </p:spPr>
         <p:txBody>
           <a:bodyPr/>
-          <a:lstStyle>
-            <a:lvl1pPr>
-              <a:defRPr sz="2400"/>
-            </a:lvl1pPr>
-            <a:lvl2pPr>
-              <a:defRPr sz="2000"/>
-            </a:lvl2pPr>
-            <a:lvl3pPr>
-              <a:defRPr sz="1800"/>
-            </a:lvl3pPr>
-            <a:lvl4pPr>
-              <a:defRPr sz="1600"/>
-            </a:lvl4pPr>
-            <a:lvl5pPr>
-              <a:defRPr sz="1600"/>
-            </a:lvl5pPr>
-            <a:lvl6pPr>
-              <a:defRPr sz="1600"/>
-            </a:lvl6pPr>
-            <a:lvl7pPr>
-              <a:defRPr sz="1600"/>
-            </a:lvl7pPr>
-            <a:lvl8pPr>
-              <a:defRPr sz="1600"/>
-            </a:lvl8pPr>
-            <a:lvl9pPr>
-              <a:defRPr sz="1600"/>
-            </a:lvl9pPr>
-          </a:lstStyle>
+          <a:lstStyle/>
           <a:p>
             <a:pPr lvl="0"/>
             <a:r>
               <a:rPr lang="en-US"/>
-              <a:t>Click to edit Master text styles</a:t>
+              <a:t>Edit Master text styles</a:t>
             </a:r>
           </a:p>
           <a:p>
@@ -1604,7 +1676,13 @@
       </p:sp>
       <p:sp>
         <p:nvSpPr>
-          <p:cNvPr id="5" name="Text Placeholder 4"/>
+          <p:cNvPr id="5" name="Text Placeholder 4">
+            <a:extLst>
+              <a:ext uri="{FF2B5EF4-FFF2-40B4-BE49-F238E27FC236}">
+                <a16:creationId xmlns:a16="http://schemas.microsoft.com/office/drawing/2014/main" id="{7A40CD69-027F-462E-93C3-EC9DA56F4D29}"/>
+              </a:ext>
+            </a:extLst>
+          </p:cNvPr>
           <p:cNvSpPr>
             <a:spLocks noGrp="1"/>
           </p:cNvSpPr>
@@ -1614,8 +1692,8 @@
         </p:nvSpPr>
         <p:spPr>
           <a:xfrm>
-            <a:off x="4645025" y="1535113"/>
-            <a:ext cx="4041775" cy="639762"/>
+            <a:off x="4629150" y="1681163"/>
+            <a:ext cx="3887391" cy="823912"/>
           </a:xfrm>
         </p:spPr>
         <p:txBody>
@@ -1623,53 +1701,59 @@
           <a:lstStyle>
             <a:lvl1pPr marL="0" indent="0">
               <a:buNone/>
-              <a:defRPr sz="2400" b="1"/>
+              <a:defRPr sz="1800" b="1"/>
             </a:lvl1pPr>
-            <a:lvl2pPr marL="457200" indent="0">
+            <a:lvl2pPr marL="342900" indent="0">
               <a:buNone/>
-              <a:defRPr sz="2000" b="1"/>
+              <a:defRPr sz="1500" b="1"/>
             </a:lvl2pPr>
-            <a:lvl3pPr marL="914400" indent="0">
+            <a:lvl3pPr marL="685800" indent="0">
               <a:buNone/>
-              <a:defRPr sz="1800" b="1"/>
+              <a:defRPr sz="1350" b="1"/>
             </a:lvl3pPr>
-            <a:lvl4pPr marL="1371600" indent="0">
+            <a:lvl4pPr marL="1028700" indent="0">
               <a:buNone/>
-              <a:defRPr sz="1600" b="1"/>
+              <a:defRPr sz="1200" b="1"/>
             </a:lvl4pPr>
-            <a:lvl5pPr marL="1828800" indent="0">
+            <a:lvl5pPr marL="1371600" indent="0">
               <a:buNone/>
-              <a:defRPr sz="1600" b="1"/>
+              <a:defRPr sz="1200" b="1"/>
             </a:lvl5pPr>
-            <a:lvl6pPr marL="2286000" indent="0">
+            <a:lvl6pPr marL="1714500" indent="0">
               <a:buNone/>
-              <a:defRPr sz="1600" b="1"/>
+              <a:defRPr sz="1200" b="1"/>
             </a:lvl6pPr>
-            <a:lvl7pPr marL="2743200" indent="0">
+            <a:lvl7pPr marL="2057400" indent="0">
               <a:buNone/>
-              <a:defRPr sz="1600" b="1"/>
+              <a:defRPr sz="1200" b="1"/>
             </a:lvl7pPr>
-            <a:lvl8pPr marL="3200400" indent="0">
+            <a:lvl8pPr marL="2400300" indent="0">
               <a:buNone/>
-              <a:defRPr sz="1600" b="1"/>
+              <a:defRPr sz="1200" b="1"/>
             </a:lvl8pPr>
-            <a:lvl9pPr marL="3657600" indent="0">
+            <a:lvl9pPr marL="2743200" indent="0">
               <a:buNone/>
-              <a:defRPr sz="1600" b="1"/>
+              <a:defRPr sz="1200" b="1"/>
             </a:lvl9pPr>
           </a:lstStyle>
           <a:p>
             <a:pPr lvl="0"/>
             <a:r>
               <a:rPr lang="en-US"/>
-              <a:t>Click to edit Master text styles</a:t>
+              <a:t>Edit Master text styles</a:t>
             </a:r>
           </a:p>
         </p:txBody>
       </p:sp>
       <p:sp>
         <p:nvSpPr>
-          <p:cNvPr id="6" name="Content Placeholder 5"/>
+          <p:cNvPr id="6" name="Content Placeholder 5">
+            <a:extLst>
+              <a:ext uri="{FF2B5EF4-FFF2-40B4-BE49-F238E27FC236}">
+                <a16:creationId xmlns:a16="http://schemas.microsoft.com/office/drawing/2014/main" id="{3EA3852A-A7E4-4D27-805F-0D4A0FF53122}"/>
+              </a:ext>
+            </a:extLst>
+          </p:cNvPr>
           <p:cNvSpPr>
             <a:spLocks noGrp="1"/>
           </p:cNvSpPr>
@@ -1679,46 +1763,18 @@
         </p:nvSpPr>
         <p:spPr>
           <a:xfrm>
-            <a:off x="4645025" y="2174875"/>
-            <a:ext cx="4041775" cy="3951288"/>
+            <a:off x="4629150" y="2505075"/>
+            <a:ext cx="3887391" cy="3684588"/>
           </a:xfrm>
         </p:spPr>
         <p:txBody>
           <a:bodyPr/>
-          <a:lstStyle>
-            <a:lvl1pPr>
-              <a:defRPr sz="2400"/>
-            </a:lvl1pPr>
-            <a:lvl2pPr>
-              <a:defRPr sz="2000"/>
-            </a:lvl2pPr>
-            <a:lvl3pPr>
-              <a:defRPr sz="1800"/>
-            </a:lvl3pPr>
-            <a:lvl4pPr>
-              <a:defRPr sz="1600"/>
-            </a:lvl4pPr>
-            <a:lvl5pPr>
-              <a:defRPr sz="1600"/>
-            </a:lvl5pPr>
-            <a:lvl6pPr>
-              <a:defRPr sz="1600"/>
-            </a:lvl6pPr>
-            <a:lvl7pPr>
-              <a:defRPr sz="1600"/>
-            </a:lvl7pPr>
-            <a:lvl8pPr>
-              <a:defRPr sz="1600"/>
-            </a:lvl8pPr>
-            <a:lvl9pPr>
-              <a:defRPr sz="1600"/>
-            </a:lvl9pPr>
-          </a:lstStyle>
+          <a:lstStyle/>
           <a:p>
             <a:pPr lvl="0"/>
             <a:r>
               <a:rPr lang="en-US"/>
-              <a:t>Click to edit Master text styles</a:t>
+              <a:t>Edit Master text styles</a:t>
             </a:r>
           </a:p>
           <a:p>
@@ -1753,7 +1809,13 @@
       </p:sp>
       <p:sp>
         <p:nvSpPr>
-          <p:cNvPr id="7" name="Date Placeholder 6"/>
+          <p:cNvPr id="7" name="Date Placeholder 6">
+            <a:extLst>
+              <a:ext uri="{FF2B5EF4-FFF2-40B4-BE49-F238E27FC236}">
+                <a16:creationId xmlns:a16="http://schemas.microsoft.com/office/drawing/2014/main" id="{44924881-72A8-42FA-B381-AD2AC749EE80}"/>
+              </a:ext>
+            </a:extLst>
+          </p:cNvPr>
           <p:cNvSpPr>
             <a:spLocks noGrp="1"/>
           </p:cNvSpPr>
@@ -1768,7 +1830,7 @@
           <a:p>
             <a:fld id="{6DB206C8-F88B-4959-9CD2-3016D27660E1}" type="datetimeFigureOut">
               <a:rPr lang="en-US" smtClean="0"/>
-              <a:t>8/2/2018</a:t>
+              <a:t>8/8/2018</a:t>
             </a:fld>
             <a:endParaRPr lang="en-US"/>
           </a:p>
@@ -1776,7 +1838,13 @@
       </p:sp>
       <p:sp>
         <p:nvSpPr>
-          <p:cNvPr id="8" name="Footer Placeholder 7"/>
+          <p:cNvPr id="8" name="Footer Placeholder 7">
+            <a:extLst>
+              <a:ext uri="{FF2B5EF4-FFF2-40B4-BE49-F238E27FC236}">
+                <a16:creationId xmlns:a16="http://schemas.microsoft.com/office/drawing/2014/main" id="{B39215EF-BC82-4D09-A1A1-FFDE0342C68F}"/>
+              </a:ext>
+            </a:extLst>
+          </p:cNvPr>
           <p:cNvSpPr>
             <a:spLocks noGrp="1"/>
           </p:cNvSpPr>
@@ -1795,7 +1863,13 @@
       </p:sp>
       <p:sp>
         <p:nvSpPr>
-          <p:cNvPr id="9" name="Slide Number Placeholder 8"/>
+          <p:cNvPr id="9" name="Slide Number Placeholder 8">
+            <a:extLst>
+              <a:ext uri="{FF2B5EF4-FFF2-40B4-BE49-F238E27FC236}">
+                <a16:creationId xmlns:a16="http://schemas.microsoft.com/office/drawing/2014/main" id="{BA57B9B0-DDF2-46D8-B64C-C41043F5928C}"/>
+              </a:ext>
+            </a:extLst>
+          </p:cNvPr>
           <p:cNvSpPr>
             <a:spLocks noGrp="1"/>
           </p:cNvSpPr>
@@ -1819,7 +1893,7 @@
     </p:spTree>
     <p:extLst>
       <p:ext uri="{BB962C8B-B14F-4D97-AF65-F5344CB8AC3E}">
-        <p14:creationId xmlns:p14="http://schemas.microsoft.com/office/powerpoint/2010/main" val="1030886299"/>
+        <p14:creationId xmlns:p14="http://schemas.microsoft.com/office/powerpoint/2010/main" val="3464121076"/>
       </p:ext>
     </p:extLst>
   </p:cSld>
@@ -1848,7 +1922,13 @@
       </p:grpSpPr>
       <p:sp>
         <p:nvSpPr>
-          <p:cNvPr id="2" name="Title 1"/>
+          <p:cNvPr id="2" name="Title 1">
+            <a:extLst>
+              <a:ext uri="{FF2B5EF4-FFF2-40B4-BE49-F238E27FC236}">
+                <a16:creationId xmlns:a16="http://schemas.microsoft.com/office/drawing/2014/main" id="{8AB07EE8-F276-44A7-982A-88434F653CB4}"/>
+              </a:ext>
+            </a:extLst>
+          </p:cNvPr>
           <p:cNvSpPr>
             <a:spLocks noGrp="1"/>
           </p:cNvSpPr>
@@ -1870,7 +1950,13 @@
       </p:sp>
       <p:sp>
         <p:nvSpPr>
-          <p:cNvPr id="3" name="Date Placeholder 2"/>
+          <p:cNvPr id="3" name="Date Placeholder 2">
+            <a:extLst>
+              <a:ext uri="{FF2B5EF4-FFF2-40B4-BE49-F238E27FC236}">
+                <a16:creationId xmlns:a16="http://schemas.microsoft.com/office/drawing/2014/main" id="{9F41D249-D104-4124-80FC-CB65B964E78C}"/>
+              </a:ext>
+            </a:extLst>
+          </p:cNvPr>
           <p:cNvSpPr>
             <a:spLocks noGrp="1"/>
           </p:cNvSpPr>
@@ -1885,7 +1971,7 @@
           <a:p>
             <a:fld id="{6DB206C8-F88B-4959-9CD2-3016D27660E1}" type="datetimeFigureOut">
               <a:rPr lang="en-US" smtClean="0"/>
-              <a:t>8/2/2018</a:t>
+              <a:t>8/8/2018</a:t>
             </a:fld>
             <a:endParaRPr lang="en-US"/>
           </a:p>
@@ -1893,7 +1979,13 @@
       </p:sp>
       <p:sp>
         <p:nvSpPr>
-          <p:cNvPr id="4" name="Footer Placeholder 3"/>
+          <p:cNvPr id="4" name="Footer Placeholder 3">
+            <a:extLst>
+              <a:ext uri="{FF2B5EF4-FFF2-40B4-BE49-F238E27FC236}">
+                <a16:creationId xmlns:a16="http://schemas.microsoft.com/office/drawing/2014/main" id="{1F84F6F8-CC80-4164-A8A2-74C6FE579C7C}"/>
+              </a:ext>
+            </a:extLst>
+          </p:cNvPr>
           <p:cNvSpPr>
             <a:spLocks noGrp="1"/>
           </p:cNvSpPr>
@@ -1912,7 +2004,13 @@
       </p:sp>
       <p:sp>
         <p:nvSpPr>
-          <p:cNvPr id="5" name="Slide Number Placeholder 4"/>
+          <p:cNvPr id="5" name="Slide Number Placeholder 4">
+            <a:extLst>
+              <a:ext uri="{FF2B5EF4-FFF2-40B4-BE49-F238E27FC236}">
+                <a16:creationId xmlns:a16="http://schemas.microsoft.com/office/drawing/2014/main" id="{11FB4411-515A-4D2A-9C0E-522CC5B4ADA5}"/>
+              </a:ext>
+            </a:extLst>
+          </p:cNvPr>
           <p:cNvSpPr>
             <a:spLocks noGrp="1"/>
           </p:cNvSpPr>
@@ -1936,7 +2034,7 @@
     </p:spTree>
     <p:extLst>
       <p:ext uri="{BB962C8B-B14F-4D97-AF65-F5344CB8AC3E}">
-        <p14:creationId xmlns:p14="http://schemas.microsoft.com/office/powerpoint/2010/main" val="1295735525"/>
+        <p14:creationId xmlns:p14="http://schemas.microsoft.com/office/powerpoint/2010/main" val="347964398"/>
       </p:ext>
     </p:extLst>
   </p:cSld>
@@ -1965,7 +2063,13 @@
       </p:grpSpPr>
       <p:sp>
         <p:nvSpPr>
-          <p:cNvPr id="2" name="Date Placeholder 1"/>
+          <p:cNvPr id="2" name="Date Placeholder 1">
+            <a:extLst>
+              <a:ext uri="{FF2B5EF4-FFF2-40B4-BE49-F238E27FC236}">
+                <a16:creationId xmlns:a16="http://schemas.microsoft.com/office/drawing/2014/main" id="{0C796E03-CE6B-4538-BA62-1A053C7E0006}"/>
+              </a:ext>
+            </a:extLst>
+          </p:cNvPr>
           <p:cNvSpPr>
             <a:spLocks noGrp="1"/>
           </p:cNvSpPr>
@@ -1980,7 +2084,7 @@
           <a:p>
             <a:fld id="{6DB206C8-F88B-4959-9CD2-3016D27660E1}" type="datetimeFigureOut">
               <a:rPr lang="en-US" smtClean="0"/>
-              <a:t>8/2/2018</a:t>
+              <a:t>8/8/2018</a:t>
             </a:fld>
             <a:endParaRPr lang="en-US"/>
           </a:p>
@@ -1988,7 +2092,13 @@
       </p:sp>
       <p:sp>
         <p:nvSpPr>
-          <p:cNvPr id="3" name="Footer Placeholder 2"/>
+          <p:cNvPr id="3" name="Footer Placeholder 2">
+            <a:extLst>
+              <a:ext uri="{FF2B5EF4-FFF2-40B4-BE49-F238E27FC236}">
+                <a16:creationId xmlns:a16="http://schemas.microsoft.com/office/drawing/2014/main" id="{8CD5F4E1-FF8F-4545-A106-8E8B451D6187}"/>
+              </a:ext>
+            </a:extLst>
+          </p:cNvPr>
           <p:cNvSpPr>
             <a:spLocks noGrp="1"/>
           </p:cNvSpPr>
@@ -2007,7 +2117,13 @@
       </p:sp>
       <p:sp>
         <p:nvSpPr>
-          <p:cNvPr id="4" name="Slide Number Placeholder 3"/>
+          <p:cNvPr id="4" name="Slide Number Placeholder 3">
+            <a:extLst>
+              <a:ext uri="{FF2B5EF4-FFF2-40B4-BE49-F238E27FC236}">
+                <a16:creationId xmlns:a16="http://schemas.microsoft.com/office/drawing/2014/main" id="{9EA17FB2-D13D-4472-830D-91E7200E5972}"/>
+              </a:ext>
+            </a:extLst>
+          </p:cNvPr>
           <p:cNvSpPr>
             <a:spLocks noGrp="1"/>
           </p:cNvSpPr>
@@ -2031,7 +2147,7 @@
     </p:spTree>
     <p:extLst>
       <p:ext uri="{BB962C8B-B14F-4D97-AF65-F5344CB8AC3E}">
-        <p14:creationId xmlns:p14="http://schemas.microsoft.com/office/powerpoint/2010/main" val="1879183053"/>
+        <p14:creationId xmlns:p14="http://schemas.microsoft.com/office/powerpoint/2010/main" val="895217778"/>
       </p:ext>
     </p:extLst>
   </p:cSld>
@@ -2060,7 +2176,13 @@
       </p:grpSpPr>
       <p:sp>
         <p:nvSpPr>
-          <p:cNvPr id="2" name="Title 1"/>
+          <p:cNvPr id="2" name="Title 1">
+            <a:extLst>
+              <a:ext uri="{FF2B5EF4-FFF2-40B4-BE49-F238E27FC236}">
+                <a16:creationId xmlns:a16="http://schemas.microsoft.com/office/drawing/2014/main" id="{19F4B1CE-E1EF-4731-BDA3-824447894181}"/>
+              </a:ext>
+            </a:extLst>
+          </p:cNvPr>
           <p:cNvSpPr>
             <a:spLocks noGrp="1"/>
           </p:cNvSpPr>
@@ -2070,15 +2192,15 @@
         </p:nvSpPr>
         <p:spPr>
           <a:xfrm>
-            <a:off x="457200" y="273050"/>
-            <a:ext cx="3008313" cy="1162050"/>
+            <a:off x="629841" y="457200"/>
+            <a:ext cx="2949178" cy="1600200"/>
           </a:xfrm>
         </p:spPr>
         <p:txBody>
           <a:bodyPr anchor="b"/>
           <a:lstStyle>
-            <a:lvl1pPr algn="l">
-              <a:defRPr sz="2000" b="1"/>
+            <a:lvl1pPr>
+              <a:defRPr sz="2400"/>
             </a:lvl1pPr>
           </a:lstStyle>
           <a:p>
@@ -2091,7 +2213,13 @@
       </p:sp>
       <p:sp>
         <p:nvSpPr>
-          <p:cNvPr id="3" name="Content Placeholder 2"/>
+          <p:cNvPr id="3" name="Content Placeholder 2">
+            <a:extLst>
+              <a:ext uri="{FF2B5EF4-FFF2-40B4-BE49-F238E27FC236}">
+                <a16:creationId xmlns:a16="http://schemas.microsoft.com/office/drawing/2014/main" id="{0AFF8D69-9355-455A-96F6-E33AFDAE89C1}"/>
+              </a:ext>
+            </a:extLst>
+          </p:cNvPr>
           <p:cNvSpPr>
             <a:spLocks noGrp="1"/>
           </p:cNvSpPr>
@@ -2101,46 +2229,46 @@
         </p:nvSpPr>
         <p:spPr>
           <a:xfrm>
-            <a:off x="3575050" y="273050"/>
-            <a:ext cx="5111750" cy="5853113"/>
+            <a:off x="3887391" y="987426"/>
+            <a:ext cx="4629150" cy="4873625"/>
           </a:xfrm>
         </p:spPr>
         <p:txBody>
           <a:bodyPr/>
           <a:lstStyle>
             <a:lvl1pPr>
-              <a:defRPr sz="3200"/>
+              <a:defRPr sz="2400"/>
             </a:lvl1pPr>
             <a:lvl2pPr>
-              <a:defRPr sz="2800"/>
+              <a:defRPr sz="2100"/>
             </a:lvl2pPr>
             <a:lvl3pPr>
-              <a:defRPr sz="2400"/>
+              <a:defRPr sz="1800"/>
             </a:lvl3pPr>
             <a:lvl4pPr>
-              <a:defRPr sz="2000"/>
+              <a:defRPr sz="1500"/>
             </a:lvl4pPr>
             <a:lvl5pPr>
-              <a:defRPr sz="2000"/>
+              <a:defRPr sz="1500"/>
             </a:lvl5pPr>
             <a:lvl6pPr>
-              <a:defRPr sz="2000"/>
+              <a:defRPr sz="1500"/>
             </a:lvl6pPr>
             <a:lvl7pPr>
-              <a:defRPr sz="2000"/>
+              <a:defRPr sz="1500"/>
             </a:lvl7pPr>
             <a:lvl8pPr>
-              <a:defRPr sz="2000"/>
+              <a:defRPr sz="1500"/>
             </a:lvl8pPr>
             <a:lvl9pPr>
-              <a:defRPr sz="2000"/>
+              <a:defRPr sz="1500"/>
             </a:lvl9pPr>
           </a:lstStyle>
           <a:p>
             <a:pPr lvl="0"/>
             <a:r>
               <a:rPr lang="en-US"/>
-              <a:t>Click to edit Master text styles</a:t>
+              <a:t>Edit Master text styles</a:t>
             </a:r>
           </a:p>
           <a:p>
@@ -2175,7 +2303,13 @@
       </p:sp>
       <p:sp>
         <p:nvSpPr>
-          <p:cNvPr id="4" name="Text Placeholder 3"/>
+          <p:cNvPr id="4" name="Text Placeholder 3">
+            <a:extLst>
+              <a:ext uri="{FF2B5EF4-FFF2-40B4-BE49-F238E27FC236}">
+                <a16:creationId xmlns:a16="http://schemas.microsoft.com/office/drawing/2014/main" id="{A122B9FB-7FFE-4A06-8A88-DBBEF5DDF2A5}"/>
+              </a:ext>
+            </a:extLst>
+          </p:cNvPr>
           <p:cNvSpPr>
             <a:spLocks noGrp="1"/>
           </p:cNvSpPr>
@@ -2185,8 +2319,8 @@
         </p:nvSpPr>
         <p:spPr>
           <a:xfrm>
-            <a:off x="457200" y="1435100"/>
-            <a:ext cx="3008313" cy="4691063"/>
+            <a:off x="629841" y="2057400"/>
+            <a:ext cx="2949178" cy="3811588"/>
           </a:xfrm>
         </p:spPr>
         <p:txBody>
@@ -2194,53 +2328,59 @@
           <a:lstStyle>
             <a:lvl1pPr marL="0" indent="0">
               <a:buNone/>
-              <a:defRPr sz="1400"/>
+              <a:defRPr sz="1200"/>
             </a:lvl1pPr>
-            <a:lvl2pPr marL="457200" indent="0">
+            <a:lvl2pPr marL="342900" indent="0">
               <a:buNone/>
-              <a:defRPr sz="1200"/>
+              <a:defRPr sz="1050"/>
             </a:lvl2pPr>
-            <a:lvl3pPr marL="914400" indent="0">
-              <a:buNone/>
-              <a:defRPr sz="1000"/>
-            </a:lvl3pPr>
-            <a:lvl4pPr marL="1371600" indent="0">
+            <a:lvl3pPr marL="685800" indent="0">
               <a:buNone/>
               <a:defRPr sz="900"/>
+            </a:lvl3pPr>
+            <a:lvl4pPr marL="1028700" indent="0">
+              <a:buNone/>
+              <a:defRPr sz="750"/>
             </a:lvl4pPr>
-            <a:lvl5pPr marL="1828800" indent="0">
+            <a:lvl5pPr marL="1371600" indent="0">
               <a:buNone/>
-              <a:defRPr sz="900"/>
+              <a:defRPr sz="750"/>
             </a:lvl5pPr>
-            <a:lvl6pPr marL="2286000" indent="0">
+            <a:lvl6pPr marL="1714500" indent="0">
               <a:buNone/>
-              <a:defRPr sz="900"/>
+              <a:defRPr sz="750"/>
             </a:lvl6pPr>
-            <a:lvl7pPr marL="2743200" indent="0">
+            <a:lvl7pPr marL="2057400" indent="0">
               <a:buNone/>
-              <a:defRPr sz="900"/>
+              <a:defRPr sz="750"/>
             </a:lvl7pPr>
-            <a:lvl8pPr marL="3200400" indent="0">
+            <a:lvl8pPr marL="2400300" indent="0">
               <a:buNone/>
-              <a:defRPr sz="900"/>
+              <a:defRPr sz="750"/>
             </a:lvl8pPr>
-            <a:lvl9pPr marL="3657600" indent="0">
+            <a:lvl9pPr marL="2743200" indent="0">
               <a:buNone/>
-              <a:defRPr sz="900"/>
+              <a:defRPr sz="750"/>
             </a:lvl9pPr>
           </a:lstStyle>
           <a:p>
             <a:pPr lvl="0"/>
             <a:r>
               <a:rPr lang="en-US"/>
-              <a:t>Click to edit Master text styles</a:t>
+              <a:t>Edit Master text styles</a:t>
             </a:r>
           </a:p>
         </p:txBody>
       </p:sp>
       <p:sp>
         <p:nvSpPr>
-          <p:cNvPr id="5" name="Date Placeholder 4"/>
+          <p:cNvPr id="5" name="Date Placeholder 4">
+            <a:extLst>
+              <a:ext uri="{FF2B5EF4-FFF2-40B4-BE49-F238E27FC236}">
+                <a16:creationId xmlns:a16="http://schemas.microsoft.com/office/drawing/2014/main" id="{E49CF1A5-7FFC-4148-8BD2-2E27F83AD17B}"/>
+              </a:ext>
+            </a:extLst>
+          </p:cNvPr>
           <p:cNvSpPr>
             <a:spLocks noGrp="1"/>
           </p:cNvSpPr>
@@ -2255,7 +2395,7 @@
           <a:p>
             <a:fld id="{6DB206C8-F88B-4959-9CD2-3016D27660E1}" type="datetimeFigureOut">
               <a:rPr lang="en-US" smtClean="0"/>
-              <a:t>8/2/2018</a:t>
+              <a:t>8/8/2018</a:t>
             </a:fld>
             <a:endParaRPr lang="en-US"/>
           </a:p>
@@ -2263,7 +2403,13 @@
       </p:sp>
       <p:sp>
         <p:nvSpPr>
-          <p:cNvPr id="6" name="Footer Placeholder 5"/>
+          <p:cNvPr id="6" name="Footer Placeholder 5">
+            <a:extLst>
+              <a:ext uri="{FF2B5EF4-FFF2-40B4-BE49-F238E27FC236}">
+                <a16:creationId xmlns:a16="http://schemas.microsoft.com/office/drawing/2014/main" id="{B3552167-8D52-43CD-8F26-D4ABC5C0EA86}"/>
+              </a:ext>
+            </a:extLst>
+          </p:cNvPr>
           <p:cNvSpPr>
             <a:spLocks noGrp="1"/>
           </p:cNvSpPr>
@@ -2282,7 +2428,13 @@
       </p:sp>
       <p:sp>
         <p:nvSpPr>
-          <p:cNvPr id="7" name="Slide Number Placeholder 6"/>
+          <p:cNvPr id="7" name="Slide Number Placeholder 6">
+            <a:extLst>
+              <a:ext uri="{FF2B5EF4-FFF2-40B4-BE49-F238E27FC236}">
+                <a16:creationId xmlns:a16="http://schemas.microsoft.com/office/drawing/2014/main" id="{68D2CABB-69E3-451F-8DCE-9ACADBF9500D}"/>
+              </a:ext>
+            </a:extLst>
+          </p:cNvPr>
           <p:cNvSpPr>
             <a:spLocks noGrp="1"/>
           </p:cNvSpPr>
@@ -2306,7 +2458,7 @@
     </p:spTree>
     <p:extLst>
       <p:ext uri="{BB962C8B-B14F-4D97-AF65-F5344CB8AC3E}">
-        <p14:creationId xmlns:p14="http://schemas.microsoft.com/office/powerpoint/2010/main" val="1624838179"/>
+        <p14:creationId xmlns:p14="http://schemas.microsoft.com/office/powerpoint/2010/main" val="4022945196"/>
       </p:ext>
     </p:extLst>
   </p:cSld>
@@ -2335,7 +2487,13 @@
       </p:grpSpPr>
       <p:sp>
         <p:nvSpPr>
-          <p:cNvPr id="2" name="Title 1"/>
+          <p:cNvPr id="2" name="Title 1">
+            <a:extLst>
+              <a:ext uri="{FF2B5EF4-FFF2-40B4-BE49-F238E27FC236}">
+                <a16:creationId xmlns:a16="http://schemas.microsoft.com/office/drawing/2014/main" id="{56AE5C35-62FE-4083-B802-16E939F20C49}"/>
+              </a:ext>
+            </a:extLst>
+          </p:cNvPr>
           <p:cNvSpPr>
             <a:spLocks noGrp="1"/>
           </p:cNvSpPr>
@@ -2345,15 +2503,15 @@
         </p:nvSpPr>
         <p:spPr>
           <a:xfrm>
-            <a:off x="1792288" y="4800600"/>
-            <a:ext cx="5486400" cy="566738"/>
+            <a:off x="629841" y="457200"/>
+            <a:ext cx="2949178" cy="1600200"/>
           </a:xfrm>
         </p:spPr>
         <p:txBody>
           <a:bodyPr anchor="b"/>
           <a:lstStyle>
-            <a:lvl1pPr algn="l">
-              <a:defRPr sz="2000" b="1"/>
+            <a:lvl1pPr>
+              <a:defRPr sz="2400"/>
             </a:lvl1pPr>
           </a:lstStyle>
           <a:p>
@@ -2366,7 +2524,13 @@
       </p:sp>
       <p:sp>
         <p:nvSpPr>
-          <p:cNvPr id="3" name="Picture Placeholder 2"/>
+          <p:cNvPr id="3" name="Picture Placeholder 2">
+            <a:extLst>
+              <a:ext uri="{FF2B5EF4-FFF2-40B4-BE49-F238E27FC236}">
+                <a16:creationId xmlns:a16="http://schemas.microsoft.com/office/drawing/2014/main" id="{B39C27BF-90F4-4FAB-8BCE-24208AFA03BD}"/>
+              </a:ext>
+            </a:extLst>
+          </p:cNvPr>
           <p:cNvSpPr>
             <a:spLocks noGrp="1"/>
           </p:cNvSpPr>
@@ -2376,8 +2540,8 @@
         </p:nvSpPr>
         <p:spPr>
           <a:xfrm>
-            <a:off x="1792288" y="612775"/>
-            <a:ext cx="5486400" cy="4114800"/>
+            <a:off x="3887391" y="987426"/>
+            <a:ext cx="4629150" cy="4873625"/>
           </a:xfrm>
         </p:spPr>
         <p:txBody>
@@ -2385,39 +2549,39 @@
           <a:lstStyle>
             <a:lvl1pPr marL="0" indent="0">
               <a:buNone/>
-              <a:defRPr sz="3200"/>
+              <a:defRPr sz="2400"/>
             </a:lvl1pPr>
-            <a:lvl2pPr marL="457200" indent="0">
+            <a:lvl2pPr marL="342900" indent="0">
               <a:buNone/>
-              <a:defRPr sz="2800"/>
+              <a:defRPr sz="2100"/>
             </a:lvl2pPr>
-            <a:lvl3pPr marL="914400" indent="0">
+            <a:lvl3pPr marL="685800" indent="0">
               <a:buNone/>
-              <a:defRPr sz="2400"/>
+              <a:defRPr sz="1800"/>
             </a:lvl3pPr>
-            <a:lvl4pPr marL="1371600" indent="0">
+            <a:lvl4pPr marL="1028700" indent="0">
               <a:buNone/>
-              <a:defRPr sz="2000"/>
+              <a:defRPr sz="1500"/>
             </a:lvl4pPr>
-            <a:lvl5pPr marL="1828800" indent="0">
+            <a:lvl5pPr marL="1371600" indent="0">
               <a:buNone/>
-              <a:defRPr sz="2000"/>
+              <a:defRPr sz="1500"/>
             </a:lvl5pPr>
-            <a:lvl6pPr marL="2286000" indent="0">
+            <a:lvl6pPr marL="1714500" indent="0">
               <a:buNone/>
-              <a:defRPr sz="2000"/>
+              <a:defRPr sz="1500"/>
             </a:lvl6pPr>
-            <a:lvl7pPr marL="2743200" indent="0">
+            <a:lvl7pPr marL="2057400" indent="0">
               <a:buNone/>
-              <a:defRPr sz="2000"/>
+              <a:defRPr sz="1500"/>
             </a:lvl7pPr>
-            <a:lvl8pPr marL="3200400" indent="0">
+            <a:lvl8pPr marL="2400300" indent="0">
               <a:buNone/>
-              <a:defRPr sz="2000"/>
+              <a:defRPr sz="1500"/>
             </a:lvl8pPr>
-            <a:lvl9pPr marL="3657600" indent="0">
+            <a:lvl9pPr marL="2743200" indent="0">
               <a:buNone/>
-              <a:defRPr sz="2000"/>
+              <a:defRPr sz="1500"/>
             </a:lvl9pPr>
           </a:lstStyle>
           <a:p>
@@ -2427,7 +2591,13 @@
       </p:sp>
       <p:sp>
         <p:nvSpPr>
-          <p:cNvPr id="4" name="Text Placeholder 3"/>
+          <p:cNvPr id="4" name="Text Placeholder 3">
+            <a:extLst>
+              <a:ext uri="{FF2B5EF4-FFF2-40B4-BE49-F238E27FC236}">
+                <a16:creationId xmlns:a16="http://schemas.microsoft.com/office/drawing/2014/main" id="{3E73F161-AFAF-4D07-B914-F91CC02BA417}"/>
+              </a:ext>
+            </a:extLst>
+          </p:cNvPr>
           <p:cNvSpPr>
             <a:spLocks noGrp="1"/>
           </p:cNvSpPr>
@@ -2437,8 +2607,8 @@
         </p:nvSpPr>
         <p:spPr>
           <a:xfrm>
-            <a:off x="1792288" y="5367338"/>
-            <a:ext cx="5486400" cy="804862"/>
+            <a:off x="629841" y="2057400"/>
+            <a:ext cx="2949178" cy="3811588"/>
           </a:xfrm>
         </p:spPr>
         <p:txBody>
@@ -2446,53 +2616,59 @@
           <a:lstStyle>
             <a:lvl1pPr marL="0" indent="0">
               <a:buNone/>
-              <a:defRPr sz="1400"/>
+              <a:defRPr sz="1200"/>
             </a:lvl1pPr>
-            <a:lvl2pPr marL="457200" indent="0">
+            <a:lvl2pPr marL="342900" indent="0">
               <a:buNone/>
-              <a:defRPr sz="1200"/>
+              <a:defRPr sz="1050"/>
             </a:lvl2pPr>
-            <a:lvl3pPr marL="914400" indent="0">
-              <a:buNone/>
-              <a:defRPr sz="1000"/>
-            </a:lvl3pPr>
-            <a:lvl4pPr marL="1371600" indent="0">
+            <a:lvl3pPr marL="685800" indent="0">
               <a:buNone/>
               <a:defRPr sz="900"/>
+            </a:lvl3pPr>
+            <a:lvl4pPr marL="1028700" indent="0">
+              <a:buNone/>
+              <a:defRPr sz="750"/>
             </a:lvl4pPr>
-            <a:lvl5pPr marL="1828800" indent="0">
+            <a:lvl5pPr marL="1371600" indent="0">
               <a:buNone/>
-              <a:defRPr sz="900"/>
+              <a:defRPr sz="750"/>
             </a:lvl5pPr>
-            <a:lvl6pPr marL="2286000" indent="0">
+            <a:lvl6pPr marL="1714500" indent="0">
               <a:buNone/>
-              <a:defRPr sz="900"/>
+              <a:defRPr sz="750"/>
             </a:lvl6pPr>
-            <a:lvl7pPr marL="2743200" indent="0">
+            <a:lvl7pPr marL="2057400" indent="0">
               <a:buNone/>
-              <a:defRPr sz="900"/>
+              <a:defRPr sz="750"/>
             </a:lvl7pPr>
-            <a:lvl8pPr marL="3200400" indent="0">
+            <a:lvl8pPr marL="2400300" indent="0">
               <a:buNone/>
-              <a:defRPr sz="900"/>
+              <a:defRPr sz="750"/>
             </a:lvl8pPr>
-            <a:lvl9pPr marL="3657600" indent="0">
+            <a:lvl9pPr marL="2743200" indent="0">
               <a:buNone/>
-              <a:defRPr sz="900"/>
+              <a:defRPr sz="750"/>
             </a:lvl9pPr>
           </a:lstStyle>
           <a:p>
             <a:pPr lvl="0"/>
             <a:r>
               <a:rPr lang="en-US"/>
-              <a:t>Click to edit Master text styles</a:t>
+              <a:t>Edit Master text styles</a:t>
             </a:r>
           </a:p>
         </p:txBody>
       </p:sp>
       <p:sp>
         <p:nvSpPr>
-          <p:cNvPr id="5" name="Date Placeholder 4"/>
+          <p:cNvPr id="5" name="Date Placeholder 4">
+            <a:extLst>
+              <a:ext uri="{FF2B5EF4-FFF2-40B4-BE49-F238E27FC236}">
+                <a16:creationId xmlns:a16="http://schemas.microsoft.com/office/drawing/2014/main" id="{38FDEA48-7A73-446B-8F1F-C8DC33E73BF9}"/>
+              </a:ext>
+            </a:extLst>
+          </p:cNvPr>
           <p:cNvSpPr>
             <a:spLocks noGrp="1"/>
           </p:cNvSpPr>
@@ -2507,7 +2683,7 @@
           <a:p>
             <a:fld id="{6DB206C8-F88B-4959-9CD2-3016D27660E1}" type="datetimeFigureOut">
               <a:rPr lang="en-US" smtClean="0"/>
-              <a:t>8/2/2018</a:t>
+              <a:t>8/8/2018</a:t>
             </a:fld>
             <a:endParaRPr lang="en-US"/>
           </a:p>
@@ -2515,7 +2691,13 @@
       </p:sp>
       <p:sp>
         <p:nvSpPr>
-          <p:cNvPr id="6" name="Footer Placeholder 5"/>
+          <p:cNvPr id="6" name="Footer Placeholder 5">
+            <a:extLst>
+              <a:ext uri="{FF2B5EF4-FFF2-40B4-BE49-F238E27FC236}">
+                <a16:creationId xmlns:a16="http://schemas.microsoft.com/office/drawing/2014/main" id="{70F58E06-E8A8-455D-B81C-8558DA26388C}"/>
+              </a:ext>
+            </a:extLst>
+          </p:cNvPr>
           <p:cNvSpPr>
             <a:spLocks noGrp="1"/>
           </p:cNvSpPr>
@@ -2534,7 +2716,13 @@
       </p:sp>
       <p:sp>
         <p:nvSpPr>
-          <p:cNvPr id="7" name="Slide Number Placeholder 6"/>
+          <p:cNvPr id="7" name="Slide Number Placeholder 6">
+            <a:extLst>
+              <a:ext uri="{FF2B5EF4-FFF2-40B4-BE49-F238E27FC236}">
+                <a16:creationId xmlns:a16="http://schemas.microsoft.com/office/drawing/2014/main" id="{E24641BA-5923-400D-AF2E-78856684D153}"/>
+              </a:ext>
+            </a:extLst>
+          </p:cNvPr>
           <p:cNvSpPr>
             <a:spLocks noGrp="1"/>
           </p:cNvSpPr>
@@ -2558,7 +2746,7 @@
     </p:spTree>
     <p:extLst>
       <p:ext uri="{BB962C8B-B14F-4D97-AF65-F5344CB8AC3E}">
-        <p14:creationId xmlns:p14="http://schemas.microsoft.com/office/powerpoint/2010/main" val="798315355"/>
+        <p14:creationId xmlns:p14="http://schemas.microsoft.com/office/powerpoint/2010/main" val="3199045788"/>
       </p:ext>
     </p:extLst>
   </p:cSld>
@@ -2592,7 +2780,13 @@
       </p:grpSpPr>
       <p:sp>
         <p:nvSpPr>
-          <p:cNvPr id="2" name="Title Placeholder 1"/>
+          <p:cNvPr id="2" name="Title Placeholder 1">
+            <a:extLst>
+              <a:ext uri="{FF2B5EF4-FFF2-40B4-BE49-F238E27FC236}">
+                <a16:creationId xmlns:a16="http://schemas.microsoft.com/office/drawing/2014/main" id="{C61FEFF9-5A09-4BFF-85AE-C297D66937FE}"/>
+              </a:ext>
+            </a:extLst>
+          </p:cNvPr>
           <p:cNvSpPr>
             <a:spLocks noGrp="1"/>
           </p:cNvSpPr>
@@ -2602,8 +2796,8 @@
         </p:nvSpPr>
         <p:spPr>
           <a:xfrm>
-            <a:off x="457200" y="274638"/>
-            <a:ext cx="8229600" cy="1143000"/>
+            <a:off x="628650" y="365126"/>
+            <a:ext cx="7886700" cy="1325563"/>
           </a:xfrm>
           <a:prstGeom prst="rect">
             <a:avLst/>
@@ -2624,7 +2818,13 @@
       </p:sp>
       <p:sp>
         <p:nvSpPr>
-          <p:cNvPr id="3" name="Text Placeholder 2"/>
+          <p:cNvPr id="3" name="Text Placeholder 2">
+            <a:extLst>
+              <a:ext uri="{FF2B5EF4-FFF2-40B4-BE49-F238E27FC236}">
+                <a16:creationId xmlns:a16="http://schemas.microsoft.com/office/drawing/2014/main" id="{38AF24C5-A988-49E0-B17B-46F3BADB24AD}"/>
+              </a:ext>
+            </a:extLst>
+          </p:cNvPr>
           <p:cNvSpPr>
             <a:spLocks noGrp="1"/>
           </p:cNvSpPr>
@@ -2634,8 +2834,8 @@
         </p:nvSpPr>
         <p:spPr>
           <a:xfrm>
-            <a:off x="457200" y="1600200"/>
-            <a:ext cx="8229600" cy="4525963"/>
+            <a:off x="628650" y="1825625"/>
+            <a:ext cx="7886700" cy="4351338"/>
           </a:xfrm>
           <a:prstGeom prst="rect">
             <a:avLst/>
@@ -2650,7 +2850,7 @@
             <a:pPr lvl="0"/>
             <a:r>
               <a:rPr lang="en-US"/>
-              <a:t>Click to edit Master text styles</a:t>
+              <a:t>Edit Master text styles</a:t>
             </a:r>
           </a:p>
           <a:p>
@@ -2685,7 +2885,13 @@
       </p:sp>
       <p:sp>
         <p:nvSpPr>
-          <p:cNvPr id="4" name="Date Placeholder 3"/>
+          <p:cNvPr id="4" name="Date Placeholder 3">
+            <a:extLst>
+              <a:ext uri="{FF2B5EF4-FFF2-40B4-BE49-F238E27FC236}">
+                <a16:creationId xmlns:a16="http://schemas.microsoft.com/office/drawing/2014/main" id="{74C52917-92C9-4BC6-899D-B1555B947D26}"/>
+              </a:ext>
+            </a:extLst>
+          </p:cNvPr>
           <p:cNvSpPr>
             <a:spLocks noGrp="1"/>
           </p:cNvSpPr>
@@ -2695,8 +2901,8 @@
         </p:nvSpPr>
         <p:spPr>
           <a:xfrm>
-            <a:off x="457200" y="6356350"/>
-            <a:ext cx="2133600" cy="365125"/>
+            <a:off x="628650" y="6356351"/>
+            <a:ext cx="2057400" cy="365125"/>
           </a:xfrm>
           <a:prstGeom prst="rect">
             <a:avLst/>
@@ -2706,7 +2912,7 @@
           <a:bodyPr vert="horz" lIns="91440" tIns="45720" rIns="91440" bIns="45720" rtlCol="0" anchor="ctr"/>
           <a:lstStyle>
             <a:lvl1pPr algn="l">
-              <a:defRPr sz="1200">
+              <a:defRPr sz="900">
                 <a:solidFill>
                   <a:schemeClr val="tx1">
                     <a:tint val="75000"/>
@@ -2718,7 +2924,7 @@
           <a:p>
             <a:fld id="{6DB206C8-F88B-4959-9CD2-3016D27660E1}" type="datetimeFigureOut">
               <a:rPr lang="en-US" smtClean="0"/>
-              <a:t>8/2/2018</a:t>
+              <a:t>8/8/2018</a:t>
             </a:fld>
             <a:endParaRPr lang="en-US"/>
           </a:p>
@@ -2726,7 +2932,13 @@
       </p:sp>
       <p:sp>
         <p:nvSpPr>
-          <p:cNvPr id="5" name="Footer Placeholder 4"/>
+          <p:cNvPr id="5" name="Footer Placeholder 4">
+            <a:extLst>
+              <a:ext uri="{FF2B5EF4-FFF2-40B4-BE49-F238E27FC236}">
+                <a16:creationId xmlns:a16="http://schemas.microsoft.com/office/drawing/2014/main" id="{5CFE555E-5926-4647-939D-64591C757CA5}"/>
+              </a:ext>
+            </a:extLst>
+          </p:cNvPr>
           <p:cNvSpPr>
             <a:spLocks noGrp="1"/>
           </p:cNvSpPr>
@@ -2736,8 +2948,8 @@
         </p:nvSpPr>
         <p:spPr>
           <a:xfrm>
-            <a:off x="3124200" y="6356350"/>
-            <a:ext cx="2895600" cy="365125"/>
+            <a:off x="3028950" y="6356351"/>
+            <a:ext cx="3086100" cy="365125"/>
           </a:xfrm>
           <a:prstGeom prst="rect">
             <a:avLst/>
@@ -2747,7 +2959,7 @@
           <a:bodyPr vert="horz" lIns="91440" tIns="45720" rIns="91440" bIns="45720" rtlCol="0" anchor="ctr"/>
           <a:lstStyle>
             <a:lvl1pPr algn="ctr">
-              <a:defRPr sz="1200">
+              <a:defRPr sz="900">
                 <a:solidFill>
                   <a:schemeClr val="tx1">
                     <a:tint val="75000"/>
@@ -2763,7 +2975,13 @@
       </p:sp>
       <p:sp>
         <p:nvSpPr>
-          <p:cNvPr id="6" name="Slide Number Placeholder 5"/>
+          <p:cNvPr id="6" name="Slide Number Placeholder 5">
+            <a:extLst>
+              <a:ext uri="{FF2B5EF4-FFF2-40B4-BE49-F238E27FC236}">
+                <a16:creationId xmlns:a16="http://schemas.microsoft.com/office/drawing/2014/main" id="{3D8CA1B8-5CDB-4A35-888C-E5801AA69143}"/>
+              </a:ext>
+            </a:extLst>
+          </p:cNvPr>
           <p:cNvSpPr>
             <a:spLocks noGrp="1"/>
           </p:cNvSpPr>
@@ -2773,8 +2991,8 @@
         </p:nvSpPr>
         <p:spPr>
           <a:xfrm>
-            <a:off x="6553200" y="6356350"/>
-            <a:ext cx="2133600" cy="365125"/>
+            <a:off x="6457950" y="6356351"/>
+            <a:ext cx="2057400" cy="365125"/>
           </a:xfrm>
           <a:prstGeom prst="rect">
             <a:avLst/>
@@ -2784,7 +3002,7 @@
           <a:bodyPr vert="horz" lIns="91440" tIns="45720" rIns="91440" bIns="45720" rtlCol="0" anchor="ctr"/>
           <a:lstStyle>
             <a:lvl1pPr algn="r">
-              <a:defRPr sz="1200">
+              <a:defRPr sz="900">
                 <a:solidFill>
                   <a:schemeClr val="tx1">
                     <a:tint val="75000"/>
@@ -2805,32 +3023,35 @@
     </p:spTree>
     <p:extLst>
       <p:ext uri="{BB962C8B-B14F-4D97-AF65-F5344CB8AC3E}">
-        <p14:creationId xmlns:p14="http://schemas.microsoft.com/office/powerpoint/2010/main" val="785050265"/>
+        <p14:creationId xmlns:p14="http://schemas.microsoft.com/office/powerpoint/2010/main" val="278502464"/>
       </p:ext>
     </p:extLst>
   </p:cSld>
   <p:clrMap bg1="lt1" tx1="dk1" bg2="lt2" tx2="dk2" accent1="accent1" accent2="accent2" accent3="accent3" accent4="accent4" accent5="accent5" accent6="accent6" hlink="hlink" folHlink="folHlink"/>
   <p:sldLayoutIdLst>
-    <p:sldLayoutId id="2147483649" r:id="rId1"/>
-    <p:sldLayoutId id="2147483650" r:id="rId2"/>
-    <p:sldLayoutId id="2147483651" r:id="rId3"/>
-    <p:sldLayoutId id="2147483652" r:id="rId4"/>
-    <p:sldLayoutId id="2147483653" r:id="rId5"/>
-    <p:sldLayoutId id="2147483654" r:id="rId6"/>
-    <p:sldLayoutId id="2147483655" r:id="rId7"/>
-    <p:sldLayoutId id="2147483656" r:id="rId8"/>
-    <p:sldLayoutId id="2147483657" r:id="rId9"/>
-    <p:sldLayoutId id="2147483658" r:id="rId10"/>
-    <p:sldLayoutId id="2147483659" r:id="rId11"/>
+    <p:sldLayoutId id="2147483673" r:id="rId1"/>
+    <p:sldLayoutId id="2147483674" r:id="rId2"/>
+    <p:sldLayoutId id="2147483675" r:id="rId3"/>
+    <p:sldLayoutId id="2147483676" r:id="rId4"/>
+    <p:sldLayoutId id="2147483677" r:id="rId5"/>
+    <p:sldLayoutId id="2147483678" r:id="rId6"/>
+    <p:sldLayoutId id="2147483679" r:id="rId7"/>
+    <p:sldLayoutId id="2147483680" r:id="rId8"/>
+    <p:sldLayoutId id="2147483681" r:id="rId9"/>
+    <p:sldLayoutId id="2147483682" r:id="rId10"/>
+    <p:sldLayoutId id="2147483683" r:id="rId11"/>
   </p:sldLayoutIdLst>
   <p:txStyles>
     <p:titleStyle>
-      <a:lvl1pPr algn="ctr" defTabSz="914400" rtl="0" eaLnBrk="1" latinLnBrk="0" hangingPunct="1">
+      <a:lvl1pPr algn="l" defTabSz="685800" rtl="0" eaLnBrk="1" latinLnBrk="0" hangingPunct="1">
+        <a:lnSpc>
+          <a:spcPct val="90000"/>
+        </a:lnSpc>
         <a:spcBef>
           <a:spcPct val="0"/>
         </a:spcBef>
         <a:buNone/>
-        <a:defRPr sz="4400" kern="1200">
+        <a:defRPr sz="3300" kern="1200">
           <a:solidFill>
             <a:schemeClr val="tx1"/>
           </a:solidFill>
@@ -2841,13 +3062,16 @@
       </a:lvl1pPr>
     </p:titleStyle>
     <p:bodyStyle>
-      <a:lvl1pPr marL="342900" indent="-342900" algn="l" defTabSz="914400" rtl="0" eaLnBrk="1" latinLnBrk="0" hangingPunct="1">
+      <a:lvl1pPr marL="171450" indent="-171450" algn="l" defTabSz="685800" rtl="0" eaLnBrk="1" latinLnBrk="0" hangingPunct="1">
+        <a:lnSpc>
+          <a:spcPct val="90000"/>
+        </a:lnSpc>
         <a:spcBef>
-          <a:spcPct val="20000"/>
+          <a:spcPts val="750"/>
         </a:spcBef>
-        <a:buFont typeface="Arial" pitchFamily="34" charset="0"/>
+        <a:buFont typeface="Arial" panose="020B0604020202020204" pitchFamily="34" charset="0"/>
         <a:buChar char="•"/>
-        <a:defRPr sz="3200" kern="1200">
+        <a:defRPr sz="2100" kern="1200">
           <a:solidFill>
             <a:schemeClr val="tx1"/>
           </a:solidFill>
@@ -2856,13 +3080,16 @@
           <a:cs typeface="+mn-cs"/>
         </a:defRPr>
       </a:lvl1pPr>
-      <a:lvl2pPr marL="742950" indent="-285750" algn="l" defTabSz="914400" rtl="0" eaLnBrk="1" latinLnBrk="0" hangingPunct="1">
+      <a:lvl2pPr marL="514350" indent="-171450" algn="l" defTabSz="685800" rtl="0" eaLnBrk="1" latinLnBrk="0" hangingPunct="1">
+        <a:lnSpc>
+          <a:spcPct val="90000"/>
+        </a:lnSpc>
         <a:spcBef>
-          <a:spcPct val="20000"/>
+          <a:spcPts val="375"/>
         </a:spcBef>
-        <a:buFont typeface="Arial" pitchFamily="34" charset="0"/>
-        <a:buChar char="–"/>
-        <a:defRPr sz="2800" kern="1200">
+        <a:buFont typeface="Arial" panose="020B0604020202020204" pitchFamily="34" charset="0"/>
+        <a:buChar char="•"/>
+        <a:defRPr sz="1800" kern="1200">
           <a:solidFill>
             <a:schemeClr val="tx1"/>
           </a:solidFill>
@@ -2871,13 +3098,16 @@
           <a:cs typeface="+mn-cs"/>
         </a:defRPr>
       </a:lvl2pPr>
-      <a:lvl3pPr marL="1143000" indent="-228600" algn="l" defTabSz="914400" rtl="0" eaLnBrk="1" latinLnBrk="0" hangingPunct="1">
+      <a:lvl3pPr marL="857250" indent="-171450" algn="l" defTabSz="685800" rtl="0" eaLnBrk="1" latinLnBrk="0" hangingPunct="1">
+        <a:lnSpc>
+          <a:spcPct val="90000"/>
+        </a:lnSpc>
         <a:spcBef>
-          <a:spcPct val="20000"/>
+          <a:spcPts val="375"/>
         </a:spcBef>
-        <a:buFont typeface="Arial" pitchFamily="34" charset="0"/>
+        <a:buFont typeface="Arial" panose="020B0604020202020204" pitchFamily="34" charset="0"/>
         <a:buChar char="•"/>
-        <a:defRPr sz="2400" kern="1200">
+        <a:defRPr sz="1500" kern="1200">
           <a:solidFill>
             <a:schemeClr val="tx1"/>
           </a:solidFill>
@@ -2886,13 +3116,16 @@
           <a:cs typeface="+mn-cs"/>
         </a:defRPr>
       </a:lvl3pPr>
-      <a:lvl4pPr marL="1600200" indent="-228600" algn="l" defTabSz="914400" rtl="0" eaLnBrk="1" latinLnBrk="0" hangingPunct="1">
+      <a:lvl4pPr marL="1200150" indent="-171450" algn="l" defTabSz="685800" rtl="0" eaLnBrk="1" latinLnBrk="0" hangingPunct="1">
+        <a:lnSpc>
+          <a:spcPct val="90000"/>
+        </a:lnSpc>
         <a:spcBef>
-          <a:spcPct val="20000"/>
+          <a:spcPts val="375"/>
         </a:spcBef>
-        <a:buFont typeface="Arial" pitchFamily="34" charset="0"/>
-        <a:buChar char="–"/>
-        <a:defRPr sz="2000" kern="1200">
+        <a:buFont typeface="Arial" panose="020B0604020202020204" pitchFamily="34" charset="0"/>
+        <a:buChar char="•"/>
+        <a:defRPr sz="1350" kern="1200">
           <a:solidFill>
             <a:schemeClr val="tx1"/>
           </a:solidFill>
@@ -2901,13 +3134,16 @@
           <a:cs typeface="+mn-cs"/>
         </a:defRPr>
       </a:lvl4pPr>
-      <a:lvl5pPr marL="2057400" indent="-228600" algn="l" defTabSz="914400" rtl="0" eaLnBrk="1" latinLnBrk="0" hangingPunct="1">
+      <a:lvl5pPr marL="1543050" indent="-171450" algn="l" defTabSz="685800" rtl="0" eaLnBrk="1" latinLnBrk="0" hangingPunct="1">
+        <a:lnSpc>
+          <a:spcPct val="90000"/>
+        </a:lnSpc>
         <a:spcBef>
-          <a:spcPct val="20000"/>
+          <a:spcPts val="375"/>
         </a:spcBef>
-        <a:buFont typeface="Arial" pitchFamily="34" charset="0"/>
-        <a:buChar char="»"/>
-        <a:defRPr sz="2000" kern="1200">
+        <a:buFont typeface="Arial" panose="020B0604020202020204" pitchFamily="34" charset="0"/>
+        <a:buChar char="•"/>
+        <a:defRPr sz="1350" kern="1200">
           <a:solidFill>
             <a:schemeClr val="tx1"/>
           </a:solidFill>
@@ -2916,13 +3152,16 @@
           <a:cs typeface="+mn-cs"/>
         </a:defRPr>
       </a:lvl5pPr>
-      <a:lvl6pPr marL="2514600" indent="-228600" algn="l" defTabSz="914400" rtl="0" eaLnBrk="1" latinLnBrk="0" hangingPunct="1">
+      <a:lvl6pPr marL="1885950" indent="-171450" algn="l" defTabSz="685800" rtl="0" eaLnBrk="1" latinLnBrk="0" hangingPunct="1">
+        <a:lnSpc>
+          <a:spcPct val="90000"/>
+        </a:lnSpc>
         <a:spcBef>
-          <a:spcPct val="20000"/>
+          <a:spcPts val="375"/>
         </a:spcBef>
-        <a:buFont typeface="Arial" pitchFamily="34" charset="0"/>
+        <a:buFont typeface="Arial" panose="020B0604020202020204" pitchFamily="34" charset="0"/>
         <a:buChar char="•"/>
-        <a:defRPr sz="2000" kern="1200">
+        <a:defRPr sz="1350" kern="1200">
           <a:solidFill>
             <a:schemeClr val="tx1"/>
           </a:solidFill>
@@ -2931,13 +3170,16 @@
           <a:cs typeface="+mn-cs"/>
         </a:defRPr>
       </a:lvl6pPr>
-      <a:lvl7pPr marL="2971800" indent="-228600" algn="l" defTabSz="914400" rtl="0" eaLnBrk="1" latinLnBrk="0" hangingPunct="1">
+      <a:lvl7pPr marL="2228850" indent="-171450" algn="l" defTabSz="685800" rtl="0" eaLnBrk="1" latinLnBrk="0" hangingPunct="1">
+        <a:lnSpc>
+          <a:spcPct val="90000"/>
+        </a:lnSpc>
         <a:spcBef>
-          <a:spcPct val="20000"/>
+          <a:spcPts val="375"/>
         </a:spcBef>
-        <a:buFont typeface="Arial" pitchFamily="34" charset="0"/>
+        <a:buFont typeface="Arial" panose="020B0604020202020204" pitchFamily="34" charset="0"/>
         <a:buChar char="•"/>
-        <a:defRPr sz="2000" kern="1200">
+        <a:defRPr sz="1350" kern="1200">
           <a:solidFill>
             <a:schemeClr val="tx1"/>
           </a:solidFill>
@@ -2946,13 +3188,16 @@
           <a:cs typeface="+mn-cs"/>
         </a:defRPr>
       </a:lvl7pPr>
-      <a:lvl8pPr marL="3429000" indent="-228600" algn="l" defTabSz="914400" rtl="0" eaLnBrk="1" latinLnBrk="0" hangingPunct="1">
+      <a:lvl8pPr marL="2571750" indent="-171450" algn="l" defTabSz="685800" rtl="0" eaLnBrk="1" latinLnBrk="0" hangingPunct="1">
+        <a:lnSpc>
+          <a:spcPct val="90000"/>
+        </a:lnSpc>
         <a:spcBef>
-          <a:spcPct val="20000"/>
+          <a:spcPts val="375"/>
         </a:spcBef>
-        <a:buFont typeface="Arial" pitchFamily="34" charset="0"/>
+        <a:buFont typeface="Arial" panose="020B0604020202020204" pitchFamily="34" charset="0"/>
         <a:buChar char="•"/>
-        <a:defRPr sz="2000" kern="1200">
+        <a:defRPr sz="1350" kern="1200">
           <a:solidFill>
             <a:schemeClr val="tx1"/>
           </a:solidFill>
@@ -2961,13 +3206,16 @@
           <a:cs typeface="+mn-cs"/>
         </a:defRPr>
       </a:lvl8pPr>
-      <a:lvl9pPr marL="3886200" indent="-228600" algn="l" defTabSz="914400" rtl="0" eaLnBrk="1" latinLnBrk="0" hangingPunct="1">
+      <a:lvl9pPr marL="2914650" indent="-171450" algn="l" defTabSz="685800" rtl="0" eaLnBrk="1" latinLnBrk="0" hangingPunct="1">
+        <a:lnSpc>
+          <a:spcPct val="90000"/>
+        </a:lnSpc>
         <a:spcBef>
-          <a:spcPct val="20000"/>
+          <a:spcPts val="375"/>
         </a:spcBef>
-        <a:buFont typeface="Arial" pitchFamily="34" charset="0"/>
+        <a:buFont typeface="Arial" panose="020B0604020202020204" pitchFamily="34" charset="0"/>
         <a:buChar char="•"/>
-        <a:defRPr sz="2000" kern="1200">
+        <a:defRPr sz="1350" kern="1200">
           <a:solidFill>
             <a:schemeClr val="tx1"/>
           </a:solidFill>
@@ -2981,8 +3229,8 @@
       <a:defPPr>
         <a:defRPr lang="en-US"/>
       </a:defPPr>
-      <a:lvl1pPr marL="0" algn="l" defTabSz="914400" rtl="0" eaLnBrk="1" latinLnBrk="0" hangingPunct="1">
-        <a:defRPr sz="1800" kern="1200">
+      <a:lvl1pPr marL="0" algn="l" defTabSz="685800" rtl="0" eaLnBrk="1" latinLnBrk="0" hangingPunct="1">
+        <a:defRPr sz="1350" kern="1200">
           <a:solidFill>
             <a:schemeClr val="tx1"/>
           </a:solidFill>
@@ -2991,8 +3239,8 @@
           <a:cs typeface="+mn-cs"/>
         </a:defRPr>
       </a:lvl1pPr>
-      <a:lvl2pPr marL="457200" algn="l" defTabSz="914400" rtl="0" eaLnBrk="1" latinLnBrk="0" hangingPunct="1">
-        <a:defRPr sz="1800" kern="1200">
+      <a:lvl2pPr marL="342900" algn="l" defTabSz="685800" rtl="0" eaLnBrk="1" latinLnBrk="0" hangingPunct="1">
+        <a:defRPr sz="1350" kern="1200">
           <a:solidFill>
             <a:schemeClr val="tx1"/>
           </a:solidFill>
@@ -3001,8 +3249,8 @@
           <a:cs typeface="+mn-cs"/>
         </a:defRPr>
       </a:lvl2pPr>
-      <a:lvl3pPr marL="914400" algn="l" defTabSz="914400" rtl="0" eaLnBrk="1" latinLnBrk="0" hangingPunct="1">
-        <a:defRPr sz="1800" kern="1200">
+      <a:lvl3pPr marL="685800" algn="l" defTabSz="685800" rtl="0" eaLnBrk="1" latinLnBrk="0" hangingPunct="1">
+        <a:defRPr sz="1350" kern="1200">
           <a:solidFill>
             <a:schemeClr val="tx1"/>
           </a:solidFill>
@@ -3011,8 +3259,8 @@
           <a:cs typeface="+mn-cs"/>
         </a:defRPr>
       </a:lvl3pPr>
-      <a:lvl4pPr marL="1371600" algn="l" defTabSz="914400" rtl="0" eaLnBrk="1" latinLnBrk="0" hangingPunct="1">
-        <a:defRPr sz="1800" kern="1200">
+      <a:lvl4pPr marL="1028700" algn="l" defTabSz="685800" rtl="0" eaLnBrk="1" latinLnBrk="0" hangingPunct="1">
+        <a:defRPr sz="1350" kern="1200">
           <a:solidFill>
             <a:schemeClr val="tx1"/>
           </a:solidFill>
@@ -3021,8 +3269,8 @@
           <a:cs typeface="+mn-cs"/>
         </a:defRPr>
       </a:lvl4pPr>
-      <a:lvl5pPr marL="1828800" algn="l" defTabSz="914400" rtl="0" eaLnBrk="1" latinLnBrk="0" hangingPunct="1">
-        <a:defRPr sz="1800" kern="1200">
+      <a:lvl5pPr marL="1371600" algn="l" defTabSz="685800" rtl="0" eaLnBrk="1" latinLnBrk="0" hangingPunct="1">
+        <a:defRPr sz="1350" kern="1200">
           <a:solidFill>
             <a:schemeClr val="tx1"/>
           </a:solidFill>
@@ -3031,8 +3279,8 @@
           <a:cs typeface="+mn-cs"/>
         </a:defRPr>
       </a:lvl5pPr>
-      <a:lvl6pPr marL="2286000" algn="l" defTabSz="914400" rtl="0" eaLnBrk="1" latinLnBrk="0" hangingPunct="1">
-        <a:defRPr sz="1800" kern="1200">
+      <a:lvl6pPr marL="1714500" algn="l" defTabSz="685800" rtl="0" eaLnBrk="1" latinLnBrk="0" hangingPunct="1">
+        <a:defRPr sz="1350" kern="1200">
           <a:solidFill>
             <a:schemeClr val="tx1"/>
           </a:solidFill>
@@ -3041,8 +3289,8 @@
           <a:cs typeface="+mn-cs"/>
         </a:defRPr>
       </a:lvl6pPr>
-      <a:lvl7pPr marL="2743200" algn="l" defTabSz="914400" rtl="0" eaLnBrk="1" latinLnBrk="0" hangingPunct="1">
-        <a:defRPr sz="1800" kern="1200">
+      <a:lvl7pPr marL="2057400" algn="l" defTabSz="685800" rtl="0" eaLnBrk="1" latinLnBrk="0" hangingPunct="1">
+        <a:defRPr sz="1350" kern="1200">
           <a:solidFill>
             <a:schemeClr val="tx1"/>
           </a:solidFill>
@@ -3051,8 +3299,8 @@
           <a:cs typeface="+mn-cs"/>
         </a:defRPr>
       </a:lvl7pPr>
-      <a:lvl8pPr marL="3200400" algn="l" defTabSz="914400" rtl="0" eaLnBrk="1" latinLnBrk="0" hangingPunct="1">
-        <a:defRPr sz="1800" kern="1200">
+      <a:lvl8pPr marL="2400300" algn="l" defTabSz="685800" rtl="0" eaLnBrk="1" latinLnBrk="0" hangingPunct="1">
+        <a:defRPr sz="1350" kern="1200">
           <a:solidFill>
             <a:schemeClr val="tx1"/>
           </a:solidFill>
@@ -3061,8 +3309,8 @@
           <a:cs typeface="+mn-cs"/>
         </a:defRPr>
       </a:lvl8pPr>
-      <a:lvl9pPr marL="3657600" algn="l" defTabSz="914400" rtl="0" eaLnBrk="1" latinLnBrk="0" hangingPunct="1">
-        <a:defRPr sz="1800" kern="1200">
+      <a:lvl9pPr marL="2743200" algn="l" defTabSz="685800" rtl="0" eaLnBrk="1" latinLnBrk="0" hangingPunct="1">
+        <a:defRPr sz="1350" kern="1200">
           <a:solidFill>
             <a:schemeClr val="tx1"/>
           </a:solidFill>
@@ -3145,6 +3393,167 @@
 </file>
 
 <file path=ppt/slides/slide2.xml><?xml version="1.0" encoding="utf-8"?>
+<p:sld xmlns:a="http://schemas.openxmlformats.org/drawingml/2006/main" xmlns:r="http://schemas.openxmlformats.org/officeDocument/2006/relationships" xmlns:p="http://schemas.openxmlformats.org/presentationml/2006/main">
+  <p:cSld>
+    <p:bg>
+      <p:bgPr>
+        <a:solidFill>
+          <a:schemeClr val="bg1"/>
+        </a:solidFill>
+        <a:effectLst/>
+      </p:bgPr>
+    </p:bg>
+    <p:spTree>
+      <p:nvGrpSpPr>
+        <p:cNvPr id="1" name=""/>
+        <p:cNvGrpSpPr/>
+        <p:nvPr/>
+      </p:nvGrpSpPr>
+      <p:grpSpPr>
+        <a:xfrm>
+          <a:off x="0" y="0"/>
+          <a:ext cx="0" cy="0"/>
+          <a:chOff x="0" y="0"/>
+          <a:chExt cx="0" cy="0"/>
+        </a:xfrm>
+      </p:grpSpPr>
+      <p:pic>
+        <p:nvPicPr>
+          <p:cNvPr id="1026" name="Picture 2" descr="Image result for clean architecture">
+            <a:extLst>
+              <a:ext uri="{FF2B5EF4-FFF2-40B4-BE49-F238E27FC236}">
+                <a16:creationId xmlns:a16="http://schemas.microsoft.com/office/drawing/2014/main" id="{75A5AFDA-B3DE-4C67-A3EF-A33E06F27D42}"/>
+              </a:ext>
+            </a:extLst>
+          </p:cNvPr>
+          <p:cNvPicPr>
+            <a:picLocks noChangeAspect="1" noChangeArrowheads="1"/>
+          </p:cNvPicPr>
+          <p:nvPr/>
+        </p:nvPicPr>
+        <p:blipFill>
+          <a:blip r:embed="rId2">
+            <a:extLst>
+              <a:ext uri="{28A0092B-C50C-407E-A947-70E740481C1C}">
+                <a14:useLocalDpi xmlns:a14="http://schemas.microsoft.com/office/drawing/2010/main" val="0"/>
+              </a:ext>
+            </a:extLst>
+          </a:blip>
+          <a:srcRect/>
+          <a:stretch>
+            <a:fillRect/>
+          </a:stretch>
+        </p:blipFill>
+        <p:spPr bwMode="auto">
+          <a:xfrm>
+            <a:off x="3976914" y="1526171"/>
+            <a:ext cx="5181600" cy="3805657"/>
+          </a:xfrm>
+          <a:prstGeom prst="rect">
+            <a:avLst/>
+          </a:prstGeom>
+          <a:noFill/>
+          <a:extLst>
+            <a:ext uri="{909E8E84-426E-40DD-AFC4-6F175D3DCCD1}">
+              <a14:hiddenFill xmlns:a14="http://schemas.microsoft.com/office/drawing/2010/main">
+                <a:solidFill>
+                  <a:srgbClr val="FFFFFF"/>
+                </a:solidFill>
+              </a14:hiddenFill>
+            </a:ext>
+          </a:extLst>
+        </p:spPr>
+      </p:pic>
+      <p:pic>
+        <p:nvPicPr>
+          <p:cNvPr id="17" name="Picture 16">
+            <a:extLst>
+              <a:ext uri="{FF2B5EF4-FFF2-40B4-BE49-F238E27FC236}">
+                <a16:creationId xmlns:a16="http://schemas.microsoft.com/office/drawing/2014/main" id="{4104EB0C-723A-4FD7-9F77-AA0735EDC421}"/>
+              </a:ext>
+            </a:extLst>
+          </p:cNvPr>
+          <p:cNvPicPr>
+            <a:picLocks noChangeAspect="1"/>
+          </p:cNvPicPr>
+          <p:nvPr/>
+        </p:nvPicPr>
+        <p:blipFill>
+          <a:blip r:embed="rId3"/>
+          <a:stretch>
+            <a:fillRect/>
+          </a:stretch>
+        </p:blipFill>
+        <p:spPr>
+          <a:xfrm>
+            <a:off x="152400" y="228600"/>
+            <a:ext cx="2837378" cy="6248400"/>
+          </a:xfrm>
+          <a:prstGeom prst="rect">
+            <a:avLst/>
+          </a:prstGeom>
+        </p:spPr>
+      </p:pic>
+      <p:sp>
+        <p:nvSpPr>
+          <p:cNvPr id="62" name="Arrow: Left-Right 61">
+            <a:extLst>
+              <a:ext uri="{FF2B5EF4-FFF2-40B4-BE49-F238E27FC236}">
+                <a16:creationId xmlns:a16="http://schemas.microsoft.com/office/drawing/2014/main" id="{A2D9A96F-B399-4B23-AEAC-93372217D570}"/>
+              </a:ext>
+            </a:extLst>
+          </p:cNvPr>
+          <p:cNvSpPr/>
+          <p:nvPr/>
+        </p:nvSpPr>
+        <p:spPr>
+          <a:xfrm>
+            <a:off x="3124200" y="3233057"/>
+            <a:ext cx="838200" cy="533400"/>
+          </a:xfrm>
+          <a:prstGeom prst="leftRightArrow">
+            <a:avLst/>
+          </a:prstGeom>
+        </p:spPr>
+        <p:style>
+          <a:lnRef idx="2">
+            <a:schemeClr val="accent3">
+              <a:shade val="50000"/>
+            </a:schemeClr>
+          </a:lnRef>
+          <a:fillRef idx="1">
+            <a:schemeClr val="accent3"/>
+          </a:fillRef>
+          <a:effectRef idx="0">
+            <a:schemeClr val="accent3"/>
+          </a:effectRef>
+          <a:fontRef idx="minor">
+            <a:schemeClr val="lt1"/>
+          </a:fontRef>
+        </p:style>
+        <p:txBody>
+          <a:bodyPr rtlCol="0" anchor="ctr"/>
+          <a:lstStyle/>
+          <a:p>
+            <a:pPr algn="ctr"/>
+            <a:endParaRPr lang="en-US"/>
+          </a:p>
+        </p:txBody>
+      </p:sp>
+    </p:spTree>
+    <p:extLst>
+      <p:ext uri="{BB962C8B-B14F-4D97-AF65-F5344CB8AC3E}">
+        <p14:creationId xmlns:p14="http://schemas.microsoft.com/office/powerpoint/2010/main" val="1980456384"/>
+      </p:ext>
+    </p:extLst>
+  </p:cSld>
+  <p:clrMapOvr>
+    <a:masterClrMapping/>
+  </p:clrMapOvr>
+</p:sld>
+</file>
+
+<file path=ppt/slides/slide3.xml><?xml version="1.0" encoding="utf-8"?>
 <p:sld xmlns:a="http://schemas.openxmlformats.org/drawingml/2006/main" xmlns:r="http://schemas.openxmlformats.org/officeDocument/2006/relationships" xmlns:p="http://schemas.openxmlformats.org/presentationml/2006/main">
   <p:cSld>
     <p:spTree>
@@ -8230,18 +8639,301 @@
           </p:cNvPr>
           <p:cNvCxnSpPr>
             <a:cxnSpLocks/>
+            <a:stCxn id="55" idx="1"/>
             <a:endCxn id="2" idx="1"/>
           </p:cNvCxnSpPr>
           <p:nvPr/>
         </p:nvCxnSpPr>
         <p:spPr>
-          <a:xfrm flipV="1">
-            <a:off x="1375403" y="1103254"/>
-            <a:ext cx="5584701" cy="3275906"/>
+          <a:xfrm rot="10800000" flipH="1">
+            <a:off x="1268684" y="1103254"/>
+            <a:ext cx="5691420" cy="3261522"/>
           </a:xfrm>
           <a:prstGeom prst="bentConnector3">
             <a:avLst>
-              <a:gd name="adj1" fmla="val -10831"/>
+              <a:gd name="adj1" fmla="val -9791"/>
+            </a:avLst>
+          </a:prstGeom>
+          <a:ln w="6350">
+            <a:prstDash val="sysDot"/>
+            <a:headEnd type="triangle"/>
+            <a:tailEnd type="triangle"/>
+          </a:ln>
+        </p:spPr>
+        <p:style>
+          <a:lnRef idx="1">
+            <a:schemeClr val="accent1"/>
+          </a:lnRef>
+          <a:fillRef idx="0">
+            <a:schemeClr val="accent1"/>
+          </a:fillRef>
+          <a:effectRef idx="0">
+            <a:schemeClr val="accent1"/>
+          </a:effectRef>
+          <a:fontRef idx="minor">
+            <a:schemeClr val="tx1"/>
+          </a:fontRef>
+        </p:style>
+      </p:cxnSp>
+      <p:cxnSp>
+        <p:nvCxnSpPr>
+          <p:cNvPr id="152" name="Straight Arrow Connector 203">
+            <a:extLst>
+              <a:ext uri="{FF2B5EF4-FFF2-40B4-BE49-F238E27FC236}">
+                <a16:creationId xmlns:a16="http://schemas.microsoft.com/office/drawing/2014/main" id="{3E54E58B-49B4-4C04-8C80-7DD2C30518B2}"/>
+              </a:ext>
+            </a:extLst>
+          </p:cNvPr>
+          <p:cNvCxnSpPr>
+            <a:cxnSpLocks/>
+            <a:stCxn id="79" idx="3"/>
+            <a:endCxn id="52" idx="1"/>
+          </p:cNvCxnSpPr>
+          <p:nvPr/>
+        </p:nvCxnSpPr>
+        <p:spPr>
+          <a:xfrm flipV="1">
+            <a:off x="4062546" y="2524936"/>
+            <a:ext cx="811460" cy="517"/>
+          </a:xfrm>
+          <a:prstGeom prst="curvedConnector3">
+            <a:avLst>
+              <a:gd name="adj1" fmla="val 50000"/>
+            </a:avLst>
+          </a:prstGeom>
+          <a:ln w="6350">
+            <a:prstDash val="sysDot"/>
+            <a:headEnd type="triangle"/>
+            <a:tailEnd type="triangle"/>
+          </a:ln>
+        </p:spPr>
+        <p:style>
+          <a:lnRef idx="1">
+            <a:schemeClr val="accent1"/>
+          </a:lnRef>
+          <a:fillRef idx="0">
+            <a:schemeClr val="accent1"/>
+          </a:fillRef>
+          <a:effectRef idx="0">
+            <a:schemeClr val="accent1"/>
+          </a:effectRef>
+          <a:fontRef idx="minor">
+            <a:schemeClr val="tx1"/>
+          </a:fontRef>
+        </p:style>
+      </p:cxnSp>
+      <p:cxnSp>
+        <p:nvCxnSpPr>
+          <p:cNvPr id="157" name="Straight Arrow Connector 203">
+            <a:extLst>
+              <a:ext uri="{FF2B5EF4-FFF2-40B4-BE49-F238E27FC236}">
+                <a16:creationId xmlns:a16="http://schemas.microsoft.com/office/drawing/2014/main" id="{BD97999A-0266-44B8-AB13-AE34F609CF3C}"/>
+              </a:ext>
+            </a:extLst>
+          </p:cNvPr>
+          <p:cNvCxnSpPr>
+            <a:cxnSpLocks/>
+            <a:stCxn id="77" idx="1"/>
+            <a:endCxn id="55" idx="1"/>
+          </p:cNvCxnSpPr>
+          <p:nvPr/>
+        </p:nvCxnSpPr>
+        <p:spPr>
+          <a:xfrm rot="10800000">
+            <a:off x="1268684" y="4364777"/>
+            <a:ext cx="12788" cy="1315881"/>
+          </a:xfrm>
+          <a:prstGeom prst="curvedConnector3">
+            <a:avLst>
+              <a:gd name="adj1" fmla="val 3749711"/>
+            </a:avLst>
+          </a:prstGeom>
+          <a:ln w="6350">
+            <a:prstDash val="sysDot"/>
+            <a:headEnd type="triangle"/>
+            <a:tailEnd type="triangle"/>
+          </a:ln>
+        </p:spPr>
+        <p:style>
+          <a:lnRef idx="1">
+            <a:schemeClr val="accent1"/>
+          </a:lnRef>
+          <a:fillRef idx="0">
+            <a:schemeClr val="accent1"/>
+          </a:fillRef>
+          <a:effectRef idx="0">
+            <a:schemeClr val="accent1"/>
+          </a:effectRef>
+          <a:fontRef idx="minor">
+            <a:schemeClr val="tx1"/>
+          </a:fontRef>
+        </p:style>
+      </p:cxnSp>
+      <p:cxnSp>
+        <p:nvCxnSpPr>
+          <p:cNvPr id="158" name="Straight Arrow Connector 203">
+            <a:extLst>
+              <a:ext uri="{FF2B5EF4-FFF2-40B4-BE49-F238E27FC236}">
+                <a16:creationId xmlns:a16="http://schemas.microsoft.com/office/drawing/2014/main" id="{612AFF81-4DBA-4692-9FC9-BA8F175D947E}"/>
+              </a:ext>
+            </a:extLst>
+          </p:cNvPr>
+          <p:cNvCxnSpPr>
+            <a:cxnSpLocks/>
+            <a:stCxn id="70" idx="1"/>
+            <a:endCxn id="53" idx="1"/>
+          </p:cNvCxnSpPr>
+          <p:nvPr/>
+        </p:nvCxnSpPr>
+        <p:spPr>
+          <a:xfrm rot="10800000">
+            <a:off x="2769421" y="4352628"/>
+            <a:ext cx="20035" cy="1313289"/>
+          </a:xfrm>
+          <a:prstGeom prst="curvedConnector3">
+            <a:avLst>
+              <a:gd name="adj1" fmla="val 2263149"/>
+            </a:avLst>
+          </a:prstGeom>
+          <a:ln w="6350">
+            <a:prstDash val="sysDot"/>
+            <a:headEnd type="triangle"/>
+            <a:tailEnd type="triangle"/>
+          </a:ln>
+        </p:spPr>
+        <p:style>
+          <a:lnRef idx="1">
+            <a:schemeClr val="accent1"/>
+          </a:lnRef>
+          <a:fillRef idx="0">
+            <a:schemeClr val="accent1"/>
+          </a:fillRef>
+          <a:effectRef idx="0">
+            <a:schemeClr val="accent1"/>
+          </a:effectRef>
+          <a:fontRef idx="minor">
+            <a:schemeClr val="tx1"/>
+          </a:fontRef>
+        </p:style>
+      </p:cxnSp>
+      <p:cxnSp>
+        <p:nvCxnSpPr>
+          <p:cNvPr id="159" name="Straight Arrow Connector 203">
+            <a:extLst>
+              <a:ext uri="{FF2B5EF4-FFF2-40B4-BE49-F238E27FC236}">
+                <a16:creationId xmlns:a16="http://schemas.microsoft.com/office/drawing/2014/main" id="{C1C56FB2-1C18-456D-B611-E7F5719A68BA}"/>
+              </a:ext>
+            </a:extLst>
+          </p:cNvPr>
+          <p:cNvCxnSpPr>
+            <a:cxnSpLocks/>
+            <a:stCxn id="69" idx="1"/>
+            <a:endCxn id="60" idx="1"/>
+          </p:cNvCxnSpPr>
+          <p:nvPr/>
+        </p:nvCxnSpPr>
+        <p:spPr>
+          <a:xfrm rot="10800000">
+            <a:off x="4259191" y="4314142"/>
+            <a:ext cx="33376" cy="1346698"/>
+          </a:xfrm>
+          <a:prstGeom prst="curvedConnector3">
+            <a:avLst>
+              <a:gd name="adj1" fmla="val 1284348"/>
+            </a:avLst>
+          </a:prstGeom>
+          <a:ln w="6350">
+            <a:prstDash val="sysDot"/>
+            <a:headEnd type="triangle"/>
+            <a:tailEnd type="triangle"/>
+          </a:ln>
+        </p:spPr>
+        <p:style>
+          <a:lnRef idx="1">
+            <a:schemeClr val="accent1"/>
+          </a:lnRef>
+          <a:fillRef idx="0">
+            <a:schemeClr val="accent1"/>
+          </a:fillRef>
+          <a:effectRef idx="0">
+            <a:schemeClr val="accent1"/>
+          </a:effectRef>
+          <a:fontRef idx="minor">
+            <a:schemeClr val="tx1"/>
+          </a:fontRef>
+        </p:style>
+      </p:cxnSp>
+      <p:cxnSp>
+        <p:nvCxnSpPr>
+          <p:cNvPr id="160" name="Straight Arrow Connector 203">
+            <a:extLst>
+              <a:ext uri="{FF2B5EF4-FFF2-40B4-BE49-F238E27FC236}">
+                <a16:creationId xmlns:a16="http://schemas.microsoft.com/office/drawing/2014/main" id="{521EE7D9-EF74-4731-B4BC-630792704D36}"/>
+              </a:ext>
+            </a:extLst>
+          </p:cNvPr>
+          <p:cNvCxnSpPr>
+            <a:cxnSpLocks/>
+            <a:stCxn id="67" idx="1"/>
+            <a:endCxn id="62" idx="1"/>
+          </p:cNvCxnSpPr>
+          <p:nvPr/>
+        </p:nvCxnSpPr>
+        <p:spPr>
+          <a:xfrm rot="10800000">
+            <a:off x="5785160" y="4333067"/>
+            <a:ext cx="37628" cy="1353634"/>
+          </a:xfrm>
+          <a:prstGeom prst="curvedConnector3">
+            <a:avLst>
+              <a:gd name="adj1" fmla="val 1213798"/>
+            </a:avLst>
+          </a:prstGeom>
+          <a:ln w="6350">
+            <a:prstDash val="sysDot"/>
+            <a:headEnd type="triangle"/>
+            <a:tailEnd type="triangle"/>
+          </a:ln>
+        </p:spPr>
+        <p:style>
+          <a:lnRef idx="1">
+            <a:schemeClr val="accent1"/>
+          </a:lnRef>
+          <a:fillRef idx="0">
+            <a:schemeClr val="accent1"/>
+          </a:fillRef>
+          <a:effectRef idx="0">
+            <a:schemeClr val="accent1"/>
+          </a:effectRef>
+          <a:fontRef idx="minor">
+            <a:schemeClr val="tx1"/>
+          </a:fontRef>
+        </p:style>
+      </p:cxnSp>
+      <p:cxnSp>
+        <p:nvCxnSpPr>
+          <p:cNvPr id="164" name="Straight Arrow Connector 203">
+            <a:extLst>
+              <a:ext uri="{FF2B5EF4-FFF2-40B4-BE49-F238E27FC236}">
+                <a16:creationId xmlns:a16="http://schemas.microsoft.com/office/drawing/2014/main" id="{0265B949-2BF6-4A7B-B9DE-CDAAF7FB5FE1}"/>
+              </a:ext>
+            </a:extLst>
+          </p:cNvPr>
+          <p:cNvCxnSpPr>
+            <a:cxnSpLocks/>
+            <a:stCxn id="149" idx="1"/>
+            <a:endCxn id="63" idx="1"/>
+          </p:cNvCxnSpPr>
+          <p:nvPr/>
+        </p:nvCxnSpPr>
+        <p:spPr>
+          <a:xfrm rot="10800000">
+            <a:off x="7283498" y="4277778"/>
+            <a:ext cx="21285" cy="1377878"/>
+          </a:xfrm>
+          <a:prstGeom prst="curvedConnector3">
+            <a:avLst>
+              <a:gd name="adj1" fmla="val 2091365"/>
             </a:avLst>
           </a:prstGeom>
           <a:ln w="6350">
@@ -8278,7 +8970,7 @@
 </p:sld>
 </file>
 
-<file path=ppt/slides/slide3.xml><?xml version="1.0" encoding="utf-8"?>
+<file path=ppt/slides/slide4.xml><?xml version="1.0" encoding="utf-8"?>
 <p:sld xmlns:a="http://schemas.openxmlformats.org/drawingml/2006/main" xmlns:r="http://schemas.openxmlformats.org/officeDocument/2006/relationships" xmlns:p="http://schemas.openxmlformats.org/presentationml/2006/main">
   <p:cSld>
     <p:spTree>
@@ -11093,7 +11785,7 @@
 </p:sld>
 </file>
 
-<file path=ppt/slides/slide4.xml><?xml version="1.0" encoding="utf-8"?>
+<file path=ppt/slides/slide5.xml><?xml version="1.0" encoding="utf-8"?>
 <p:sld xmlns:a="http://schemas.openxmlformats.org/drawingml/2006/main" xmlns:r="http://schemas.openxmlformats.org/officeDocument/2006/relationships" xmlns:p="http://schemas.openxmlformats.org/presentationml/2006/main">
   <p:cSld>
     <p:spTree>
@@ -12650,44 +13342,44 @@
         <a:sysClr val="window" lastClr="FFFFFF"/>
       </a:lt1>
       <a:dk2>
-        <a:srgbClr val="1F497D"/>
+        <a:srgbClr val="44546A"/>
       </a:dk2>
       <a:lt2>
-        <a:srgbClr val="EEECE1"/>
+        <a:srgbClr val="E7E6E6"/>
       </a:lt2>
       <a:accent1>
-        <a:srgbClr val="4F81BD"/>
+        <a:srgbClr val="4472C4"/>
       </a:accent1>
       <a:accent2>
-        <a:srgbClr val="C0504D"/>
+        <a:srgbClr val="ED7D31"/>
       </a:accent2>
       <a:accent3>
-        <a:srgbClr val="9BBB59"/>
+        <a:srgbClr val="A5A5A5"/>
       </a:accent3>
       <a:accent4>
-        <a:srgbClr val="8064A2"/>
+        <a:srgbClr val="FFC000"/>
       </a:accent4>
       <a:accent5>
-        <a:srgbClr val="4BACC6"/>
+        <a:srgbClr val="5B9BD5"/>
       </a:accent5>
       <a:accent6>
-        <a:srgbClr val="F79646"/>
+        <a:srgbClr val="70AD47"/>
       </a:accent6>
       <a:hlink>
-        <a:srgbClr val="0000FF"/>
+        <a:srgbClr val="0563C1"/>
       </a:hlink>
       <a:folHlink>
-        <a:srgbClr val="800080"/>
+        <a:srgbClr val="954F72"/>
       </a:folHlink>
     </a:clrScheme>
     <a:fontScheme name="Office">
       <a:majorFont>
-        <a:latin typeface="Calibri"/>
+        <a:latin typeface="Calibri Light" panose="020F0302020204030204"/>
         <a:ea typeface=""/>
         <a:cs typeface=""/>
-        <a:font script="Jpan" typeface="ＭＳ Ｐゴシック"/>
+        <a:font script="Jpan" typeface="游ゴシック Light"/>
         <a:font script="Hang" typeface="맑은 고딕"/>
-        <a:font script="Hans" typeface="宋体"/>
+        <a:font script="Hans" typeface="等线 Light"/>
         <a:font script="Hant" typeface="新細明體"/>
         <a:font script="Arab" typeface="Times New Roman"/>
         <a:font script="Hebr" typeface="Times New Roman"/>
@@ -12715,14 +13407,31 @@
         <a:font script="Viet" typeface="Times New Roman"/>
         <a:font script="Uigh" typeface="Microsoft Uighur"/>
         <a:font script="Geor" typeface="Sylfaen"/>
+        <a:font script="Armn" typeface="Arial"/>
+        <a:font script="Bugi" typeface="Leelawadee UI"/>
+        <a:font script="Bopo" typeface="Microsoft JhengHei"/>
+        <a:font script="Java" typeface="Javanese Text"/>
+        <a:font script="Lisu" typeface="Segoe UI"/>
+        <a:font script="Mymr" typeface="Myanmar Text"/>
+        <a:font script="Nkoo" typeface="Ebrima"/>
+        <a:font script="Olck" typeface="Nirmala UI"/>
+        <a:font script="Osma" typeface="Ebrima"/>
+        <a:font script="Phag" typeface="Phagspa"/>
+        <a:font script="Syrn" typeface="Estrangelo Edessa"/>
+        <a:font script="Syrj" typeface="Estrangelo Edessa"/>
+        <a:font script="Syre" typeface="Estrangelo Edessa"/>
+        <a:font script="Sora" typeface="Nirmala UI"/>
+        <a:font script="Tale" typeface="Microsoft Tai Le"/>
+        <a:font script="Talu" typeface="Microsoft New Tai Lue"/>
+        <a:font script="Tfng" typeface="Ebrima"/>
       </a:majorFont>
       <a:minorFont>
-        <a:latin typeface="Calibri"/>
+        <a:latin typeface="Calibri" panose="020F0502020204030204"/>
         <a:ea typeface=""/>
         <a:cs typeface=""/>
-        <a:font script="Jpan" typeface="ＭＳ Ｐゴシック"/>
+        <a:font script="Jpan" typeface="游ゴシック"/>
         <a:font script="Hang" typeface="맑은 고딕"/>
-        <a:font script="Hans" typeface="宋体"/>
+        <a:font script="Hans" typeface="等线"/>
         <a:font script="Hant" typeface="新細明體"/>
         <a:font script="Arab" typeface="Arial"/>
         <a:font script="Hebr" typeface="Arial"/>
@@ -12750,6 +13459,23 @@
         <a:font script="Viet" typeface="Arial"/>
         <a:font script="Uigh" typeface="Microsoft Uighur"/>
         <a:font script="Geor" typeface="Sylfaen"/>
+        <a:font script="Armn" typeface="Arial"/>
+        <a:font script="Bugi" typeface="Leelawadee UI"/>
+        <a:font script="Bopo" typeface="Microsoft JhengHei"/>
+        <a:font script="Java" typeface="Javanese Text"/>
+        <a:font script="Lisu" typeface="Segoe UI"/>
+        <a:font script="Mymr" typeface="Myanmar Text"/>
+        <a:font script="Nkoo" typeface="Ebrima"/>
+        <a:font script="Olck" typeface="Nirmala UI"/>
+        <a:font script="Osma" typeface="Ebrima"/>
+        <a:font script="Phag" typeface="Phagspa"/>
+        <a:font script="Syrn" typeface="Estrangelo Edessa"/>
+        <a:font script="Syrj" typeface="Estrangelo Edessa"/>
+        <a:font script="Syre" typeface="Estrangelo Edessa"/>
+        <a:font script="Sora" typeface="Nirmala UI"/>
+        <a:font script="Tale" typeface="Microsoft Tai Le"/>
+        <a:font script="Talu" typeface="Microsoft New Tai Lue"/>
+        <a:font script="Tfng" typeface="Ebrima"/>
       </a:minorFont>
     </a:fontScheme>
     <a:fmtScheme name="Office">
@@ -12761,165 +13487,141 @@
           <a:gsLst>
             <a:gs pos="0">
               <a:schemeClr val="phClr">
-                <a:tint val="50000"/>
-                <a:satMod val="300000"/>
+                <a:lumMod val="110000"/>
+                <a:satMod val="105000"/>
+                <a:tint val="67000"/>
               </a:schemeClr>
             </a:gs>
-            <a:gs pos="35000">
+            <a:gs pos="50000">
               <a:schemeClr val="phClr">
-                <a:tint val="37000"/>
-                <a:satMod val="300000"/>
+                <a:lumMod val="105000"/>
+                <a:satMod val="103000"/>
+                <a:tint val="73000"/>
               </a:schemeClr>
             </a:gs>
             <a:gs pos="100000">
               <a:schemeClr val="phClr">
-                <a:tint val="15000"/>
-                <a:satMod val="350000"/>
+                <a:lumMod val="105000"/>
+                <a:satMod val="109000"/>
+                <a:tint val="81000"/>
               </a:schemeClr>
             </a:gs>
           </a:gsLst>
-          <a:lin ang="16200000" scaled="1"/>
+          <a:lin ang="5400000" scaled="0"/>
         </a:gradFill>
         <a:gradFill rotWithShape="1">
           <a:gsLst>
             <a:gs pos="0">
               <a:schemeClr val="phClr">
-                <a:shade val="51000"/>
-                <a:satMod val="130000"/>
+                <a:satMod val="103000"/>
+                <a:lumMod val="102000"/>
+                <a:tint val="94000"/>
               </a:schemeClr>
             </a:gs>
-            <a:gs pos="80000">
+            <a:gs pos="50000">
               <a:schemeClr val="phClr">
-                <a:shade val="93000"/>
-                <a:satMod val="130000"/>
+                <a:satMod val="110000"/>
+                <a:lumMod val="100000"/>
+                <a:shade val="100000"/>
               </a:schemeClr>
             </a:gs>
             <a:gs pos="100000">
               <a:schemeClr val="phClr">
-                <a:shade val="94000"/>
-                <a:satMod val="135000"/>
+                <a:lumMod val="99000"/>
+                <a:satMod val="120000"/>
+                <a:shade val="78000"/>
               </a:schemeClr>
             </a:gs>
           </a:gsLst>
-          <a:lin ang="16200000" scaled="0"/>
+          <a:lin ang="5400000" scaled="0"/>
         </a:gradFill>
       </a:fillStyleLst>
       <a:lnStyleLst>
-        <a:ln w="9525" cap="flat" cmpd="sng" algn="ctr">
-          <a:solidFill>
-            <a:schemeClr val="phClr">
-              <a:shade val="95000"/>
-              <a:satMod val="105000"/>
-            </a:schemeClr>
-          </a:solidFill>
-          <a:prstDash val="solid"/>
-        </a:ln>
-        <a:ln w="25400" cap="flat" cmpd="sng" algn="ctr">
+        <a:ln w="6350" cap="flat" cmpd="sng" algn="ctr">
           <a:solidFill>
             <a:schemeClr val="phClr"/>
           </a:solidFill>
           <a:prstDash val="solid"/>
+          <a:miter lim="800000"/>
         </a:ln>
-        <a:ln w="38100" cap="flat" cmpd="sng" algn="ctr">
+        <a:ln w="12700" cap="flat" cmpd="sng" algn="ctr">
           <a:solidFill>
             <a:schemeClr val="phClr"/>
           </a:solidFill>
           <a:prstDash val="solid"/>
+          <a:miter lim="800000"/>
+        </a:ln>
+        <a:ln w="19050" cap="flat" cmpd="sng" algn="ctr">
+          <a:solidFill>
+            <a:schemeClr val="phClr"/>
+          </a:solidFill>
+          <a:prstDash val="solid"/>
+          <a:miter lim="800000"/>
         </a:ln>
       </a:lnStyleLst>
       <a:effectStyleLst>
         <a:effectStyle>
+          <a:effectLst/>
+        </a:effectStyle>
+        <a:effectStyle>
+          <a:effectLst/>
+        </a:effectStyle>
+        <a:effectStyle>
           <a:effectLst>
-            <a:outerShdw blurRad="40000" dist="20000" dir="5400000" rotWithShape="0">
+            <a:outerShdw blurRad="57150" dist="19050" dir="5400000" algn="ctr" rotWithShape="0">
               <a:srgbClr val="000000">
-                <a:alpha val="38000"/>
+                <a:alpha val="63000"/>
               </a:srgbClr>
             </a:outerShdw>
           </a:effectLst>
-        </a:effectStyle>
-        <a:effectStyle>
-          <a:effectLst>
-            <a:outerShdw blurRad="40000" dist="23000" dir="5400000" rotWithShape="0">
-              <a:srgbClr val="000000">
-                <a:alpha val="35000"/>
-              </a:srgbClr>
-            </a:outerShdw>
-          </a:effectLst>
-        </a:effectStyle>
-        <a:effectStyle>
-          <a:effectLst>
-            <a:outerShdw blurRad="40000" dist="23000" dir="5400000" rotWithShape="0">
-              <a:srgbClr val="000000">
-                <a:alpha val="35000"/>
-              </a:srgbClr>
-            </a:outerShdw>
-          </a:effectLst>
-          <a:scene3d>
-            <a:camera prst="orthographicFront">
-              <a:rot lat="0" lon="0" rev="0"/>
-            </a:camera>
-            <a:lightRig rig="threePt" dir="t">
-              <a:rot lat="0" lon="0" rev="1200000"/>
-            </a:lightRig>
-          </a:scene3d>
-          <a:sp3d>
-            <a:bevelT w="63500" h="25400"/>
-          </a:sp3d>
         </a:effectStyle>
       </a:effectStyleLst>
       <a:bgFillStyleLst>
         <a:solidFill>
           <a:schemeClr val="phClr"/>
         </a:solidFill>
+        <a:solidFill>
+          <a:schemeClr val="phClr">
+            <a:tint val="95000"/>
+            <a:satMod val="170000"/>
+          </a:schemeClr>
+        </a:solidFill>
         <a:gradFill rotWithShape="1">
           <a:gsLst>
             <a:gs pos="0">
               <a:schemeClr val="phClr">
-                <a:tint val="40000"/>
-                <a:satMod val="350000"/>
+                <a:tint val="93000"/>
+                <a:satMod val="150000"/>
+                <a:shade val="98000"/>
+                <a:lumMod val="102000"/>
               </a:schemeClr>
             </a:gs>
-            <a:gs pos="40000">
+            <a:gs pos="50000">
               <a:schemeClr val="phClr">
-                <a:tint val="45000"/>
-                <a:shade val="99000"/>
-                <a:satMod val="350000"/>
+                <a:tint val="98000"/>
+                <a:satMod val="130000"/>
+                <a:shade val="90000"/>
+                <a:lumMod val="103000"/>
               </a:schemeClr>
             </a:gs>
             <a:gs pos="100000">
               <a:schemeClr val="phClr">
-                <a:shade val="20000"/>
-                <a:satMod val="255000"/>
+                <a:shade val="63000"/>
+                <a:satMod val="120000"/>
               </a:schemeClr>
             </a:gs>
           </a:gsLst>
-          <a:path path="circle">
-            <a:fillToRect l="50000" t="-80000" r="50000" b="180000"/>
-          </a:path>
-        </a:gradFill>
-        <a:gradFill rotWithShape="1">
-          <a:gsLst>
-            <a:gs pos="0">
-              <a:schemeClr val="phClr">
-                <a:tint val="80000"/>
-                <a:satMod val="300000"/>
-              </a:schemeClr>
-            </a:gs>
-            <a:gs pos="100000">
-              <a:schemeClr val="phClr">
-                <a:shade val="30000"/>
-                <a:satMod val="200000"/>
-              </a:schemeClr>
-            </a:gs>
-          </a:gsLst>
-          <a:path path="circle">
-            <a:fillToRect l="50000" t="50000" r="50000" b="50000"/>
-          </a:path>
+          <a:lin ang="5400000" scaled="0"/>
         </a:gradFill>
       </a:bgFillStyleLst>
     </a:fmtScheme>
   </a:themeElements>
   <a:objectDefaults/>
   <a:extraClrSchemeLst/>
+  <a:extLst>
+    <a:ext uri="{05A4C25C-085E-4340-85A3-A5531E510DB2}">
+      <thm15:themeFamily xmlns:thm15="http://schemas.microsoft.com/office/thememl/2012/main" name="Office Theme" id="{62F939B6-93AF-4DB8-9C6B-D6C7DFDC589F}" vid="{4A3C46E8-61CC-4603-A589-7422A47A8E4A}"/>
+    </a:ext>
+  </a:extLst>
 </a:theme>
 </file>
</xml_diff>

<commit_message>
#9 corect config for MySQL and update readme
</commit_message>
<xml_diff>
--- a/assets/state-of-the-art.pptx
+++ b/assets/state-of-the-art.pptx
@@ -274,7 +274,7 @@
           <a:p>
             <a:fld id="{6DB206C8-F88B-4959-9CD2-3016D27660E1}" type="datetimeFigureOut">
               <a:rPr lang="en-US" smtClean="0"/>
-              <a:t>8/8/2018</a:t>
+              <a:t>8/26/2018</a:t>
             </a:fld>
             <a:endParaRPr lang="en-US"/>
           </a:p>
@@ -472,7 +472,7 @@
           <a:p>
             <a:fld id="{6DB206C8-F88B-4959-9CD2-3016D27660E1}" type="datetimeFigureOut">
               <a:rPr lang="en-US" smtClean="0"/>
-              <a:t>8/8/2018</a:t>
+              <a:t>8/26/2018</a:t>
             </a:fld>
             <a:endParaRPr lang="en-US"/>
           </a:p>
@@ -680,7 +680,7 @@
           <a:p>
             <a:fld id="{6DB206C8-F88B-4959-9CD2-3016D27660E1}" type="datetimeFigureOut">
               <a:rPr lang="en-US" smtClean="0"/>
-              <a:t>8/8/2018</a:t>
+              <a:t>8/26/2018</a:t>
             </a:fld>
             <a:endParaRPr lang="en-US"/>
           </a:p>
@@ -878,7 +878,7 @@
           <a:p>
             <a:fld id="{6DB206C8-F88B-4959-9CD2-3016D27660E1}" type="datetimeFigureOut">
               <a:rPr lang="en-US" smtClean="0"/>
-              <a:t>8/8/2018</a:t>
+              <a:t>8/26/2018</a:t>
             </a:fld>
             <a:endParaRPr lang="en-US"/>
           </a:p>
@@ -1153,7 +1153,7 @@
           <a:p>
             <a:fld id="{6DB206C8-F88B-4959-9CD2-3016D27660E1}" type="datetimeFigureOut">
               <a:rPr lang="en-US" smtClean="0"/>
-              <a:t>8/8/2018</a:t>
+              <a:t>8/26/2018</a:t>
             </a:fld>
             <a:endParaRPr lang="en-US"/>
           </a:p>
@@ -1418,7 +1418,7 @@
           <a:p>
             <a:fld id="{6DB206C8-F88B-4959-9CD2-3016D27660E1}" type="datetimeFigureOut">
               <a:rPr lang="en-US" smtClean="0"/>
-              <a:t>8/8/2018</a:t>
+              <a:t>8/26/2018</a:t>
             </a:fld>
             <a:endParaRPr lang="en-US"/>
           </a:p>
@@ -1830,7 +1830,7 @@
           <a:p>
             <a:fld id="{6DB206C8-F88B-4959-9CD2-3016D27660E1}" type="datetimeFigureOut">
               <a:rPr lang="en-US" smtClean="0"/>
-              <a:t>8/8/2018</a:t>
+              <a:t>8/26/2018</a:t>
             </a:fld>
             <a:endParaRPr lang="en-US"/>
           </a:p>
@@ -1971,7 +1971,7 @@
           <a:p>
             <a:fld id="{6DB206C8-F88B-4959-9CD2-3016D27660E1}" type="datetimeFigureOut">
               <a:rPr lang="en-US" smtClean="0"/>
-              <a:t>8/8/2018</a:t>
+              <a:t>8/26/2018</a:t>
             </a:fld>
             <a:endParaRPr lang="en-US"/>
           </a:p>
@@ -2084,7 +2084,7 @@
           <a:p>
             <a:fld id="{6DB206C8-F88B-4959-9CD2-3016D27660E1}" type="datetimeFigureOut">
               <a:rPr lang="en-US" smtClean="0"/>
-              <a:t>8/8/2018</a:t>
+              <a:t>8/26/2018</a:t>
             </a:fld>
             <a:endParaRPr lang="en-US"/>
           </a:p>
@@ -2395,7 +2395,7 @@
           <a:p>
             <a:fld id="{6DB206C8-F88B-4959-9CD2-3016D27660E1}" type="datetimeFigureOut">
               <a:rPr lang="en-US" smtClean="0"/>
-              <a:t>8/8/2018</a:t>
+              <a:t>8/26/2018</a:t>
             </a:fld>
             <a:endParaRPr lang="en-US"/>
           </a:p>
@@ -2683,7 +2683,7 @@
           <a:p>
             <a:fld id="{6DB206C8-F88B-4959-9CD2-3016D27660E1}" type="datetimeFigureOut">
               <a:rPr lang="en-US" smtClean="0"/>
-              <a:t>8/8/2018</a:t>
+              <a:t>8/26/2018</a:t>
             </a:fld>
             <a:endParaRPr lang="en-US"/>
           </a:p>
@@ -2924,7 +2924,7 @@
           <a:p>
             <a:fld id="{6DB206C8-F88B-4959-9CD2-3016D27660E1}" type="datetimeFigureOut">
               <a:rPr lang="en-US" smtClean="0"/>
-              <a:t>8/8/2018</a:t>
+              <a:t>8/26/2018</a:t>
             </a:fld>
             <a:endParaRPr lang="en-US"/>
           </a:p>
@@ -6048,135 +6048,78 @@
                   <a:chExt cx="1030081" cy="1064247"/>
                 </a:xfrm>
               </p:grpSpPr>
-              <p:grpSp>
-                <p:nvGrpSpPr>
-                  <p:cNvPr id="64" name="Group 63">
+              <p:sp>
+                <p:nvSpPr>
+                  <p:cNvPr id="65" name="Hexagon 176">
                     <a:extLst>
                       <a:ext uri="{FF2B5EF4-FFF2-40B4-BE49-F238E27FC236}">
-                        <a16:creationId xmlns:a16="http://schemas.microsoft.com/office/drawing/2014/main" id="{A534364C-145B-415B-88ED-CCB611E7FF4F}"/>
+                        <a16:creationId xmlns:a16="http://schemas.microsoft.com/office/drawing/2014/main" id="{8F8E11A5-36AB-4E1E-88D8-BE5A0A8AF256}"/>
                       </a:ext>
                     </a:extLst>
                   </p:cNvPr>
-                  <p:cNvGrpSpPr/>
+                  <p:cNvSpPr/>
                   <p:nvPr/>
-                </p:nvGrpSpPr>
-                <p:grpSpPr>
+                </p:nvSpPr>
+                <p:spPr bwMode="auto">
                   <a:xfrm>
                     <a:off x="3313319" y="4812869"/>
                     <a:ext cx="1030081" cy="935773"/>
-                    <a:chOff x="1847159" y="4836151"/>
-                    <a:chExt cx="1030081" cy="935773"/>
                   </a:xfrm>
-                </p:grpSpPr>
-                <p:sp>
-                  <p:nvSpPr>
-                    <p:cNvPr id="65" name="Hexagon 176">
-                      <a:extLst>
-                        <a:ext uri="{FF2B5EF4-FFF2-40B4-BE49-F238E27FC236}">
-                          <a16:creationId xmlns:a16="http://schemas.microsoft.com/office/drawing/2014/main" id="{8F8E11A5-36AB-4E1E-88D8-BE5A0A8AF256}"/>
-                        </a:ext>
-                      </a:extLst>
-                    </p:cNvPr>
-                    <p:cNvSpPr/>
-                    <p:nvPr/>
-                  </p:nvSpPr>
-                  <p:spPr bwMode="auto">
-                    <a:xfrm>
-                      <a:off x="1847159" y="4836151"/>
-                      <a:ext cx="1030081" cy="935773"/>
-                    </a:xfrm>
-                    <a:prstGeom prst="hexagon">
-                      <a:avLst>
-                        <a:gd name="adj" fmla="val 28624"/>
-                        <a:gd name="vf" fmla="val 115470"/>
-                      </a:avLst>
-                    </a:prstGeom>
-                    <a:ln>
-                      <a:headEnd type="none" w="med" len="med"/>
-                      <a:tailEnd type="none" w="med" len="med"/>
-                    </a:ln>
-                  </p:spPr>
-                  <p:style>
-                    <a:lnRef idx="2">
-                      <a:schemeClr val="accent4"/>
-                    </a:lnRef>
-                    <a:fillRef idx="1">
-                      <a:schemeClr val="lt1"/>
-                    </a:fillRef>
-                    <a:effectRef idx="0">
-                      <a:schemeClr val="accent4"/>
-                    </a:effectRef>
-                    <a:fontRef idx="minor">
-                      <a:schemeClr val="dk1"/>
-                    </a:fontRef>
-                  </p:style>
-                  <p:txBody>
-                    <a:bodyPr rot="0" spcFirstLastPara="0" vertOverflow="overflow" horzOverflow="overflow" vert="horz" wrap="square" lIns="0" tIns="560064" rIns="0" bIns="380632" numCol="1" spcCol="0" rtlCol="0" fromWordArt="0" anchor="t" anchorCtr="0" forceAA="0" compatLnSpc="1">
-                      <a:prstTxWarp prst="textNoShape">
-                        <a:avLst/>
-                      </a:prstTxWarp>
-                      <a:noAutofit/>
-                    </a:bodyPr>
-                    <a:lstStyle/>
-                    <a:p>
-                      <a:pPr algn="ctr" defTabSz="878453" fontAlgn="base">
-                        <a:lnSpc>
-                          <a:spcPct val="90000"/>
-                        </a:lnSpc>
-                        <a:spcBef>
-                          <a:spcPct val="0"/>
-                        </a:spcBef>
-                        <a:spcAft>
-                          <a:spcPct val="0"/>
-                        </a:spcAft>
-                      </a:pPr>
-                      <a:endParaRPr lang="en-US" sz="1131" b="1" dirty="0">
-                        <a:solidFill>
-                          <a:schemeClr val="tx1"/>
-                        </a:solidFill>
-                        <a:latin typeface="Segoe UI" charset="0"/>
-                        <a:cs typeface="Segoe UI" charset="0"/>
-                      </a:endParaRPr>
-                    </a:p>
-                  </p:txBody>
-                </p:sp>
-                <p:pic>
-                  <p:nvPicPr>
-                    <p:cNvPr id="66" name="Picture 65">
-                      <a:extLst>
-                        <a:ext uri="{FF2B5EF4-FFF2-40B4-BE49-F238E27FC236}">
-                          <a16:creationId xmlns:a16="http://schemas.microsoft.com/office/drawing/2014/main" id="{4914D168-09C0-457F-B73D-4C024B0532A6}"/>
-                        </a:ext>
-                      </a:extLst>
-                    </p:cNvPr>
-                    <p:cNvPicPr>
-                      <a:picLocks noChangeAspect="1"/>
-                    </p:cNvPicPr>
-                    <p:nvPr/>
-                  </p:nvPicPr>
-                  <p:blipFill>
-                    <a:blip r:embed="rId11" cstate="print">
-                      <a:extLst>
-                        <a:ext uri="{28A0092B-C50C-407E-A947-70E740481C1C}">
-                          <a14:useLocalDpi xmlns:a14="http://schemas.microsoft.com/office/drawing/2010/main" val="0"/>
-                        </a:ext>
-                      </a:extLst>
-                    </a:blip>
-                    <a:stretch>
-                      <a:fillRect/>
-                    </a:stretch>
-                  </p:blipFill>
-                  <p:spPr>
-                    <a:xfrm>
-                      <a:off x="2082197" y="5059918"/>
-                      <a:ext cx="562911" cy="455057"/>
-                    </a:xfrm>
-                    <a:prstGeom prst="rect">
+                  <a:prstGeom prst="hexagon">
+                    <a:avLst>
+                      <a:gd name="adj" fmla="val 28624"/>
+                      <a:gd name="vf" fmla="val 115470"/>
+                    </a:avLst>
+                  </a:prstGeom>
+                  <a:ln>
+                    <a:headEnd type="none" w="med" len="med"/>
+                    <a:tailEnd type="none" w="med" len="med"/>
+                  </a:ln>
+                </p:spPr>
+                <p:style>
+                  <a:lnRef idx="2">
+                    <a:schemeClr val="accent4"/>
+                  </a:lnRef>
+                  <a:fillRef idx="1">
+                    <a:schemeClr val="lt1"/>
+                  </a:fillRef>
+                  <a:effectRef idx="0">
+                    <a:schemeClr val="accent4"/>
+                  </a:effectRef>
+                  <a:fontRef idx="minor">
+                    <a:schemeClr val="dk1"/>
+                  </a:fontRef>
+                </p:style>
+                <p:txBody>
+                  <a:bodyPr rot="0" spcFirstLastPara="0" vertOverflow="overflow" horzOverflow="overflow" vert="horz" wrap="square" lIns="0" tIns="560064" rIns="0" bIns="380632" numCol="1" spcCol="0" rtlCol="0" fromWordArt="0" anchor="t" anchorCtr="0" forceAA="0" compatLnSpc="1">
+                    <a:prstTxWarp prst="textNoShape">
                       <a:avLst/>
-                    </a:prstGeom>
-                  </p:spPr>
-                </p:pic>
-              </p:grpSp>
+                    </a:prstTxWarp>
+                    <a:noAutofit/>
+                  </a:bodyPr>
+                  <a:lstStyle/>
+                  <a:p>
+                    <a:pPr algn="ctr" defTabSz="878453" fontAlgn="base">
+                      <a:lnSpc>
+                        <a:spcPct val="90000"/>
+                      </a:lnSpc>
+                      <a:spcBef>
+                        <a:spcPct val="0"/>
+                      </a:spcBef>
+                      <a:spcAft>
+                        <a:spcPct val="0"/>
+                      </a:spcAft>
+                    </a:pPr>
+                    <a:endParaRPr lang="en-US" sz="1131" b="1" dirty="0">
+                      <a:solidFill>
+                        <a:schemeClr val="tx1"/>
+                      </a:solidFill>
+                      <a:latin typeface="Segoe UI" charset="0"/>
+                      <a:cs typeface="Segoe UI" charset="0"/>
+                    </a:endParaRPr>
+                  </a:p>
+                </p:txBody>
+              </p:sp>
               <p:sp>
                 <p:nvSpPr>
                   <p:cNvPr id="69" name="Rectangle 68">
@@ -6414,135 +6357,78 @@
                 <a:chExt cx="1030081" cy="1054478"/>
               </a:xfrm>
             </p:grpSpPr>
-            <p:grpSp>
-              <p:nvGrpSpPr>
-                <p:cNvPr id="29" name="Group 28">
+            <p:sp>
+              <p:nvSpPr>
+                <p:cNvPr id="61" name="Hexagon 176">
                   <a:extLst>
                     <a:ext uri="{FF2B5EF4-FFF2-40B4-BE49-F238E27FC236}">
-                      <a16:creationId xmlns:a16="http://schemas.microsoft.com/office/drawing/2014/main" id="{5711DF41-7BE3-415F-9E7F-E89773174A0C}"/>
+                      <a16:creationId xmlns:a16="http://schemas.microsoft.com/office/drawing/2014/main" id="{37C51CFF-FD26-4F34-BF6D-2C68729102B7}"/>
                     </a:ext>
                   </a:extLst>
                 </p:cNvPr>
-                <p:cNvGrpSpPr/>
+                <p:cNvSpPr/>
                 <p:nvPr/>
-              </p:nvGrpSpPr>
-              <p:grpSpPr>
+              </p:nvSpPr>
+              <p:spPr bwMode="auto">
                 <a:xfrm>
                   <a:off x="1858787" y="4847680"/>
                   <a:ext cx="1030081" cy="935773"/>
-                  <a:chOff x="1847159" y="4836151"/>
-                  <a:chExt cx="1030081" cy="935773"/>
                 </a:xfrm>
-              </p:grpSpPr>
-              <p:sp>
-                <p:nvSpPr>
-                  <p:cNvPr id="61" name="Hexagon 176">
-                    <a:extLst>
-                      <a:ext uri="{FF2B5EF4-FFF2-40B4-BE49-F238E27FC236}">
-                        <a16:creationId xmlns:a16="http://schemas.microsoft.com/office/drawing/2014/main" id="{37C51CFF-FD26-4F34-BF6D-2C68729102B7}"/>
-                      </a:ext>
-                    </a:extLst>
-                  </p:cNvPr>
-                  <p:cNvSpPr/>
-                  <p:nvPr/>
-                </p:nvSpPr>
-                <p:spPr bwMode="auto">
-                  <a:xfrm>
-                    <a:off x="1847159" y="4836151"/>
-                    <a:ext cx="1030081" cy="935773"/>
-                  </a:xfrm>
-                  <a:prstGeom prst="hexagon">
-                    <a:avLst>
-                      <a:gd name="adj" fmla="val 28624"/>
-                      <a:gd name="vf" fmla="val 115470"/>
-                    </a:avLst>
-                  </a:prstGeom>
-                  <a:ln>
-                    <a:headEnd type="none" w="med" len="med"/>
-                    <a:tailEnd type="none" w="med" len="med"/>
-                  </a:ln>
-                </p:spPr>
-                <p:style>
-                  <a:lnRef idx="2">
-                    <a:schemeClr val="accent4"/>
-                  </a:lnRef>
-                  <a:fillRef idx="1">
-                    <a:schemeClr val="lt1"/>
-                  </a:fillRef>
-                  <a:effectRef idx="0">
-                    <a:schemeClr val="accent4"/>
-                  </a:effectRef>
-                  <a:fontRef idx="minor">
-                    <a:schemeClr val="dk1"/>
-                  </a:fontRef>
-                </p:style>
-                <p:txBody>
-                  <a:bodyPr rot="0" spcFirstLastPara="0" vertOverflow="overflow" horzOverflow="overflow" vert="horz" wrap="square" lIns="0" tIns="560064" rIns="0" bIns="380632" numCol="1" spcCol="0" rtlCol="0" fromWordArt="0" anchor="t" anchorCtr="0" forceAA="0" compatLnSpc="1">
-                    <a:prstTxWarp prst="textNoShape">
-                      <a:avLst/>
-                    </a:prstTxWarp>
-                    <a:noAutofit/>
-                  </a:bodyPr>
-                  <a:lstStyle/>
-                  <a:p>
-                    <a:pPr algn="ctr" defTabSz="878453" fontAlgn="base">
-                      <a:lnSpc>
-                        <a:spcPct val="90000"/>
-                      </a:lnSpc>
-                      <a:spcBef>
-                        <a:spcPct val="0"/>
-                      </a:spcBef>
-                      <a:spcAft>
-                        <a:spcPct val="0"/>
-                      </a:spcAft>
-                    </a:pPr>
-                    <a:endParaRPr lang="en-US" sz="1131" b="1" dirty="0">
-                      <a:solidFill>
-                        <a:schemeClr val="tx1"/>
-                      </a:solidFill>
-                      <a:latin typeface="Segoe UI" charset="0"/>
-                      <a:cs typeface="Segoe UI" charset="0"/>
-                    </a:endParaRPr>
-                  </a:p>
-                </p:txBody>
-              </p:sp>
-              <p:pic>
-                <p:nvPicPr>
-                  <p:cNvPr id="27" name="Picture 26">
-                    <a:extLst>
-                      <a:ext uri="{FF2B5EF4-FFF2-40B4-BE49-F238E27FC236}">
-                        <a16:creationId xmlns:a16="http://schemas.microsoft.com/office/drawing/2014/main" id="{814B6059-262D-4CA7-BED1-D6D172E1E070}"/>
-                      </a:ext>
-                    </a:extLst>
-                  </p:cNvPr>
-                  <p:cNvPicPr>
-                    <a:picLocks noChangeAspect="1"/>
-                  </p:cNvPicPr>
-                  <p:nvPr/>
-                </p:nvPicPr>
-                <p:blipFill>
-                  <a:blip r:embed="rId11" cstate="print">
-                    <a:extLst>
-                      <a:ext uri="{28A0092B-C50C-407E-A947-70E740481C1C}">
-                        <a14:useLocalDpi xmlns:a14="http://schemas.microsoft.com/office/drawing/2010/main" val="0"/>
-                      </a:ext>
-                    </a:extLst>
-                  </a:blip>
-                  <a:stretch>
-                    <a:fillRect/>
-                  </a:stretch>
-                </p:blipFill>
-                <p:spPr>
-                  <a:xfrm>
-                    <a:off x="2082197" y="5059918"/>
-                    <a:ext cx="562911" cy="455057"/>
-                  </a:xfrm>
-                  <a:prstGeom prst="rect">
+                <a:prstGeom prst="hexagon">
+                  <a:avLst>
+                    <a:gd name="adj" fmla="val 28624"/>
+                    <a:gd name="vf" fmla="val 115470"/>
+                  </a:avLst>
+                </a:prstGeom>
+                <a:ln>
+                  <a:headEnd type="none" w="med" len="med"/>
+                  <a:tailEnd type="none" w="med" len="med"/>
+                </a:ln>
+              </p:spPr>
+              <p:style>
+                <a:lnRef idx="2">
+                  <a:schemeClr val="accent4"/>
+                </a:lnRef>
+                <a:fillRef idx="1">
+                  <a:schemeClr val="lt1"/>
+                </a:fillRef>
+                <a:effectRef idx="0">
+                  <a:schemeClr val="accent4"/>
+                </a:effectRef>
+                <a:fontRef idx="minor">
+                  <a:schemeClr val="dk1"/>
+                </a:fontRef>
+              </p:style>
+              <p:txBody>
+                <a:bodyPr rot="0" spcFirstLastPara="0" vertOverflow="overflow" horzOverflow="overflow" vert="horz" wrap="square" lIns="0" tIns="560064" rIns="0" bIns="380632" numCol="1" spcCol="0" rtlCol="0" fromWordArt="0" anchor="t" anchorCtr="0" forceAA="0" compatLnSpc="1">
+                  <a:prstTxWarp prst="textNoShape">
                     <a:avLst/>
-                  </a:prstGeom>
-                </p:spPr>
-              </p:pic>
-            </p:grpSp>
+                  </a:prstTxWarp>
+                  <a:noAutofit/>
+                </a:bodyPr>
+                <a:lstStyle/>
+                <a:p>
+                  <a:pPr algn="ctr" defTabSz="878453" fontAlgn="base">
+                    <a:lnSpc>
+                      <a:spcPct val="90000"/>
+                    </a:lnSpc>
+                    <a:spcBef>
+                      <a:spcPct val="0"/>
+                    </a:spcBef>
+                    <a:spcAft>
+                      <a:spcPct val="0"/>
+                    </a:spcAft>
+                  </a:pPr>
+                  <a:endParaRPr lang="en-US" sz="1131" b="1" dirty="0">
+                    <a:solidFill>
+                      <a:schemeClr val="tx1"/>
+                    </a:solidFill>
+                    <a:latin typeface="Segoe UI" charset="0"/>
+                    <a:cs typeface="Segoe UI" charset="0"/>
+                  </a:endParaRPr>
+                </a:p>
+              </p:txBody>
+            </p:sp>
             <p:sp>
               <p:nvSpPr>
                 <p:cNvPr id="70" name="Rectangle 69">
@@ -7336,135 +7222,78 @@
                 <a:chExt cx="1030081" cy="1060064"/>
               </a:xfrm>
             </p:grpSpPr>
-            <p:grpSp>
-              <p:nvGrpSpPr>
-                <p:cNvPr id="114" name="Group 113">
+            <p:sp>
+              <p:nvSpPr>
+                <p:cNvPr id="115" name="Hexagon 176">
                   <a:extLst>
                     <a:ext uri="{FF2B5EF4-FFF2-40B4-BE49-F238E27FC236}">
-                      <a16:creationId xmlns:a16="http://schemas.microsoft.com/office/drawing/2014/main" id="{24C89F02-222A-45B9-8396-F8A79AFA2B28}"/>
+                      <a16:creationId xmlns:a16="http://schemas.microsoft.com/office/drawing/2014/main" id="{E21049BF-1197-4C95-85A3-E6C05CEF2E78}"/>
                     </a:ext>
                   </a:extLst>
                 </p:cNvPr>
-                <p:cNvGrpSpPr/>
+                <p:cNvSpPr/>
                 <p:nvPr/>
-              </p:nvGrpSpPr>
-              <p:grpSpPr>
+              </p:nvSpPr>
+              <p:spPr bwMode="auto">
                 <a:xfrm>
                   <a:off x="6513719" y="1879600"/>
                   <a:ext cx="1030081" cy="935773"/>
-                  <a:chOff x="1847159" y="4836151"/>
-                  <a:chExt cx="1030081" cy="935773"/>
                 </a:xfrm>
-              </p:grpSpPr>
-              <p:sp>
-                <p:nvSpPr>
-                  <p:cNvPr id="115" name="Hexagon 176">
-                    <a:extLst>
-                      <a:ext uri="{FF2B5EF4-FFF2-40B4-BE49-F238E27FC236}">
-                        <a16:creationId xmlns:a16="http://schemas.microsoft.com/office/drawing/2014/main" id="{E21049BF-1197-4C95-85A3-E6C05CEF2E78}"/>
-                      </a:ext>
-                    </a:extLst>
-                  </p:cNvPr>
-                  <p:cNvSpPr/>
-                  <p:nvPr/>
-                </p:nvSpPr>
-                <p:spPr bwMode="auto">
-                  <a:xfrm>
-                    <a:off x="1847159" y="4836151"/>
-                    <a:ext cx="1030081" cy="935773"/>
-                  </a:xfrm>
-                  <a:prstGeom prst="hexagon">
-                    <a:avLst>
-                      <a:gd name="adj" fmla="val 28624"/>
-                      <a:gd name="vf" fmla="val 115470"/>
-                    </a:avLst>
-                  </a:prstGeom>
-                  <a:ln>
-                    <a:headEnd type="none" w="med" len="med"/>
-                    <a:tailEnd type="none" w="med" len="med"/>
-                  </a:ln>
-                </p:spPr>
-                <p:style>
-                  <a:lnRef idx="2">
-                    <a:schemeClr val="accent4"/>
-                  </a:lnRef>
-                  <a:fillRef idx="1">
-                    <a:schemeClr val="lt1"/>
-                  </a:fillRef>
-                  <a:effectRef idx="0">
-                    <a:schemeClr val="accent4"/>
-                  </a:effectRef>
-                  <a:fontRef idx="minor">
-                    <a:schemeClr val="dk1"/>
-                  </a:fontRef>
-                </p:style>
-                <p:txBody>
-                  <a:bodyPr rot="0" spcFirstLastPara="0" vertOverflow="overflow" horzOverflow="overflow" vert="horz" wrap="square" lIns="0" tIns="560064" rIns="0" bIns="380632" numCol="1" spcCol="0" rtlCol="0" fromWordArt="0" anchor="t" anchorCtr="0" forceAA="0" compatLnSpc="1">
-                    <a:prstTxWarp prst="textNoShape">
-                      <a:avLst/>
-                    </a:prstTxWarp>
-                    <a:noAutofit/>
-                  </a:bodyPr>
-                  <a:lstStyle/>
-                  <a:p>
-                    <a:pPr algn="ctr" defTabSz="878453" fontAlgn="base">
-                      <a:lnSpc>
-                        <a:spcPct val="90000"/>
-                      </a:lnSpc>
-                      <a:spcBef>
-                        <a:spcPct val="0"/>
-                      </a:spcBef>
-                      <a:spcAft>
-                        <a:spcPct val="0"/>
-                      </a:spcAft>
-                    </a:pPr>
-                    <a:endParaRPr lang="en-US" sz="1131" b="1" dirty="0">
-                      <a:solidFill>
-                        <a:schemeClr val="tx1"/>
-                      </a:solidFill>
-                      <a:latin typeface="Segoe UI" charset="0"/>
-                      <a:cs typeface="Segoe UI" charset="0"/>
-                    </a:endParaRPr>
-                  </a:p>
-                </p:txBody>
-              </p:sp>
-              <p:pic>
-                <p:nvPicPr>
-                  <p:cNvPr id="116" name="Picture 115">
-                    <a:extLst>
-                      <a:ext uri="{FF2B5EF4-FFF2-40B4-BE49-F238E27FC236}">
-                        <a16:creationId xmlns:a16="http://schemas.microsoft.com/office/drawing/2014/main" id="{61F15293-8B95-42DE-91E3-E65FE9669AE8}"/>
-                      </a:ext>
-                    </a:extLst>
-                  </p:cNvPr>
-                  <p:cNvPicPr>
-                    <a:picLocks noChangeAspect="1"/>
-                  </p:cNvPicPr>
-                  <p:nvPr/>
-                </p:nvPicPr>
-                <p:blipFill>
-                  <a:blip r:embed="rId11" cstate="print">
-                    <a:extLst>
-                      <a:ext uri="{28A0092B-C50C-407E-A947-70E740481C1C}">
-                        <a14:useLocalDpi xmlns:a14="http://schemas.microsoft.com/office/drawing/2010/main" val="0"/>
-                      </a:ext>
-                    </a:extLst>
-                  </a:blip>
-                  <a:stretch>
-                    <a:fillRect/>
-                  </a:stretch>
-                </p:blipFill>
-                <p:spPr>
-                  <a:xfrm>
-                    <a:off x="2082197" y="5059918"/>
-                    <a:ext cx="562911" cy="455057"/>
-                  </a:xfrm>
-                  <a:prstGeom prst="rect">
+                <a:prstGeom prst="hexagon">
+                  <a:avLst>
+                    <a:gd name="adj" fmla="val 28624"/>
+                    <a:gd name="vf" fmla="val 115470"/>
+                  </a:avLst>
+                </a:prstGeom>
+                <a:ln>
+                  <a:headEnd type="none" w="med" len="med"/>
+                  <a:tailEnd type="none" w="med" len="med"/>
+                </a:ln>
+              </p:spPr>
+              <p:style>
+                <a:lnRef idx="2">
+                  <a:schemeClr val="accent4"/>
+                </a:lnRef>
+                <a:fillRef idx="1">
+                  <a:schemeClr val="lt1"/>
+                </a:fillRef>
+                <a:effectRef idx="0">
+                  <a:schemeClr val="accent4"/>
+                </a:effectRef>
+                <a:fontRef idx="minor">
+                  <a:schemeClr val="dk1"/>
+                </a:fontRef>
+              </p:style>
+              <p:txBody>
+                <a:bodyPr rot="0" spcFirstLastPara="0" vertOverflow="overflow" horzOverflow="overflow" vert="horz" wrap="square" lIns="0" tIns="560064" rIns="0" bIns="380632" numCol="1" spcCol="0" rtlCol="0" fromWordArt="0" anchor="t" anchorCtr="0" forceAA="0" compatLnSpc="1">
+                  <a:prstTxWarp prst="textNoShape">
                     <a:avLst/>
-                  </a:prstGeom>
-                </p:spPr>
-              </p:pic>
-            </p:grpSp>
+                  </a:prstTxWarp>
+                  <a:noAutofit/>
+                </a:bodyPr>
+                <a:lstStyle/>
+                <a:p>
+                  <a:pPr algn="ctr" defTabSz="878453" fontAlgn="base">
+                    <a:lnSpc>
+                      <a:spcPct val="90000"/>
+                    </a:lnSpc>
+                    <a:spcBef>
+                      <a:spcPct val="0"/>
+                    </a:spcBef>
+                    <a:spcAft>
+                      <a:spcPct val="0"/>
+                    </a:spcAft>
+                  </a:pPr>
+                  <a:endParaRPr lang="en-US" sz="1131" b="1" dirty="0">
+                    <a:solidFill>
+                      <a:schemeClr val="tx1"/>
+                    </a:solidFill>
+                    <a:latin typeface="Segoe UI" charset="0"/>
+                    <a:cs typeface="Segoe UI" charset="0"/>
+                  </a:endParaRPr>
+                </a:p>
+              </p:txBody>
+            </p:sp>
             <p:sp>
               <p:nvSpPr>
                 <p:cNvPr id="79" name="Rectangle 78">
@@ -8008,135 +7837,78 @@
                 <a:chExt cx="1030081" cy="1060064"/>
               </a:xfrm>
             </p:grpSpPr>
-            <p:grpSp>
-              <p:nvGrpSpPr>
-                <p:cNvPr id="148" name="Group 147">
+            <p:sp>
+              <p:nvSpPr>
+                <p:cNvPr id="150" name="Hexagon 176">
                   <a:extLst>
                     <a:ext uri="{FF2B5EF4-FFF2-40B4-BE49-F238E27FC236}">
-                      <a16:creationId xmlns:a16="http://schemas.microsoft.com/office/drawing/2014/main" id="{3938CDAE-0DDD-4B86-9233-58358A471101}"/>
+                      <a16:creationId xmlns:a16="http://schemas.microsoft.com/office/drawing/2014/main" id="{94CA3966-4A02-4A3F-85CE-FD8CECD3B5A0}"/>
                     </a:ext>
                   </a:extLst>
                 </p:cNvPr>
-                <p:cNvGrpSpPr/>
+                <p:cNvSpPr/>
                 <p:nvPr/>
-              </p:nvGrpSpPr>
-              <p:grpSpPr>
+              </p:nvSpPr>
+              <p:spPr bwMode="auto">
                 <a:xfrm>
                   <a:off x="6513719" y="1879600"/>
                   <a:ext cx="1030081" cy="935773"/>
-                  <a:chOff x="1847159" y="4836151"/>
-                  <a:chExt cx="1030081" cy="935773"/>
                 </a:xfrm>
-              </p:grpSpPr>
-              <p:sp>
-                <p:nvSpPr>
-                  <p:cNvPr id="150" name="Hexagon 176">
-                    <a:extLst>
-                      <a:ext uri="{FF2B5EF4-FFF2-40B4-BE49-F238E27FC236}">
-                        <a16:creationId xmlns:a16="http://schemas.microsoft.com/office/drawing/2014/main" id="{94CA3966-4A02-4A3F-85CE-FD8CECD3B5A0}"/>
-                      </a:ext>
-                    </a:extLst>
-                  </p:cNvPr>
-                  <p:cNvSpPr/>
-                  <p:nvPr/>
-                </p:nvSpPr>
-                <p:spPr bwMode="auto">
-                  <a:xfrm>
-                    <a:off x="1847159" y="4836151"/>
-                    <a:ext cx="1030081" cy="935773"/>
-                  </a:xfrm>
-                  <a:prstGeom prst="hexagon">
-                    <a:avLst>
-                      <a:gd name="adj" fmla="val 28624"/>
-                      <a:gd name="vf" fmla="val 115470"/>
-                    </a:avLst>
-                  </a:prstGeom>
-                  <a:ln>
-                    <a:headEnd type="none" w="med" len="med"/>
-                    <a:tailEnd type="none" w="med" len="med"/>
-                  </a:ln>
-                </p:spPr>
-                <p:style>
-                  <a:lnRef idx="2">
-                    <a:schemeClr val="accent4"/>
-                  </a:lnRef>
-                  <a:fillRef idx="1">
-                    <a:schemeClr val="lt1"/>
-                  </a:fillRef>
-                  <a:effectRef idx="0">
-                    <a:schemeClr val="accent4"/>
-                  </a:effectRef>
-                  <a:fontRef idx="minor">
-                    <a:schemeClr val="dk1"/>
-                  </a:fontRef>
-                </p:style>
-                <p:txBody>
-                  <a:bodyPr rot="0" spcFirstLastPara="0" vertOverflow="overflow" horzOverflow="overflow" vert="horz" wrap="square" lIns="0" tIns="560064" rIns="0" bIns="380632" numCol="1" spcCol="0" rtlCol="0" fromWordArt="0" anchor="t" anchorCtr="0" forceAA="0" compatLnSpc="1">
-                    <a:prstTxWarp prst="textNoShape">
-                      <a:avLst/>
-                    </a:prstTxWarp>
-                    <a:noAutofit/>
-                  </a:bodyPr>
-                  <a:lstStyle/>
-                  <a:p>
-                    <a:pPr algn="ctr" defTabSz="878453" fontAlgn="base">
-                      <a:lnSpc>
-                        <a:spcPct val="90000"/>
-                      </a:lnSpc>
-                      <a:spcBef>
-                        <a:spcPct val="0"/>
-                      </a:spcBef>
-                      <a:spcAft>
-                        <a:spcPct val="0"/>
-                      </a:spcAft>
-                    </a:pPr>
-                    <a:endParaRPr lang="en-US" sz="1131" b="1" dirty="0">
-                      <a:solidFill>
-                        <a:schemeClr val="tx1"/>
-                      </a:solidFill>
-                      <a:latin typeface="Segoe UI" charset="0"/>
-                      <a:cs typeface="Segoe UI" charset="0"/>
-                    </a:endParaRPr>
-                  </a:p>
-                </p:txBody>
-              </p:sp>
-              <p:pic>
-                <p:nvPicPr>
-                  <p:cNvPr id="151" name="Picture 150">
-                    <a:extLst>
-                      <a:ext uri="{FF2B5EF4-FFF2-40B4-BE49-F238E27FC236}">
-                        <a16:creationId xmlns:a16="http://schemas.microsoft.com/office/drawing/2014/main" id="{3E754663-3C7F-42A5-AE6F-64963368E68D}"/>
-                      </a:ext>
-                    </a:extLst>
-                  </p:cNvPr>
-                  <p:cNvPicPr>
-                    <a:picLocks noChangeAspect="1"/>
-                  </p:cNvPicPr>
-                  <p:nvPr/>
-                </p:nvPicPr>
-                <p:blipFill>
-                  <a:blip r:embed="rId11" cstate="print">
-                    <a:extLst>
-                      <a:ext uri="{28A0092B-C50C-407E-A947-70E740481C1C}">
-                        <a14:useLocalDpi xmlns:a14="http://schemas.microsoft.com/office/drawing/2010/main" val="0"/>
-                      </a:ext>
-                    </a:extLst>
-                  </a:blip>
-                  <a:stretch>
-                    <a:fillRect/>
-                  </a:stretch>
-                </p:blipFill>
-                <p:spPr>
-                  <a:xfrm>
-                    <a:off x="2082197" y="5059918"/>
-                    <a:ext cx="562911" cy="455057"/>
-                  </a:xfrm>
-                  <a:prstGeom prst="rect">
+                <a:prstGeom prst="hexagon">
+                  <a:avLst>
+                    <a:gd name="adj" fmla="val 28624"/>
+                    <a:gd name="vf" fmla="val 115470"/>
+                  </a:avLst>
+                </a:prstGeom>
+                <a:ln>
+                  <a:headEnd type="none" w="med" len="med"/>
+                  <a:tailEnd type="none" w="med" len="med"/>
+                </a:ln>
+              </p:spPr>
+              <p:style>
+                <a:lnRef idx="2">
+                  <a:schemeClr val="accent4"/>
+                </a:lnRef>
+                <a:fillRef idx="1">
+                  <a:schemeClr val="lt1"/>
+                </a:fillRef>
+                <a:effectRef idx="0">
+                  <a:schemeClr val="accent4"/>
+                </a:effectRef>
+                <a:fontRef idx="minor">
+                  <a:schemeClr val="dk1"/>
+                </a:fontRef>
+              </p:style>
+              <p:txBody>
+                <a:bodyPr rot="0" spcFirstLastPara="0" vertOverflow="overflow" horzOverflow="overflow" vert="horz" wrap="square" lIns="0" tIns="560064" rIns="0" bIns="380632" numCol="1" spcCol="0" rtlCol="0" fromWordArt="0" anchor="t" anchorCtr="0" forceAA="0" compatLnSpc="1">
+                  <a:prstTxWarp prst="textNoShape">
                     <a:avLst/>
-                  </a:prstGeom>
-                </p:spPr>
-              </p:pic>
-            </p:grpSp>
+                  </a:prstTxWarp>
+                  <a:noAutofit/>
+                </a:bodyPr>
+                <a:lstStyle/>
+                <a:p>
+                  <a:pPr algn="ctr" defTabSz="878453" fontAlgn="base">
+                    <a:lnSpc>
+                      <a:spcPct val="90000"/>
+                    </a:lnSpc>
+                    <a:spcBef>
+                      <a:spcPct val="0"/>
+                    </a:spcBef>
+                    <a:spcAft>
+                      <a:spcPct val="0"/>
+                    </a:spcAft>
+                  </a:pPr>
+                  <a:endParaRPr lang="en-US" sz="1131" b="1" dirty="0">
+                    <a:solidFill>
+                      <a:schemeClr val="tx1"/>
+                    </a:solidFill>
+                    <a:latin typeface="Segoe UI" charset="0"/>
+                    <a:cs typeface="Segoe UI" charset="0"/>
+                  </a:endParaRPr>
+                </a:p>
+              </p:txBody>
+            </p:sp>
             <p:sp>
               <p:nvSpPr>
                 <p:cNvPr id="149" name="Rectangle 148">
@@ -8957,6 +8729,150 @@
           </a:fontRef>
         </p:style>
       </p:cxnSp>
+      <p:pic>
+        <p:nvPicPr>
+          <p:cNvPr id="8" name="Picture 7">
+            <a:extLst>
+              <a:ext uri="{FF2B5EF4-FFF2-40B4-BE49-F238E27FC236}">
+                <a16:creationId xmlns:a16="http://schemas.microsoft.com/office/drawing/2014/main" id="{78C6F4FA-29D7-47F1-94CB-EA0A5FE7B4AB}"/>
+              </a:ext>
+            </a:extLst>
+          </p:cNvPr>
+          <p:cNvPicPr>
+            <a:picLocks noChangeAspect="1"/>
+          </p:cNvPicPr>
+          <p:nvPr/>
+        </p:nvPicPr>
+        <p:blipFill>
+          <a:blip r:embed="rId11" cstate="print">
+            <a:extLst>
+              <a:ext uri="{28A0092B-C50C-407E-A947-70E740481C1C}">
+                <a14:useLocalDpi xmlns:a14="http://schemas.microsoft.com/office/drawing/2010/main" val="0"/>
+              </a:ext>
+            </a:extLst>
+          </a:blip>
+          <a:stretch>
+            <a:fillRect/>
+          </a:stretch>
+        </p:blipFill>
+        <p:spPr>
+          <a:xfrm>
+            <a:off x="3483916" y="1759921"/>
+            <a:ext cx="724246" cy="374571"/>
+          </a:xfrm>
+          <a:prstGeom prst="rect">
+            <a:avLst/>
+          </a:prstGeom>
+        </p:spPr>
+      </p:pic>
+      <p:pic>
+        <p:nvPicPr>
+          <p:cNvPr id="161" name="Picture 160">
+            <a:extLst>
+              <a:ext uri="{FF2B5EF4-FFF2-40B4-BE49-F238E27FC236}">
+                <a16:creationId xmlns:a16="http://schemas.microsoft.com/office/drawing/2014/main" id="{13DEA6E5-65D9-4969-ACE7-656079E309B6}"/>
+              </a:ext>
+            </a:extLst>
+          </p:cNvPr>
+          <p:cNvPicPr>
+            <a:picLocks noChangeAspect="1"/>
+          </p:cNvPicPr>
+          <p:nvPr/>
+        </p:nvPicPr>
+        <p:blipFill>
+          <a:blip r:embed="rId11" cstate="print">
+            <a:extLst>
+              <a:ext uri="{28A0092B-C50C-407E-A947-70E740481C1C}">
+                <a14:useLocalDpi xmlns:a14="http://schemas.microsoft.com/office/drawing/2010/main" val="0"/>
+              </a:ext>
+            </a:extLst>
+          </a:blip>
+          <a:stretch>
+            <a:fillRect/>
+          </a:stretch>
+        </p:blipFill>
+        <p:spPr>
+          <a:xfrm>
+            <a:off x="2636949" y="4917002"/>
+            <a:ext cx="724246" cy="374571"/>
+          </a:xfrm>
+          <a:prstGeom prst="rect">
+            <a:avLst/>
+          </a:prstGeom>
+        </p:spPr>
+      </p:pic>
+      <p:pic>
+        <p:nvPicPr>
+          <p:cNvPr id="162" name="Picture 161">
+            <a:extLst>
+              <a:ext uri="{FF2B5EF4-FFF2-40B4-BE49-F238E27FC236}">
+                <a16:creationId xmlns:a16="http://schemas.microsoft.com/office/drawing/2014/main" id="{78678F3B-2534-4D0F-81FC-C9F8F1B8C234}"/>
+              </a:ext>
+            </a:extLst>
+          </p:cNvPr>
+          <p:cNvPicPr>
+            <a:picLocks noChangeAspect="1"/>
+          </p:cNvPicPr>
+          <p:nvPr/>
+        </p:nvPicPr>
+        <p:blipFill>
+          <a:blip r:embed="rId11" cstate="print">
+            <a:extLst>
+              <a:ext uri="{28A0092B-C50C-407E-A947-70E740481C1C}">
+                <a14:useLocalDpi xmlns:a14="http://schemas.microsoft.com/office/drawing/2010/main" val="0"/>
+              </a:ext>
+            </a:extLst>
+          </a:blip>
+          <a:stretch>
+            <a:fillRect/>
+          </a:stretch>
+        </p:blipFill>
+        <p:spPr>
+          <a:xfrm>
+            <a:off x="4185516" y="4913402"/>
+            <a:ext cx="724246" cy="374571"/>
+          </a:xfrm>
+          <a:prstGeom prst="rect">
+            <a:avLst/>
+          </a:prstGeom>
+        </p:spPr>
+      </p:pic>
+      <p:pic>
+        <p:nvPicPr>
+          <p:cNvPr id="163" name="Picture 162">
+            <a:extLst>
+              <a:ext uri="{FF2B5EF4-FFF2-40B4-BE49-F238E27FC236}">
+                <a16:creationId xmlns:a16="http://schemas.microsoft.com/office/drawing/2014/main" id="{5A035B36-A8F2-48C8-8280-AD1186AD4CBA}"/>
+              </a:ext>
+            </a:extLst>
+          </p:cNvPr>
+          <p:cNvPicPr>
+            <a:picLocks noChangeAspect="1"/>
+          </p:cNvPicPr>
+          <p:nvPr/>
+        </p:nvPicPr>
+        <p:blipFill>
+          <a:blip r:embed="rId11" cstate="print">
+            <a:extLst>
+              <a:ext uri="{28A0092B-C50C-407E-A947-70E740481C1C}">
+                <a14:useLocalDpi xmlns:a14="http://schemas.microsoft.com/office/drawing/2010/main" val="0"/>
+              </a:ext>
+            </a:extLst>
+          </a:blip>
+          <a:stretch>
+            <a:fillRect/>
+          </a:stretch>
+        </p:blipFill>
+        <p:spPr>
+          <a:xfrm>
+            <a:off x="7213133" y="4914578"/>
+            <a:ext cx="724246" cy="374571"/>
+          </a:xfrm>
+          <a:prstGeom prst="rect">
+            <a:avLst/>
+          </a:prstGeom>
+        </p:spPr>
+      </p:pic>
     </p:spTree>
     <p:extLst>
       <p:ext uri="{BB962C8B-B14F-4D97-AF65-F5344CB8AC3E}">

</xml_diff>